<commit_message>
Poster, most information added
</commit_message>
<xml_diff>
--- a/documentation/AlgorithmPoster.pptx
+++ b/documentation/AlgorithmPoster.pptx
@@ -1065,10 +1065,8 @@
         <a:p>
           <a:r>
             <a:rPr lang="en-ZA" dirty="0" smtClean="0"/>
-            <a:t>From this data we calculate a Z-score for the distance of the person’s number of bad things from the normal distribution of the number of bad things.</a:t>
+            <a:t>Using this information, we are able to estimate a probability that the score of the current trip was a result of random chance when compared to the normal distribution of all other drivers.</a:t>
           </a:r>
-        </a:p>
-        <a:p>
           <a:endParaRPr lang="en-ZA" dirty="0"/>
         </a:p>
       </dgm:t>
@@ -1104,8 +1102,10 @@
         <a:p>
           <a:r>
             <a:rPr lang="en-ZA" dirty="0" smtClean="0"/>
-            <a:t>Using our z-score and by integrating the normal distribution function, we are able to estimate the area to the left of the normal distribution’s score.</a:t>
+            <a:t>From this data we calculate a Z-score for the distance of the person’s number of bad things from the normal distribution of the number of bad things.</a:t>
           </a:r>
+        </a:p>
+        <a:p>
           <a:endParaRPr lang="en-ZA" dirty="0"/>
         </a:p>
       </dgm:t>
@@ -1141,7 +1141,7 @@
         <a:p>
           <a:r>
             <a:rPr lang="en-ZA" dirty="0" smtClean="0"/>
-            <a:t>Because the area under a normal distribution always equals 1, we can simply multiply the area by 10 to achieve a score out of 10 for the quality of that person’s driving.</a:t>
+            <a:t>Using our z-score and by integrating the normal distribution function, we are able to estimate the area to the left of the normal distribution’s score.</a:t>
           </a:r>
           <a:endParaRPr lang="en-ZA" dirty="0"/>
         </a:p>
@@ -1177,8 +1177,8 @@
         <a:lstStyle/>
         <a:p>
           <a:r>
-            <a:rPr lang="en-ZA" dirty="0" smtClean="0"/>
-            <a:t>Using this information, we are able to estimate a probability that the score of the current trip was a result of random chance when compared to the normal distribution of all other drivers.</a:t>
+            <a:rPr lang="en-ZA" smtClean="0"/>
+            <a:t>Weightings are applied to the different readings from the sensors (because acceleration through a turn is worse than acceleration while moving forward, and acceleration upwards is even worse!)</a:t>
           </a:r>
           <a:endParaRPr lang="en-ZA" dirty="0"/>
         </a:p>
@@ -1206,6 +1206,43 @@
         </a:p>
       </dgm:t>
     </dgm:pt>
+    <dgm:pt modelId="{F2809BA3-C65E-4889-8F5A-FF553707154C}">
+      <dgm:prSet phldrT="[Text]"/>
+      <dgm:spPr/>
+      <dgm:t>
+        <a:bodyPr/>
+        <a:lstStyle/>
+        <a:p>
+          <a:r>
+            <a:rPr lang="en-ZA" dirty="0" smtClean="0"/>
+            <a:t>Because the area under a normal distribution always equals 1, we can simply multiply the area by 10 to achieve a score out of 10 for the quality of that person’s driving.</a:t>
+          </a:r>
+          <a:endParaRPr lang="en-ZA" dirty="0"/>
+        </a:p>
+      </dgm:t>
+    </dgm:pt>
+    <dgm:pt modelId="{FC354316-0A86-49FE-B980-2848910173B1}" type="parTrans" cxnId="{B3B9CAB9-2667-4815-A245-E1FC2B28DE7D}">
+      <dgm:prSet/>
+      <dgm:spPr/>
+      <dgm:t>
+        <a:bodyPr/>
+        <a:lstStyle/>
+        <a:p>
+          <a:endParaRPr lang="en-ZA"/>
+        </a:p>
+      </dgm:t>
+    </dgm:pt>
+    <dgm:pt modelId="{342EE362-FB63-4B4A-A4F8-F7864A82DA6F}" type="sibTrans" cxnId="{B3B9CAB9-2667-4815-A245-E1FC2B28DE7D}">
+      <dgm:prSet/>
+      <dgm:spPr/>
+      <dgm:t>
+        <a:bodyPr/>
+        <a:lstStyle/>
+        <a:p>
+          <a:endParaRPr lang="en-ZA"/>
+        </a:p>
+      </dgm:t>
+    </dgm:pt>
     <dgm:pt modelId="{F41203AE-3D27-4DFC-B08E-BF6461080D2A}" type="pres">
       <dgm:prSet presAssocID="{69D9465D-5278-4893-90E4-FC4A404190FF}" presName="Name0" presStyleCnt="0">
         <dgm:presLayoutVars>
@@ -1214,6 +1251,13 @@
         </dgm:presLayoutVars>
       </dgm:prSet>
       <dgm:spPr/>
+      <dgm:t>
+        <a:bodyPr/>
+        <a:lstStyle/>
+        <a:p>
+          <a:endParaRPr lang="en-ZA"/>
+        </a:p>
+      </dgm:t>
     </dgm:pt>
     <dgm:pt modelId="{9B9AB0DF-1520-478A-9272-0D99B8FD5BC6}" type="pres">
       <dgm:prSet presAssocID="{D9BFE88D-86D5-4A4E-9864-049B66CE7B11}" presName="compNode" presStyleCnt="0"/>
@@ -1224,7 +1268,7 @@
       <dgm:spPr/>
     </dgm:pt>
     <dgm:pt modelId="{0111BCDE-244E-4E0C-9F45-971A15B0F1AB}" type="pres">
-      <dgm:prSet presAssocID="{D9BFE88D-86D5-4A4E-9864-049B66CE7B11}" presName="node" presStyleLbl="node1" presStyleIdx="0" presStyleCnt="8">
+      <dgm:prSet presAssocID="{D9BFE88D-86D5-4A4E-9864-049B66CE7B11}" presName="node" presStyleLbl="node1" presStyleIdx="0" presStyleCnt="9">
         <dgm:presLayoutVars>
           <dgm:bulletEnabled val="1"/>
         </dgm:presLayoutVars>
@@ -1239,8 +1283,15 @@
       </dgm:t>
     </dgm:pt>
     <dgm:pt modelId="{CF02E96F-6612-4447-A716-AF24BA2BAA38}" type="pres">
-      <dgm:prSet presAssocID="{8E23BBB5-4FFD-4603-8A8B-57D6A8F546C7}" presName="sibTrans" presStyleLbl="bgSibTrans2D1" presStyleIdx="0" presStyleCnt="7"/>
+      <dgm:prSet presAssocID="{8E23BBB5-4FFD-4603-8A8B-57D6A8F546C7}" presName="sibTrans" presStyleLbl="bgSibTrans2D1" presStyleIdx="0" presStyleCnt="8"/>
       <dgm:spPr/>
+      <dgm:t>
+        <a:bodyPr/>
+        <a:lstStyle/>
+        <a:p>
+          <a:endParaRPr lang="en-ZA"/>
+        </a:p>
+      </dgm:t>
     </dgm:pt>
     <dgm:pt modelId="{9A667FA2-187F-453F-A609-3E1D6425EF0B}" type="pres">
       <dgm:prSet presAssocID="{F6AB84D7-DC04-4772-BBB8-08839E3E3B0E}" presName="compNode" presStyleCnt="0"/>
@@ -1251,7 +1302,7 @@
       <dgm:spPr/>
     </dgm:pt>
     <dgm:pt modelId="{5D23B8C8-D64B-484E-B55B-BD146A94EBE7}" type="pres">
-      <dgm:prSet presAssocID="{F6AB84D7-DC04-4772-BBB8-08839E3E3B0E}" presName="node" presStyleLbl="node1" presStyleIdx="1" presStyleCnt="8">
+      <dgm:prSet presAssocID="{F6AB84D7-DC04-4772-BBB8-08839E3E3B0E}" presName="node" presStyleLbl="node1" presStyleIdx="1" presStyleCnt="9">
         <dgm:presLayoutVars>
           <dgm:bulletEnabled val="1"/>
         </dgm:presLayoutVars>
@@ -1266,8 +1317,15 @@
       </dgm:t>
     </dgm:pt>
     <dgm:pt modelId="{6E02BA24-2FD9-4C78-8700-D63A6D75380B}" type="pres">
-      <dgm:prSet presAssocID="{730DAA83-5ECA-4C62-B660-9C169A24A198}" presName="sibTrans" presStyleLbl="bgSibTrans2D1" presStyleIdx="1" presStyleCnt="7"/>
+      <dgm:prSet presAssocID="{730DAA83-5ECA-4C62-B660-9C169A24A198}" presName="sibTrans" presStyleLbl="bgSibTrans2D1" presStyleIdx="1" presStyleCnt="8"/>
       <dgm:spPr/>
+      <dgm:t>
+        <a:bodyPr/>
+        <a:lstStyle/>
+        <a:p>
+          <a:endParaRPr lang="en-ZA"/>
+        </a:p>
+      </dgm:t>
     </dgm:pt>
     <dgm:pt modelId="{35030BF2-BCB0-42C3-AB31-7179BE8CC150}" type="pres">
       <dgm:prSet presAssocID="{C24C36EC-6312-42E6-85F3-613C20BC1376}" presName="compNode" presStyleCnt="0"/>
@@ -1278,7 +1336,7 @@
       <dgm:spPr/>
     </dgm:pt>
     <dgm:pt modelId="{DB114CFE-3120-4EDC-8173-69948354E5C4}" type="pres">
-      <dgm:prSet presAssocID="{C24C36EC-6312-42E6-85F3-613C20BC1376}" presName="node" presStyleLbl="node1" presStyleIdx="2" presStyleCnt="8">
+      <dgm:prSet presAssocID="{C24C36EC-6312-42E6-85F3-613C20BC1376}" presName="node" presStyleLbl="node1" presStyleIdx="2" presStyleCnt="9">
         <dgm:presLayoutVars>
           <dgm:bulletEnabled val="1"/>
         </dgm:presLayoutVars>
@@ -1293,8 +1351,15 @@
       </dgm:t>
     </dgm:pt>
     <dgm:pt modelId="{B3F14615-A4E7-4DA6-B7C0-B9FBB08C1897}" type="pres">
-      <dgm:prSet presAssocID="{A015CC84-CBCB-49E3-9D9B-F66E30B67EB4}" presName="sibTrans" presStyleLbl="bgSibTrans2D1" presStyleIdx="2" presStyleCnt="7"/>
+      <dgm:prSet presAssocID="{A015CC84-CBCB-49E3-9D9B-F66E30B67EB4}" presName="sibTrans" presStyleLbl="bgSibTrans2D1" presStyleIdx="2" presStyleCnt="8"/>
       <dgm:spPr/>
+      <dgm:t>
+        <a:bodyPr/>
+        <a:lstStyle/>
+        <a:p>
+          <a:endParaRPr lang="en-ZA"/>
+        </a:p>
+      </dgm:t>
     </dgm:pt>
     <dgm:pt modelId="{51B2E9AB-3D79-49B1-BEBD-4D3750E0DBE2}" type="pres">
       <dgm:prSet presAssocID="{AC0CA605-AB71-4DDA-8068-AE236D9C9B5B}" presName="compNode" presStyleCnt="0"/>
@@ -1305,7 +1370,7 @@
       <dgm:spPr/>
     </dgm:pt>
     <dgm:pt modelId="{8B6115A6-6B88-4E8C-B7FC-E18F0AFA9CAB}" type="pres">
-      <dgm:prSet presAssocID="{AC0CA605-AB71-4DDA-8068-AE236D9C9B5B}" presName="node" presStyleLbl="node1" presStyleIdx="3" presStyleCnt="8">
+      <dgm:prSet presAssocID="{AC0CA605-AB71-4DDA-8068-AE236D9C9B5B}" presName="node" presStyleLbl="node1" presStyleIdx="3" presStyleCnt="9">
         <dgm:presLayoutVars>
           <dgm:bulletEnabled val="1"/>
         </dgm:presLayoutVars>
@@ -1320,8 +1385,15 @@
       </dgm:t>
     </dgm:pt>
     <dgm:pt modelId="{3C7DEFEB-D965-469F-891F-0F8B1239A0E7}" type="pres">
-      <dgm:prSet presAssocID="{A9DEF564-FDF7-4F00-998C-0108AF2F964C}" presName="sibTrans" presStyleLbl="bgSibTrans2D1" presStyleIdx="3" presStyleCnt="7"/>
+      <dgm:prSet presAssocID="{A9DEF564-FDF7-4F00-998C-0108AF2F964C}" presName="sibTrans" presStyleLbl="bgSibTrans2D1" presStyleIdx="3" presStyleCnt="8"/>
       <dgm:spPr/>
+      <dgm:t>
+        <a:bodyPr/>
+        <a:lstStyle/>
+        <a:p>
+          <a:endParaRPr lang="en-ZA"/>
+        </a:p>
+      </dgm:t>
     </dgm:pt>
     <dgm:pt modelId="{95BA0601-87BE-4DEF-8582-2DEE0BA26A86}" type="pres">
       <dgm:prSet presAssocID="{7B5F1AB1-A56B-4592-899D-948C07E9FCE7}" presName="compNode" presStyleCnt="0"/>
@@ -1332,7 +1404,7 @@
       <dgm:spPr/>
     </dgm:pt>
     <dgm:pt modelId="{4831F056-7731-46BB-8DF6-11307D2F1AEB}" type="pres">
-      <dgm:prSet presAssocID="{7B5F1AB1-A56B-4592-899D-948C07E9FCE7}" presName="node" presStyleLbl="node1" presStyleIdx="4" presStyleCnt="8">
+      <dgm:prSet presAssocID="{7B5F1AB1-A56B-4592-899D-948C07E9FCE7}" presName="node" presStyleLbl="node1" presStyleIdx="4" presStyleCnt="9">
         <dgm:presLayoutVars>
           <dgm:bulletEnabled val="1"/>
         </dgm:presLayoutVars>
@@ -1347,8 +1419,15 @@
       </dgm:t>
     </dgm:pt>
     <dgm:pt modelId="{66DF8E1A-5511-4F36-8E47-F7C36D34BC9C}" type="pres">
-      <dgm:prSet presAssocID="{F9AFC70D-98A9-44D5-AE29-4B77D890DCE5}" presName="sibTrans" presStyleLbl="bgSibTrans2D1" presStyleIdx="4" presStyleCnt="7"/>
+      <dgm:prSet presAssocID="{F9AFC70D-98A9-44D5-AE29-4B77D890DCE5}" presName="sibTrans" presStyleLbl="bgSibTrans2D1" presStyleIdx="4" presStyleCnt="8"/>
       <dgm:spPr/>
+      <dgm:t>
+        <a:bodyPr/>
+        <a:lstStyle/>
+        <a:p>
+          <a:endParaRPr lang="en-ZA"/>
+        </a:p>
+      </dgm:t>
     </dgm:pt>
     <dgm:pt modelId="{0EC2B60E-4C2C-4D55-BEB5-A8216C7C4608}" type="pres">
       <dgm:prSet presAssocID="{F7C8F245-4D7A-469E-B33C-5443AAA03436}" presName="compNode" presStyleCnt="0"/>
@@ -1359,16 +1438,30 @@
       <dgm:spPr/>
     </dgm:pt>
     <dgm:pt modelId="{E8D604B9-E6B5-427C-8D2D-C70DBA515C38}" type="pres">
-      <dgm:prSet presAssocID="{F7C8F245-4D7A-469E-B33C-5443AAA03436}" presName="node" presStyleLbl="node1" presStyleIdx="5" presStyleCnt="8">
+      <dgm:prSet presAssocID="{F7C8F245-4D7A-469E-B33C-5443AAA03436}" presName="node" presStyleLbl="node1" presStyleIdx="5" presStyleCnt="9">
         <dgm:presLayoutVars>
           <dgm:bulletEnabled val="1"/>
         </dgm:presLayoutVars>
       </dgm:prSet>
       <dgm:spPr/>
+      <dgm:t>
+        <a:bodyPr/>
+        <a:lstStyle/>
+        <a:p>
+          <a:endParaRPr lang="en-ZA"/>
+        </a:p>
+      </dgm:t>
     </dgm:pt>
     <dgm:pt modelId="{F464CA6F-950B-46FF-9EA4-EAFF6B879406}" type="pres">
-      <dgm:prSet presAssocID="{5925B536-8CDD-4273-9EA0-F3DFE28CFC0A}" presName="sibTrans" presStyleLbl="bgSibTrans2D1" presStyleIdx="5" presStyleCnt="7"/>
+      <dgm:prSet presAssocID="{5925B536-8CDD-4273-9EA0-F3DFE28CFC0A}" presName="sibTrans" presStyleLbl="bgSibTrans2D1" presStyleIdx="5" presStyleCnt="8"/>
       <dgm:spPr/>
+      <dgm:t>
+        <a:bodyPr/>
+        <a:lstStyle/>
+        <a:p>
+          <a:endParaRPr lang="en-ZA"/>
+        </a:p>
+      </dgm:t>
     </dgm:pt>
     <dgm:pt modelId="{42A1F50B-5B1B-4145-A083-09B1B095BC25}" type="pres">
       <dgm:prSet presAssocID="{664F3033-06A2-4F92-8AED-49E5BB070394}" presName="compNode" presStyleCnt="0"/>
@@ -1379,7 +1472,7 @@
       <dgm:spPr/>
     </dgm:pt>
     <dgm:pt modelId="{E2F09AE3-E19A-4DEE-8439-BD770D589E30}" type="pres">
-      <dgm:prSet presAssocID="{664F3033-06A2-4F92-8AED-49E5BB070394}" presName="node" presStyleLbl="node1" presStyleIdx="6" presStyleCnt="8">
+      <dgm:prSet presAssocID="{664F3033-06A2-4F92-8AED-49E5BB070394}" presName="node" presStyleLbl="node1" presStyleIdx="6" presStyleCnt="9">
         <dgm:presLayoutVars>
           <dgm:bulletEnabled val="1"/>
         </dgm:presLayoutVars>
@@ -1394,8 +1487,15 @@
       </dgm:t>
     </dgm:pt>
     <dgm:pt modelId="{E6918614-9BE6-4F65-A414-6CA09685AE8E}" type="pres">
-      <dgm:prSet presAssocID="{24235BDA-3456-4472-A5F8-A95C033405D7}" presName="sibTrans" presStyleLbl="bgSibTrans2D1" presStyleIdx="6" presStyleCnt="7"/>
+      <dgm:prSet presAssocID="{24235BDA-3456-4472-A5F8-A95C033405D7}" presName="sibTrans" presStyleLbl="bgSibTrans2D1" presStyleIdx="6" presStyleCnt="8"/>
       <dgm:spPr/>
+      <dgm:t>
+        <a:bodyPr/>
+        <a:lstStyle/>
+        <a:p>
+          <a:endParaRPr lang="en-ZA"/>
+        </a:p>
+      </dgm:t>
     </dgm:pt>
     <dgm:pt modelId="{1B166470-D870-4BDA-A5DA-F226145161FC}" type="pres">
       <dgm:prSet presAssocID="{CE70E7C1-00A1-4F5C-B7F2-4DEA0098B5CC}" presName="compNode" presStyleCnt="0"/>
@@ -1406,7 +1506,41 @@
       <dgm:spPr/>
     </dgm:pt>
     <dgm:pt modelId="{6DEDC417-7D81-4270-BD28-D9247A7A935F}" type="pres">
-      <dgm:prSet presAssocID="{CE70E7C1-00A1-4F5C-B7F2-4DEA0098B5CC}" presName="node" presStyleLbl="node1" presStyleIdx="7" presStyleCnt="8">
+      <dgm:prSet presAssocID="{CE70E7C1-00A1-4F5C-B7F2-4DEA0098B5CC}" presName="node" presStyleLbl="node1" presStyleIdx="7" presStyleCnt="9">
+        <dgm:presLayoutVars>
+          <dgm:bulletEnabled val="1"/>
+        </dgm:presLayoutVars>
+      </dgm:prSet>
+      <dgm:spPr/>
+      <dgm:t>
+        <a:bodyPr/>
+        <a:lstStyle/>
+        <a:p>
+          <a:endParaRPr lang="en-ZA"/>
+        </a:p>
+      </dgm:t>
+    </dgm:pt>
+    <dgm:pt modelId="{04175430-BE2F-45E9-8822-6B0CF5FF9864}" type="pres">
+      <dgm:prSet presAssocID="{31DAD7E9-CE7C-41E2-8D30-CCCC16BF810D}" presName="sibTrans" presStyleLbl="bgSibTrans2D1" presStyleIdx="7" presStyleCnt="8"/>
+      <dgm:spPr/>
+      <dgm:t>
+        <a:bodyPr/>
+        <a:lstStyle/>
+        <a:p>
+          <a:endParaRPr lang="en-ZA"/>
+        </a:p>
+      </dgm:t>
+    </dgm:pt>
+    <dgm:pt modelId="{0B625B18-E227-42A1-8BD7-FBC109D3EA62}" type="pres">
+      <dgm:prSet presAssocID="{F2809BA3-C65E-4889-8F5A-FF553707154C}" presName="compNode" presStyleCnt="0"/>
+      <dgm:spPr/>
+    </dgm:pt>
+    <dgm:pt modelId="{57704B1B-3CE8-4FEB-A14B-A42A5666C53B}" type="pres">
+      <dgm:prSet presAssocID="{F2809BA3-C65E-4889-8F5A-FF553707154C}" presName="dummyConnPt" presStyleCnt="0"/>
+      <dgm:spPr/>
+    </dgm:pt>
+    <dgm:pt modelId="{186C2779-A3E3-43E9-AE0E-189DFF42734F}" type="pres">
+      <dgm:prSet presAssocID="{F2809BA3-C65E-4889-8F5A-FF553707154C}" presName="node" presStyleLbl="node1" presStyleIdx="8" presStyleCnt="9">
         <dgm:presLayoutVars>
           <dgm:bulletEnabled val="1"/>
         </dgm:presLayoutVars>
@@ -1423,29 +1557,32 @@
   </dgm:ptLst>
   <dgm:cxnLst>
     <dgm:cxn modelId="{2534C515-9526-4995-A442-803954094489}" type="presOf" srcId="{CE70E7C1-00A1-4F5C-B7F2-4DEA0098B5CC}" destId="{6DEDC417-7D81-4270-BD28-D9247A7A935F}" srcOrd="0" destOrd="0" presId="urn:microsoft.com/office/officeart/2005/8/layout/bProcess4"/>
-    <dgm:cxn modelId="{9D075F56-2E0B-4171-8175-C4780726D8AC}" type="presOf" srcId="{24235BDA-3456-4472-A5F8-A95C033405D7}" destId="{E6918614-9BE6-4F65-A414-6CA09685AE8E}" srcOrd="0" destOrd="0" presId="urn:microsoft.com/office/officeart/2005/8/layout/bProcess4"/>
-    <dgm:cxn modelId="{1E40BCCB-1E76-43AB-8C55-8CF0256943F5}" type="presOf" srcId="{664F3033-06A2-4F92-8AED-49E5BB070394}" destId="{E2F09AE3-E19A-4DEE-8439-BD770D589E30}" srcOrd="0" destOrd="0" presId="urn:microsoft.com/office/officeart/2005/8/layout/bProcess4"/>
-    <dgm:cxn modelId="{8E260BD3-C9D7-4508-A4AC-F2E5E19A10BF}" type="presOf" srcId="{AC0CA605-AB71-4DDA-8068-AE236D9C9B5B}" destId="{8B6115A6-6B88-4E8C-B7FC-E18F0AFA9CAB}" srcOrd="0" destOrd="0" presId="urn:microsoft.com/office/officeart/2005/8/layout/bProcess4"/>
-    <dgm:cxn modelId="{2AA4AD88-DEE0-4498-BBBA-098B55978CFC}" srcId="{69D9465D-5278-4893-90E4-FC4A404190FF}" destId="{F7C8F245-4D7A-469E-B33C-5443AAA03436}" srcOrd="5" destOrd="0" parTransId="{7004115D-85D0-4855-8403-56165FBD8C5D}" sibTransId="{5925B536-8CDD-4273-9EA0-F3DFE28CFC0A}"/>
-    <dgm:cxn modelId="{A1F85789-4824-48E4-B23D-DB88A8247DF3}" type="presOf" srcId="{A015CC84-CBCB-49E3-9D9B-F66E30B67EB4}" destId="{B3F14615-A4E7-4DA6-B7C0-B9FBB08C1897}" srcOrd="0" destOrd="0" presId="urn:microsoft.com/office/officeart/2005/8/layout/bProcess4"/>
-    <dgm:cxn modelId="{3B0582A2-3B3D-4DCD-93AC-A52D25E70D8E}" type="presOf" srcId="{7B5F1AB1-A56B-4592-899D-948C07E9FCE7}" destId="{4831F056-7731-46BB-8DF6-11307D2F1AEB}" srcOrd="0" destOrd="0" presId="urn:microsoft.com/office/officeart/2005/8/layout/bProcess4"/>
+    <dgm:cxn modelId="{29F4C0D2-AE92-4258-BBFD-9A40C4CCE94E}" type="presOf" srcId="{F7C8F245-4D7A-469E-B33C-5443AAA03436}" destId="{E8D604B9-E6B5-427C-8D2D-C70DBA515C38}" srcOrd="0" destOrd="0" presId="urn:microsoft.com/office/officeart/2005/8/layout/bProcess4"/>
+    <dgm:cxn modelId="{E9634CB2-95B8-4A07-9924-3D7B5FC7A4F5}" type="presOf" srcId="{8E23BBB5-4FFD-4603-8A8B-57D6A8F546C7}" destId="{CF02E96F-6612-4447-A716-AF24BA2BAA38}" srcOrd="0" destOrd="0" presId="urn:microsoft.com/office/officeart/2005/8/layout/bProcess4"/>
     <dgm:cxn modelId="{FF8D777C-18B8-4623-AFA7-00093BE62503}" type="presOf" srcId="{D9BFE88D-86D5-4A4E-9864-049B66CE7B11}" destId="{0111BCDE-244E-4E0C-9F45-971A15B0F1AB}" srcOrd="0" destOrd="0" presId="urn:microsoft.com/office/officeart/2005/8/layout/bProcess4"/>
-    <dgm:cxn modelId="{8995703E-16EE-4A81-9B75-E9CF54A0823C}" type="presOf" srcId="{F9AFC70D-98A9-44D5-AE29-4B77D890DCE5}" destId="{66DF8E1A-5511-4F36-8E47-F7C36D34BC9C}" srcOrd="0" destOrd="0" presId="urn:microsoft.com/office/officeart/2005/8/layout/bProcess4"/>
-    <dgm:cxn modelId="{F8BF60C2-BE39-43A2-9A61-63EC368D0FEB}" type="presOf" srcId="{5925B536-8CDD-4273-9EA0-F3DFE28CFC0A}" destId="{F464CA6F-950B-46FF-9EA4-EAFF6B879406}" srcOrd="0" destOrd="0" presId="urn:microsoft.com/office/officeart/2005/8/layout/bProcess4"/>
-    <dgm:cxn modelId="{1841C2B5-F5D9-4C9D-BC8C-E01099CB1015}" type="presOf" srcId="{730DAA83-5ECA-4C62-B660-9C169A24A198}" destId="{6E02BA24-2FD9-4C78-8700-D63A6D75380B}" srcOrd="0" destOrd="0" presId="urn:microsoft.com/office/officeart/2005/8/layout/bProcess4"/>
-    <dgm:cxn modelId="{E9634CB2-95B8-4A07-9924-3D7B5FC7A4F5}" type="presOf" srcId="{8E23BBB5-4FFD-4603-8A8B-57D6A8F546C7}" destId="{CF02E96F-6612-4447-A716-AF24BA2BAA38}" srcOrd="0" destOrd="0" presId="urn:microsoft.com/office/officeart/2005/8/layout/bProcess4"/>
-    <dgm:cxn modelId="{5D11504B-F891-4E16-81AF-19A4EDD5D894}" srcId="{69D9465D-5278-4893-90E4-FC4A404190FF}" destId="{AC0CA605-AB71-4DDA-8068-AE236D9C9B5B}" srcOrd="3" destOrd="0" parTransId="{8CC74D62-4916-498D-B541-D6C5D6CF2E1B}" sibTransId="{A9DEF564-FDF7-4F00-998C-0108AF2F964C}"/>
-    <dgm:cxn modelId="{35FFAEAE-DC16-4986-AE73-A931A7283792}" srcId="{69D9465D-5278-4893-90E4-FC4A404190FF}" destId="{D9BFE88D-86D5-4A4E-9864-049B66CE7B11}" srcOrd="0" destOrd="0" parTransId="{F9F09A06-4B6D-4FE7-83E2-F8A428C27656}" sibTransId="{8E23BBB5-4FFD-4603-8A8B-57D6A8F546C7}"/>
     <dgm:cxn modelId="{FA601BAF-F0F4-41C1-9E74-90A3437D9622}" srcId="{69D9465D-5278-4893-90E4-FC4A404190FF}" destId="{F6AB84D7-DC04-4772-BBB8-08839E3E3B0E}" srcOrd="1" destOrd="0" parTransId="{F35EFF0E-EA0B-4C57-8CED-83FEB15CD0FD}" sibTransId="{730DAA83-5ECA-4C62-B660-9C169A24A198}"/>
-    <dgm:cxn modelId="{5D51E946-1572-4B32-A99B-B09C2D21BB4F}" srcId="{69D9465D-5278-4893-90E4-FC4A404190FF}" destId="{664F3033-06A2-4F92-8AED-49E5BB070394}" srcOrd="6" destOrd="0" parTransId="{67711992-C237-4337-995F-B75846ACA60F}" sibTransId="{24235BDA-3456-4472-A5F8-A95C033405D7}"/>
-    <dgm:cxn modelId="{1EA91787-343D-46F0-A1A6-0C2FA465220B}" srcId="{69D9465D-5278-4893-90E4-FC4A404190FF}" destId="{C24C36EC-6312-42E6-85F3-613C20BC1376}" srcOrd="2" destOrd="0" parTransId="{05B560A1-CF69-4666-8BB8-D628BE42664F}" sibTransId="{A015CC84-CBCB-49E3-9D9B-F66E30B67EB4}"/>
-    <dgm:cxn modelId="{29F4C0D2-AE92-4258-BBFD-9A40C4CCE94E}" type="presOf" srcId="{F7C8F245-4D7A-469E-B33C-5443AAA03436}" destId="{E8D604B9-E6B5-427C-8D2D-C70DBA515C38}" srcOrd="0" destOrd="0" presId="urn:microsoft.com/office/officeart/2005/8/layout/bProcess4"/>
-    <dgm:cxn modelId="{BE8A410B-AB19-490E-B9A0-CFE7C4AE16AF}" type="presOf" srcId="{F6AB84D7-DC04-4772-BBB8-08839E3E3B0E}" destId="{5D23B8C8-D64B-484E-B55B-BD146A94EBE7}" srcOrd="0" destOrd="0" presId="urn:microsoft.com/office/officeart/2005/8/layout/bProcess4"/>
-    <dgm:cxn modelId="{D00831ED-127B-4987-AF88-67025158E8BF}" type="presOf" srcId="{C24C36EC-6312-42E6-85F3-613C20BC1376}" destId="{DB114CFE-3120-4EDC-8173-69948354E5C4}" srcOrd="0" destOrd="0" presId="urn:microsoft.com/office/officeart/2005/8/layout/bProcess4"/>
-    <dgm:cxn modelId="{134DE985-81C2-41BB-9A8C-B4B56F87F2E8}" srcId="{69D9465D-5278-4893-90E4-FC4A404190FF}" destId="{7B5F1AB1-A56B-4592-899D-948C07E9FCE7}" srcOrd="4" destOrd="0" parTransId="{32E3B1F7-D695-42F6-9E77-4159D9144FAF}" sibTransId="{F9AFC70D-98A9-44D5-AE29-4B77D890DCE5}"/>
-    <dgm:cxn modelId="{8B540F0B-2250-4B5E-BCCE-C3D246BFA6AE}" srcId="{69D9465D-5278-4893-90E4-FC4A404190FF}" destId="{CE70E7C1-00A1-4F5C-B7F2-4DEA0098B5CC}" srcOrd="7" destOrd="0" parTransId="{F234F055-B622-4D52-AFCB-3BA3D3341CFD}" sibTransId="{31DAD7E9-CE7C-41E2-8D30-CCCC16BF810D}"/>
     <dgm:cxn modelId="{14055F04-8140-4BAE-862B-A1242381A950}" type="presOf" srcId="{A9DEF564-FDF7-4F00-998C-0108AF2F964C}" destId="{3C7DEFEB-D965-469F-891F-0F8B1239A0E7}" srcOrd="0" destOrd="0" presId="urn:microsoft.com/office/officeart/2005/8/layout/bProcess4"/>
     <dgm:cxn modelId="{7264B672-CA05-4F31-89F1-FEAC6C34D9E4}" type="presOf" srcId="{69D9465D-5278-4893-90E4-FC4A404190FF}" destId="{F41203AE-3D27-4DFC-B08E-BF6461080D2A}" srcOrd="0" destOrd="0" presId="urn:microsoft.com/office/officeart/2005/8/layout/bProcess4"/>
+    <dgm:cxn modelId="{9F649EF0-789F-4CBD-9BDD-05CA7FD30C2F}" type="presOf" srcId="{31DAD7E9-CE7C-41E2-8D30-CCCC16BF810D}" destId="{04175430-BE2F-45E9-8822-6B0CF5FF9864}" srcOrd="0" destOrd="0" presId="urn:microsoft.com/office/officeart/2005/8/layout/bProcess4"/>
+    <dgm:cxn modelId="{5D11504B-F891-4E16-81AF-19A4EDD5D894}" srcId="{69D9465D-5278-4893-90E4-FC4A404190FF}" destId="{AC0CA605-AB71-4DDA-8068-AE236D9C9B5B}" srcOrd="3" destOrd="0" parTransId="{8CC74D62-4916-498D-B541-D6C5D6CF2E1B}" sibTransId="{A9DEF564-FDF7-4F00-998C-0108AF2F964C}"/>
+    <dgm:cxn modelId="{8E260BD3-C9D7-4508-A4AC-F2E5E19A10BF}" type="presOf" srcId="{AC0CA605-AB71-4DDA-8068-AE236D9C9B5B}" destId="{8B6115A6-6B88-4E8C-B7FC-E18F0AFA9CAB}" srcOrd="0" destOrd="0" presId="urn:microsoft.com/office/officeart/2005/8/layout/bProcess4"/>
+    <dgm:cxn modelId="{D00831ED-127B-4987-AF88-67025158E8BF}" type="presOf" srcId="{C24C36EC-6312-42E6-85F3-613C20BC1376}" destId="{DB114CFE-3120-4EDC-8173-69948354E5C4}" srcOrd="0" destOrd="0" presId="urn:microsoft.com/office/officeart/2005/8/layout/bProcess4"/>
+    <dgm:cxn modelId="{9D075F56-2E0B-4171-8175-C4780726D8AC}" type="presOf" srcId="{24235BDA-3456-4472-A5F8-A95C033405D7}" destId="{E6918614-9BE6-4F65-A414-6CA09685AE8E}" srcOrd="0" destOrd="0" presId="urn:microsoft.com/office/officeart/2005/8/layout/bProcess4"/>
+    <dgm:cxn modelId="{8B540F0B-2250-4B5E-BCCE-C3D246BFA6AE}" srcId="{69D9465D-5278-4893-90E4-FC4A404190FF}" destId="{CE70E7C1-00A1-4F5C-B7F2-4DEA0098B5CC}" srcOrd="7" destOrd="0" parTransId="{F234F055-B622-4D52-AFCB-3BA3D3341CFD}" sibTransId="{31DAD7E9-CE7C-41E2-8D30-CCCC16BF810D}"/>
+    <dgm:cxn modelId="{1841C2B5-F5D9-4C9D-BC8C-E01099CB1015}" type="presOf" srcId="{730DAA83-5ECA-4C62-B660-9C169A24A198}" destId="{6E02BA24-2FD9-4C78-8700-D63A6D75380B}" srcOrd="0" destOrd="0" presId="urn:microsoft.com/office/officeart/2005/8/layout/bProcess4"/>
+    <dgm:cxn modelId="{3B0582A2-3B3D-4DCD-93AC-A52D25E70D8E}" type="presOf" srcId="{7B5F1AB1-A56B-4592-899D-948C07E9FCE7}" destId="{4831F056-7731-46BB-8DF6-11307D2F1AEB}" srcOrd="0" destOrd="0" presId="urn:microsoft.com/office/officeart/2005/8/layout/bProcess4"/>
+    <dgm:cxn modelId="{1EA91787-343D-46F0-A1A6-0C2FA465220B}" srcId="{69D9465D-5278-4893-90E4-FC4A404190FF}" destId="{C24C36EC-6312-42E6-85F3-613C20BC1376}" srcOrd="2" destOrd="0" parTransId="{05B560A1-CF69-4666-8BB8-D628BE42664F}" sibTransId="{A015CC84-CBCB-49E3-9D9B-F66E30B67EB4}"/>
+    <dgm:cxn modelId="{5D51E946-1572-4B32-A99B-B09C2D21BB4F}" srcId="{69D9465D-5278-4893-90E4-FC4A404190FF}" destId="{664F3033-06A2-4F92-8AED-49E5BB070394}" srcOrd="6" destOrd="0" parTransId="{67711992-C237-4337-995F-B75846ACA60F}" sibTransId="{24235BDA-3456-4472-A5F8-A95C033405D7}"/>
+    <dgm:cxn modelId="{F8BF60C2-BE39-43A2-9A61-63EC368D0FEB}" type="presOf" srcId="{5925B536-8CDD-4273-9EA0-F3DFE28CFC0A}" destId="{F464CA6F-950B-46FF-9EA4-EAFF6B879406}" srcOrd="0" destOrd="0" presId="urn:microsoft.com/office/officeart/2005/8/layout/bProcess4"/>
+    <dgm:cxn modelId="{361F53CB-5A29-4DAB-A291-D994BF66FC9F}" type="presOf" srcId="{F2809BA3-C65E-4889-8F5A-FF553707154C}" destId="{186C2779-A3E3-43E9-AE0E-189DFF42734F}" srcOrd="0" destOrd="0" presId="urn:microsoft.com/office/officeart/2005/8/layout/bProcess4"/>
+    <dgm:cxn modelId="{BE8A410B-AB19-490E-B9A0-CFE7C4AE16AF}" type="presOf" srcId="{F6AB84D7-DC04-4772-BBB8-08839E3E3B0E}" destId="{5D23B8C8-D64B-484E-B55B-BD146A94EBE7}" srcOrd="0" destOrd="0" presId="urn:microsoft.com/office/officeart/2005/8/layout/bProcess4"/>
+    <dgm:cxn modelId="{A1F85789-4824-48E4-B23D-DB88A8247DF3}" type="presOf" srcId="{A015CC84-CBCB-49E3-9D9B-F66E30B67EB4}" destId="{B3F14615-A4E7-4DA6-B7C0-B9FBB08C1897}" srcOrd="0" destOrd="0" presId="urn:microsoft.com/office/officeart/2005/8/layout/bProcess4"/>
+    <dgm:cxn modelId="{134DE985-81C2-41BB-9A8C-B4B56F87F2E8}" srcId="{69D9465D-5278-4893-90E4-FC4A404190FF}" destId="{7B5F1AB1-A56B-4592-899D-948C07E9FCE7}" srcOrd="4" destOrd="0" parTransId="{32E3B1F7-D695-42F6-9E77-4159D9144FAF}" sibTransId="{F9AFC70D-98A9-44D5-AE29-4B77D890DCE5}"/>
+    <dgm:cxn modelId="{35FFAEAE-DC16-4986-AE73-A931A7283792}" srcId="{69D9465D-5278-4893-90E4-FC4A404190FF}" destId="{D9BFE88D-86D5-4A4E-9864-049B66CE7B11}" srcOrd="0" destOrd="0" parTransId="{F9F09A06-4B6D-4FE7-83E2-F8A428C27656}" sibTransId="{8E23BBB5-4FFD-4603-8A8B-57D6A8F546C7}"/>
+    <dgm:cxn modelId="{8995703E-16EE-4A81-9B75-E9CF54A0823C}" type="presOf" srcId="{F9AFC70D-98A9-44D5-AE29-4B77D890DCE5}" destId="{66DF8E1A-5511-4F36-8E47-F7C36D34BC9C}" srcOrd="0" destOrd="0" presId="urn:microsoft.com/office/officeart/2005/8/layout/bProcess4"/>
+    <dgm:cxn modelId="{1E40BCCB-1E76-43AB-8C55-8CF0256943F5}" type="presOf" srcId="{664F3033-06A2-4F92-8AED-49E5BB070394}" destId="{E2F09AE3-E19A-4DEE-8439-BD770D589E30}" srcOrd="0" destOrd="0" presId="urn:microsoft.com/office/officeart/2005/8/layout/bProcess4"/>
+    <dgm:cxn modelId="{2AA4AD88-DEE0-4498-BBBA-098B55978CFC}" srcId="{69D9465D-5278-4893-90E4-FC4A404190FF}" destId="{F7C8F245-4D7A-469E-B33C-5443AAA03436}" srcOrd="5" destOrd="0" parTransId="{7004115D-85D0-4855-8403-56165FBD8C5D}" sibTransId="{5925B536-8CDD-4273-9EA0-F3DFE28CFC0A}"/>
+    <dgm:cxn modelId="{B3B9CAB9-2667-4815-A245-E1FC2B28DE7D}" srcId="{69D9465D-5278-4893-90E4-FC4A404190FF}" destId="{F2809BA3-C65E-4889-8F5A-FF553707154C}" srcOrd="8" destOrd="0" parTransId="{FC354316-0A86-49FE-B980-2848910173B1}" sibTransId="{342EE362-FB63-4B4A-A4F8-F7864A82DA6F}"/>
     <dgm:cxn modelId="{CA5AFF5C-582E-4958-AD8B-4C61AA2F41AF}" type="presParOf" srcId="{F41203AE-3D27-4DFC-B08E-BF6461080D2A}" destId="{9B9AB0DF-1520-478A-9272-0D99B8FD5BC6}" srcOrd="0" destOrd="0" presId="urn:microsoft.com/office/officeart/2005/8/layout/bProcess4"/>
     <dgm:cxn modelId="{15240594-B4C4-415C-9491-A30D89E98AC6}" type="presParOf" srcId="{9B9AB0DF-1520-478A-9272-0D99B8FD5BC6}" destId="{DC903BB0-E430-4A21-B00B-32F4402C2D32}" srcOrd="0" destOrd="0" presId="urn:microsoft.com/office/officeart/2005/8/layout/bProcess4"/>
     <dgm:cxn modelId="{ED9933BF-C8EF-44BB-AE9A-1D88F0BDBBB7}" type="presParOf" srcId="{9B9AB0DF-1520-478A-9272-0D99B8FD5BC6}" destId="{0111BCDE-244E-4E0C-9F45-971A15B0F1AB}" srcOrd="1" destOrd="0" presId="urn:microsoft.com/office/officeart/2005/8/layout/bProcess4"/>
@@ -1477,6 +1614,10 @@
     <dgm:cxn modelId="{95C13A71-38F2-484B-BBA1-CC4647C4D62F}" type="presParOf" srcId="{F41203AE-3D27-4DFC-B08E-BF6461080D2A}" destId="{1B166470-D870-4BDA-A5DA-F226145161FC}" srcOrd="14" destOrd="0" presId="urn:microsoft.com/office/officeart/2005/8/layout/bProcess4"/>
     <dgm:cxn modelId="{3979E22D-E500-4D43-8DAE-FE091A357B39}" type="presParOf" srcId="{1B166470-D870-4BDA-A5DA-F226145161FC}" destId="{1B7E5009-3647-41FD-B39E-8D4E96783D89}" srcOrd="0" destOrd="0" presId="urn:microsoft.com/office/officeart/2005/8/layout/bProcess4"/>
     <dgm:cxn modelId="{05955F1B-8852-4592-991E-90E7D5C7A8CD}" type="presParOf" srcId="{1B166470-D870-4BDA-A5DA-F226145161FC}" destId="{6DEDC417-7D81-4270-BD28-D9247A7A935F}" srcOrd="1" destOrd="0" presId="urn:microsoft.com/office/officeart/2005/8/layout/bProcess4"/>
+    <dgm:cxn modelId="{0F869F07-825D-4BC8-A03C-7E555F6FFB8A}" type="presParOf" srcId="{F41203AE-3D27-4DFC-B08E-BF6461080D2A}" destId="{04175430-BE2F-45E9-8822-6B0CF5FF9864}" srcOrd="15" destOrd="0" presId="urn:microsoft.com/office/officeart/2005/8/layout/bProcess4"/>
+    <dgm:cxn modelId="{42A3066A-C788-40F7-ACAE-D83BC010CECC}" type="presParOf" srcId="{F41203AE-3D27-4DFC-B08E-BF6461080D2A}" destId="{0B625B18-E227-42A1-8BD7-FBC109D3EA62}" srcOrd="16" destOrd="0" presId="urn:microsoft.com/office/officeart/2005/8/layout/bProcess4"/>
+    <dgm:cxn modelId="{33F53840-24F4-40AF-A172-7A4EE0076046}" type="presParOf" srcId="{0B625B18-E227-42A1-8BD7-FBC109D3EA62}" destId="{57704B1B-3CE8-4FEB-A14B-A42A5666C53B}" srcOrd="0" destOrd="0" presId="urn:microsoft.com/office/officeart/2005/8/layout/bProcess4"/>
+    <dgm:cxn modelId="{CCF3E0E5-7344-40B3-A311-3A7A66B91D23}" type="presParOf" srcId="{0B625B18-E227-42A1-8BD7-FBC109D3EA62}" destId="{186C2779-A3E3-43E9-AE0E-189DFF42734F}" srcOrd="1" destOrd="0" presId="urn:microsoft.com/office/officeart/2005/8/layout/bProcess4"/>
   </dgm:cxnLst>
   <dgm:bg/>
   <dgm:whole/>
@@ -1632,9 +1773,9 @@
         </a:prstGeom>
         <a:solidFill>
           <a:schemeClr val="accent5">
-            <a:hueOff val="-1225557"/>
-            <a:satOff val="-1705"/>
-            <a:lumOff val="-654"/>
+            <a:hueOff val="-1050478"/>
+            <a:satOff val="-1461"/>
+            <a:lumOff val="-560"/>
             <a:alphaOff val="0"/>
           </a:schemeClr>
         </a:solidFill>
@@ -1675,9 +1816,9 @@
         </a:prstGeom>
         <a:solidFill>
           <a:schemeClr val="accent5">
-            <a:hueOff val="-1050478"/>
-            <a:satOff val="-1461"/>
-            <a:lumOff val="-560"/>
+            <a:hueOff val="-919168"/>
+            <a:satOff val="-1278"/>
+            <a:lumOff val="-490"/>
             <a:alphaOff val="0"/>
           </a:schemeClr>
         </a:solidFill>
@@ -1753,9 +1894,9 @@
         </a:prstGeom>
         <a:solidFill>
           <a:schemeClr val="accent5">
-            <a:hueOff val="-2451115"/>
-            <a:satOff val="-3409"/>
-            <a:lumOff val="-1307"/>
+            <a:hueOff val="-2100956"/>
+            <a:satOff val="-2922"/>
+            <a:lumOff val="-1121"/>
             <a:alphaOff val="0"/>
           </a:schemeClr>
         </a:solidFill>
@@ -1796,9 +1937,9 @@
         </a:prstGeom>
         <a:solidFill>
           <a:schemeClr val="accent5">
-            <a:hueOff val="-2100956"/>
-            <a:satOff val="-2922"/>
-            <a:lumOff val="-1121"/>
+            <a:hueOff val="-1838336"/>
+            <a:satOff val="-2557"/>
+            <a:lumOff val="-981"/>
             <a:alphaOff val="0"/>
           </a:schemeClr>
         </a:solidFill>
@@ -1874,9 +2015,9 @@
         </a:prstGeom>
         <a:solidFill>
           <a:schemeClr val="accent5">
-            <a:hueOff val="-3676672"/>
-            <a:satOff val="-5114"/>
-            <a:lumOff val="-1961"/>
+            <a:hueOff val="-3151433"/>
+            <a:satOff val="-4383"/>
+            <a:lumOff val="-1681"/>
             <a:alphaOff val="0"/>
           </a:schemeClr>
         </a:solidFill>
@@ -1917,9 +2058,9 @@
         </a:prstGeom>
         <a:solidFill>
           <a:schemeClr val="accent5">
-            <a:hueOff val="-3151433"/>
-            <a:satOff val="-4383"/>
-            <a:lumOff val="-1681"/>
+            <a:hueOff val="-2757504"/>
+            <a:satOff val="-3835"/>
+            <a:lumOff val="-1471"/>
             <a:alphaOff val="0"/>
           </a:schemeClr>
         </a:solidFill>
@@ -1995,9 +2136,9 @@
         </a:prstGeom>
         <a:solidFill>
           <a:schemeClr val="accent5">
-            <a:hueOff val="-4902230"/>
-            <a:satOff val="-6819"/>
-            <a:lumOff val="-2615"/>
+            <a:hueOff val="-4201911"/>
+            <a:satOff val="-5845"/>
+            <a:lumOff val="-2241"/>
             <a:alphaOff val="0"/>
           </a:schemeClr>
         </a:solidFill>
@@ -2038,9 +2179,130 @@
         </a:prstGeom>
         <a:solidFill>
           <a:schemeClr val="accent5">
-            <a:hueOff val="-4201911"/>
-            <a:satOff val="-5845"/>
-            <a:lumOff val="-2241"/>
+            <a:hueOff val="-3676672"/>
+            <a:satOff val="-5114"/>
+            <a:lumOff val="-1961"/>
+            <a:alphaOff val="0"/>
+          </a:schemeClr>
+        </a:solidFill>
+        <a:ln w="12700" cap="flat" cmpd="sng" algn="ctr">
+          <a:solidFill>
+            <a:schemeClr val="lt1">
+              <a:hueOff val="0"/>
+              <a:satOff val="0"/>
+              <a:lumOff val="0"/>
+              <a:alphaOff val="0"/>
+            </a:schemeClr>
+          </a:solidFill>
+          <a:prstDash val="solid"/>
+          <a:miter lim="800000"/>
+        </a:ln>
+        <a:effectLst/>
+      </dsp:spPr>
+      <dsp:style>
+        <a:lnRef idx="2">
+          <a:scrgbClr r="0" g="0" b="0"/>
+        </a:lnRef>
+        <a:fillRef idx="1">
+          <a:scrgbClr r="0" g="0" b="0"/>
+        </a:fillRef>
+        <a:effectRef idx="0">
+          <a:scrgbClr r="0" g="0" b="0"/>
+        </a:effectRef>
+        <a:fontRef idx="minor">
+          <a:schemeClr val="lt1"/>
+        </a:fontRef>
+      </dsp:style>
+      <dsp:txBody>
+        <a:bodyPr spcFirstLastPara="0" vert="horz" wrap="square" lIns="30480" tIns="30480" rIns="30480" bIns="30480" numCol="1" spcCol="1270" anchor="ctr" anchorCtr="0">
+          <a:noAutofit/>
+        </a:bodyPr>
+        <a:lstStyle/>
+        <a:p>
+          <a:pPr lvl="0" algn="ctr" defTabSz="355600">
+            <a:lnSpc>
+              <a:spcPct val="90000"/>
+            </a:lnSpc>
+            <a:spcBef>
+              <a:spcPct val="0"/>
+            </a:spcBef>
+            <a:spcAft>
+              <a:spcPct val="35000"/>
+            </a:spcAft>
+          </a:pPr>
+          <a:r>
+            <a:rPr lang="en-ZA" sz="800" kern="1200" smtClean="0"/>
+            <a:t>Weightings are applied to the different readings from the sensors (because acceleration through a turn is worse than acceleration while moving forward, and acceleration upwards is even worse!)</a:t>
+          </a:r>
+          <a:endParaRPr lang="en-ZA" sz="800" kern="1200" dirty="0"/>
+        </a:p>
+      </dsp:txBody>
+      <dsp:txXfrm>
+        <a:off x="2012670" y="1400234"/>
+        <a:ext cx="1439090" cy="842485"/>
+      </dsp:txXfrm>
+    </dsp:sp>
+    <dsp:sp modelId="{F464CA6F-950B-46FF-9EA4-EAFF6B879406}">
+      <dsp:nvSpPr>
+        <dsp:cNvPr id="0" name=""/>
+        <dsp:cNvSpPr/>
+      </dsp:nvSpPr>
+      <dsp:spPr>
+        <a:xfrm>
+          <a:off x="2294588" y="409453"/>
+          <a:ext cx="1973885" cy="134236"/>
+        </a:xfrm>
+        <a:prstGeom prst="rect">
+          <a:avLst/>
+        </a:prstGeom>
+        <a:solidFill>
+          <a:schemeClr val="accent5">
+            <a:hueOff val="-5252389"/>
+            <a:satOff val="-7306"/>
+            <a:lumOff val="-2801"/>
+            <a:alphaOff val="0"/>
+          </a:schemeClr>
+        </a:solidFill>
+        <a:ln>
+          <a:noFill/>
+        </a:ln>
+        <a:effectLst/>
+      </dsp:spPr>
+      <dsp:style>
+        <a:lnRef idx="0">
+          <a:scrgbClr r="0" g="0" b="0"/>
+        </a:lnRef>
+        <a:fillRef idx="1">
+          <a:scrgbClr r="0" g="0" b="0"/>
+        </a:fillRef>
+        <a:effectRef idx="0">
+          <a:scrgbClr r="0" g="0" b="0"/>
+        </a:effectRef>
+        <a:fontRef idx="minor">
+          <a:schemeClr val="lt1"/>
+        </a:fontRef>
+      </dsp:style>
+    </dsp:sp>
+    <dsp:sp modelId="{E8D604B9-E6B5-427C-8D2D-C70DBA515C38}">
+      <dsp:nvSpPr>
+        <dsp:cNvPr id="0" name=""/>
+        <dsp:cNvSpPr/>
+      </dsp:nvSpPr>
+      <dsp:spPr>
+        <a:xfrm>
+          <a:off x="1986459" y="255389"/>
+          <a:ext cx="1491512" cy="894907"/>
+        </a:xfrm>
+        <a:prstGeom prst="roundRect">
+          <a:avLst>
+            <a:gd name="adj" fmla="val 10000"/>
+          </a:avLst>
+        </a:prstGeom>
+        <a:solidFill>
+          <a:schemeClr val="accent5">
+            <a:hueOff val="-4595840"/>
+            <a:satOff val="-6392"/>
+            <a:lumOff val="-2451"/>
             <a:alphaOff val="0"/>
           </a:schemeClr>
         </a:solidFill>
@@ -2097,28 +2359,28 @@
         </a:p>
       </dsp:txBody>
       <dsp:txXfrm>
-        <a:off x="2012670" y="1400234"/>
+        <a:off x="2012670" y="281600"/>
         <a:ext cx="1439090" cy="842485"/>
       </dsp:txXfrm>
     </dsp:sp>
-    <dsp:sp modelId="{F464CA6F-950B-46FF-9EA4-EAFF6B879406}">
+    <dsp:sp modelId="{E6918614-9BE6-4F65-A414-6CA09685AE8E}">
       <dsp:nvSpPr>
         <dsp:cNvPr id="0" name=""/>
         <dsp:cNvSpPr/>
       </dsp:nvSpPr>
       <dsp:spPr>
-        <a:xfrm>
-          <a:off x="2294588" y="409453"/>
-          <a:ext cx="1973885" cy="134236"/>
+        <a:xfrm rot="5400000">
+          <a:off x="3718982" y="968770"/>
+          <a:ext cx="1108808" cy="134236"/>
         </a:xfrm>
         <a:prstGeom prst="rect">
           <a:avLst/>
         </a:prstGeom>
         <a:solidFill>
           <a:schemeClr val="accent5">
-            <a:hueOff val="-6127787"/>
-            <a:satOff val="-8523"/>
-            <a:lumOff val="-3268"/>
+            <a:hueOff val="-6302867"/>
+            <a:satOff val="-8767"/>
+            <a:lumOff val="-3362"/>
             <a:alphaOff val="0"/>
           </a:schemeClr>
         </a:solidFill>
@@ -2142,14 +2404,14 @@
         </a:fontRef>
       </dsp:style>
     </dsp:sp>
-    <dsp:sp modelId="{E8D604B9-E6B5-427C-8D2D-C70DBA515C38}">
+    <dsp:sp modelId="{E2F09AE3-E19A-4DEE-8439-BD770D589E30}">
       <dsp:nvSpPr>
         <dsp:cNvPr id="0" name=""/>
         <dsp:cNvSpPr/>
       </dsp:nvSpPr>
       <dsp:spPr>
         <a:xfrm>
-          <a:off x="1986459" y="255389"/>
+          <a:off x="3970171" y="255389"/>
           <a:ext cx="1491512" cy="894907"/>
         </a:xfrm>
         <a:prstGeom prst="roundRect">
@@ -2159,9 +2421,9 @@
         </a:prstGeom>
         <a:solidFill>
           <a:schemeClr val="accent5">
-            <a:hueOff val="-5252389"/>
-            <a:satOff val="-7306"/>
-            <a:lumOff val="-2801"/>
+            <a:hueOff val="-5515009"/>
+            <a:satOff val="-7671"/>
+            <a:lumOff val="-2942"/>
             <a:alphaOff val="0"/>
           </a:schemeClr>
         </a:solidFill>
@@ -2231,18 +2493,18 @@
         </a:p>
       </dsp:txBody>
       <dsp:txXfrm>
-        <a:off x="2012670" y="281600"/>
+        <a:off x="3996382" y="281600"/>
         <a:ext cx="1439090" cy="842485"/>
       </dsp:txXfrm>
     </dsp:sp>
-    <dsp:sp modelId="{E6918614-9BE6-4F65-A414-6CA09685AE8E}">
+    <dsp:sp modelId="{04175430-BE2F-45E9-8822-6B0CF5FF9864}">
       <dsp:nvSpPr>
         <dsp:cNvPr id="0" name=""/>
         <dsp:cNvSpPr/>
       </dsp:nvSpPr>
       <dsp:spPr>
         <a:xfrm rot="5400000">
-          <a:off x="3718982" y="968770"/>
+          <a:off x="3718982" y="2087405"/>
           <a:ext cx="1108808" cy="134236"/>
         </a:xfrm>
         <a:prstGeom prst="rect">
@@ -2276,14 +2538,14 @@
         </a:fontRef>
       </dsp:style>
     </dsp:sp>
-    <dsp:sp modelId="{E2F09AE3-E19A-4DEE-8439-BD770D589E30}">
+    <dsp:sp modelId="{6DEDC417-7D81-4270-BD28-D9247A7A935F}">
       <dsp:nvSpPr>
         <dsp:cNvPr id="0" name=""/>
         <dsp:cNvSpPr/>
       </dsp:nvSpPr>
       <dsp:spPr>
         <a:xfrm>
-          <a:off x="3970171" y="255389"/>
+          <a:off x="3970171" y="1374023"/>
           <a:ext cx="1491512" cy="894907"/>
         </a:xfrm>
         <a:prstGeom prst="roundRect">
@@ -2293,9 +2555,9 @@
         </a:prstGeom>
         <a:solidFill>
           <a:schemeClr val="accent5">
-            <a:hueOff val="-6302867"/>
-            <a:satOff val="-8767"/>
-            <a:lumOff val="-3362"/>
+            <a:hueOff val="-6434176"/>
+            <a:satOff val="-8949"/>
+            <a:lumOff val="-3432"/>
             <a:alphaOff val="0"/>
           </a:schemeClr>
         </a:solidFill>
@@ -2352,18 +2614,18 @@
         </a:p>
       </dsp:txBody>
       <dsp:txXfrm>
-        <a:off x="3996382" y="281600"/>
+        <a:off x="3996382" y="1400234"/>
         <a:ext cx="1439090" cy="842485"/>
       </dsp:txXfrm>
     </dsp:sp>
-    <dsp:sp modelId="{6DEDC417-7D81-4270-BD28-D9247A7A935F}">
+    <dsp:sp modelId="{186C2779-A3E3-43E9-AE0E-189DFF42734F}">
       <dsp:nvSpPr>
         <dsp:cNvPr id="0" name=""/>
         <dsp:cNvSpPr/>
       </dsp:nvSpPr>
       <dsp:spPr>
         <a:xfrm>
-          <a:off x="3970171" y="1374023"/>
+          <a:off x="3970171" y="2492658"/>
           <a:ext cx="1491512" cy="894907"/>
         </a:xfrm>
         <a:prstGeom prst="roundRect">
@@ -2432,7 +2694,7 @@
         </a:p>
       </dsp:txBody>
       <dsp:txXfrm>
-        <a:off x="3996382" y="1400234"/>
+        <a:off x="3996382" y="2518869"/>
         <a:ext cx="1439090" cy="842485"/>
       </dsp:txXfrm>
     </dsp:sp>
@@ -6876,15 +7138,15 @@
         </p:spPr>
         <p:style>
           <a:lnRef idx="2">
-            <a:schemeClr val="accent1">
+            <a:schemeClr val="accent4">
               <a:shade val="50000"/>
             </a:schemeClr>
           </a:lnRef>
           <a:fillRef idx="1">
-            <a:schemeClr val="accent1"/>
+            <a:schemeClr val="accent4"/>
           </a:fillRef>
           <a:effectRef idx="0">
-            <a:schemeClr val="accent1"/>
+            <a:schemeClr val="accent4"/>
           </a:effectRef>
           <a:fontRef idx="minor">
             <a:schemeClr val="lt1"/>
@@ -6897,22 +7159,37 @@
             <a:pPr algn="ctr"/>
             <a:r>
               <a:rPr lang="en-ZA" dirty="0" smtClean="0"/>
-              <a:t>What is an algorithm?</a:t>
-            </a:r>
+              <a:t>How does it work?</a:t>
+            </a:r>
+            <a:endParaRPr lang="en-ZA" dirty="0" smtClean="0"/>
           </a:p>
           <a:p>
             <a:pPr algn="just"/>
             <a:r>
-              <a:rPr lang="en-ZA" sz="1200" dirty="0" smtClean="0">
+              <a:rPr lang="en-ZA" sz="1050" dirty="0" smtClean="0">
                 <a:solidFill>
-                  <a:srgbClr val="002060"/>
+                  <a:schemeClr val="accent2">
+                    <a:lumMod val="75000"/>
+                  </a:schemeClr>
                 </a:solidFill>
               </a:rPr>
-              <a:t>Algorithm is a process and set of rules to be followed in calculations or other problem-solving operations, especially by a computer.</a:t>
+              <a:t>Using the data gathered from sensors built into all modern android devices we are able to determine a person’s acceleration in the x, y</a:t>
+            </a:r>
+            <a:r>
+              <a:rPr lang="en-ZA" sz="1050" dirty="0" smtClean="0">
+                <a:solidFill>
+                  <a:schemeClr val="accent2">
+                    <a:lumMod val="75000"/>
+                  </a:schemeClr>
+                </a:solidFill>
+              </a:rPr>
+              <a:t>, and z axes, as well as many other important facts. By taking samples from these sensors at regular intervals (currently we have found that 1/3 of a second works well), we are able to estimate the manner in which an individual has been driving.</a:t>
             </a:r>
             <a:endParaRPr lang="en-ZA" sz="1200" dirty="0">
               <a:solidFill>
-                <a:srgbClr val="002060"/>
+                <a:schemeClr val="accent2">
+                  <a:lumMod val="75000"/>
+                </a:schemeClr>
               </a:solidFill>
             </a:endParaRPr>
           </a:p>
@@ -6972,6 +7249,7 @@
           <a:prstGeom prst="roundRect">
             <a:avLst/>
           </a:prstGeom>
+          <a:noFill/>
         </p:spPr>
         <p:style>
           <a:lnRef idx="2">
@@ -7346,13 +7624,13 @@
           <p:nvPr>
             <p:extLst>
               <p:ext uri="{D42A27DB-BD31-4B8C-83A1-F6EECF244321}">
-                <p14:modId xmlns:p14="http://schemas.microsoft.com/office/powerpoint/2010/main" val="1884875832"/>
+                <p14:modId xmlns:p14="http://schemas.microsoft.com/office/powerpoint/2010/main" val="922058125"/>
               </p:ext>
             </p:extLst>
           </p:nvPr>
         </p:nvGraphicFramePr>
         <p:xfrm>
-          <a:off x="4548619" y="2983430"/>
+          <a:off x="4478794" y="2615902"/>
           <a:ext cx="5464432" cy="3642955"/>
         </p:xfrm>
         <a:graphic>
@@ -7383,8 +7661,8 @@
           </a:stretch>
         </p:blipFill>
         <p:spPr bwMode="auto">
-          <a:xfrm rot="20116765">
-            <a:off x="10210446" y="2920055"/>
+          <a:xfrm rot="1512699">
+            <a:off x="10379578" y="4462452"/>
             <a:ext cx="1023394" cy="596259"/>
           </a:xfrm>
           <a:prstGeom prst="rect">
@@ -7422,15 +7700,7 @@
               <a:srgbClr val="969696"/>
             </a:contourClr>
           </a:sp3d>
-          <a:extLst>
-            <a:ext uri="{909E8E84-426E-40DD-AFC4-6F175D3DCCD1}">
-              <a14:hiddenFill xmlns:a14="http://schemas.microsoft.com/office/drawing/2010/main">
-                <a:solidFill>
-                  <a:srgbClr val="FFFFFF"/>
-                </a:solidFill>
-              </a14:hiddenFill>
-            </a:ext>
-          </a:extLst>
+          <a:extLst/>
         </p:spPr>
       </p:pic>
       <p:pic>
@@ -7455,8 +7725,8 @@
           </a:stretch>
         </p:blipFill>
         <p:spPr bwMode="auto">
-          <a:xfrm rot="2460477">
-            <a:off x="7757007" y="2393336"/>
+          <a:xfrm rot="20053135">
+            <a:off x="10350539" y="2780905"/>
             <a:ext cx="895350" cy="596900"/>
           </a:xfrm>
           <a:prstGeom prst="rect">
@@ -7494,15 +7764,7 @@
               <a:srgbClr val="969696"/>
             </a:contourClr>
           </a:sp3d>
-          <a:extLst>
-            <a:ext uri="{909E8E84-426E-40DD-AFC4-6F175D3DCCD1}">
-              <a14:hiddenFill xmlns:a14="http://schemas.microsoft.com/office/drawing/2010/main">
-                <a:solidFill>
-                  <a:srgbClr val="FFFFFF"/>
-                </a:solidFill>
-              </a14:hiddenFill>
-            </a:ext>
-          </a:extLst>
+          <a:extLst/>
         </p:spPr>
       </p:pic>
       <p:sp>
@@ -7512,9 +7774,9 @@
           <p:nvPr/>
         </p:nvSpPr>
         <p:spPr>
-          <a:xfrm rot="7706075">
-            <a:off x="7446145" y="3089732"/>
-            <a:ext cx="542505" cy="45719"/>
+          <a:xfrm rot="9850399">
+            <a:off x="9897991" y="3418084"/>
+            <a:ext cx="453035" cy="64161"/>
           </a:xfrm>
           <a:prstGeom prst="rightArrow">
             <a:avLst/>
@@ -7550,8 +7812,8 @@
           <p:nvPr/>
         </p:nvSpPr>
         <p:spPr>
-          <a:xfrm rot="8654680">
-            <a:off x="9877787" y="3594751"/>
+          <a:xfrm rot="12134015">
+            <a:off x="9912430" y="4486839"/>
             <a:ext cx="399939" cy="63266"/>
           </a:xfrm>
           <a:prstGeom prst="rightArrow">
@@ -7603,8 +7865,8 @@
           </a:stretch>
         </p:blipFill>
         <p:spPr bwMode="auto">
-          <a:xfrm rot="18806992">
-            <a:off x="7921867" y="6064897"/>
+          <a:xfrm rot="19575918">
+            <a:off x="7084985" y="6206088"/>
             <a:ext cx="1217425" cy="382532"/>
           </a:xfrm>
           <a:prstGeom prst="rect">
@@ -7629,9 +7891,9 @@
           <p:nvPr/>
         </p:nvSpPr>
         <p:spPr>
-          <a:xfrm rot="12546029">
-            <a:off x="7948373" y="5941317"/>
-            <a:ext cx="657574" cy="68981"/>
+          <a:xfrm rot="14055460" flipV="1">
+            <a:off x="7287296" y="6112824"/>
+            <a:ext cx="335816" cy="45719"/>
           </a:xfrm>
           <a:prstGeom prst="rightArrow">
             <a:avLst/>
@@ -7668,7 +7930,7 @@
         </p:nvSpPr>
         <p:spPr>
           <a:xfrm>
-            <a:off x="10335120" y="6086474"/>
+            <a:off x="10398645" y="6195375"/>
             <a:ext cx="1708600" cy="601889"/>
           </a:xfrm>
           <a:prstGeom prst="round2DiagRect">

</xml_diff>

<commit_message>
Changes to unit tests - Algorithm
</commit_message>
<xml_diff>
--- a/documentation/AlgorithmPoster.pptx
+++ b/documentation/AlgorithmPoster.pptx
@@ -2,12 +2,12 @@
 <file path=ppt/presentation.xml><?xml version="1.0" encoding="utf-8"?>
 <p:presentation xmlns:a="http://schemas.openxmlformats.org/drawingml/2006/main" xmlns:r="http://schemas.openxmlformats.org/officeDocument/2006/relationships" xmlns:p="http://schemas.openxmlformats.org/presentationml/2006/main" saveSubsetFonts="1">
   <p:sldMasterIdLst>
-    <p:sldMasterId id="2147483660" r:id="rId1"/>
+    <p:sldMasterId id="2147483678" r:id="rId1"/>
   </p:sldMasterIdLst>
   <p:sldIdLst>
     <p:sldId id="256" r:id="rId2"/>
   </p:sldIdLst>
-  <p:sldSz cx="12801600" cy="9601200" type="A3"/>
+  <p:sldSz cx="17068800" cy="9601200"/>
   <p:notesSz cx="6858000" cy="9144000"/>
   <p:defaultTextStyle>
     <a:defPPr>
@@ -1592,33 +1592,33 @@
     </dgm:pt>
   </dgm:ptLst>
   <dgm:cxnLst>
+    <dgm:cxn modelId="{FA601BAF-F0F4-41C1-9E74-90A3437D9622}" srcId="{69D9465D-5278-4893-90E4-FC4A404190FF}" destId="{F6AB84D7-DC04-4772-BBB8-08839E3E3B0E}" srcOrd="1" destOrd="0" parTransId="{F35EFF0E-EA0B-4C57-8CED-83FEB15CD0FD}" sibTransId="{730DAA83-5ECA-4C62-B660-9C169A24A198}"/>
+    <dgm:cxn modelId="{9D075F56-2E0B-4171-8175-C4780726D8AC}" type="presOf" srcId="{24235BDA-3456-4472-A5F8-A95C033405D7}" destId="{E6918614-9BE6-4F65-A414-6CA09685AE8E}" srcOrd="0" destOrd="0" presId="urn:microsoft.com/office/officeart/2005/8/layout/bProcess4"/>
+    <dgm:cxn modelId="{1EA91787-343D-46F0-A1A6-0C2FA465220B}" srcId="{69D9465D-5278-4893-90E4-FC4A404190FF}" destId="{C24C36EC-6312-42E6-85F3-613C20BC1376}" srcOrd="2" destOrd="0" parTransId="{05B560A1-CF69-4666-8BB8-D628BE42664F}" sibTransId="{A015CC84-CBCB-49E3-9D9B-F66E30B67EB4}"/>
+    <dgm:cxn modelId="{14055F04-8140-4BAE-862B-A1242381A950}" type="presOf" srcId="{A9DEF564-FDF7-4F00-998C-0108AF2F964C}" destId="{3C7DEFEB-D965-469F-891F-0F8B1239A0E7}" srcOrd="0" destOrd="0" presId="urn:microsoft.com/office/officeart/2005/8/layout/bProcess4"/>
+    <dgm:cxn modelId="{134DE985-81C2-41BB-9A8C-B4B56F87F2E8}" srcId="{69D9465D-5278-4893-90E4-FC4A404190FF}" destId="{7B5F1AB1-A56B-4592-899D-948C07E9FCE7}" srcOrd="4" destOrd="0" parTransId="{32E3B1F7-D695-42F6-9E77-4159D9144FAF}" sibTransId="{F9AFC70D-98A9-44D5-AE29-4B77D890DCE5}"/>
+    <dgm:cxn modelId="{2AA4AD88-DEE0-4498-BBBA-098B55978CFC}" srcId="{69D9465D-5278-4893-90E4-FC4A404190FF}" destId="{F7C8F245-4D7A-469E-B33C-5443AAA03436}" srcOrd="5" destOrd="0" parTransId="{7004115D-85D0-4855-8403-56165FBD8C5D}" sibTransId="{5925B536-8CDD-4273-9EA0-F3DFE28CFC0A}"/>
+    <dgm:cxn modelId="{FF8D777C-18B8-4623-AFA7-00093BE62503}" type="presOf" srcId="{D9BFE88D-86D5-4A4E-9864-049B66CE7B11}" destId="{0111BCDE-244E-4E0C-9F45-971A15B0F1AB}" srcOrd="0" destOrd="0" presId="urn:microsoft.com/office/officeart/2005/8/layout/bProcess4"/>
+    <dgm:cxn modelId="{8995703E-16EE-4A81-9B75-E9CF54A0823C}" type="presOf" srcId="{F9AFC70D-98A9-44D5-AE29-4B77D890DCE5}" destId="{66DF8E1A-5511-4F36-8E47-F7C36D34BC9C}" srcOrd="0" destOrd="0" presId="urn:microsoft.com/office/officeart/2005/8/layout/bProcess4"/>
+    <dgm:cxn modelId="{F8BF60C2-BE39-43A2-9A61-63EC368D0FEB}" type="presOf" srcId="{5925B536-8CDD-4273-9EA0-F3DFE28CFC0A}" destId="{F464CA6F-950B-46FF-9EA4-EAFF6B879406}" srcOrd="0" destOrd="0" presId="urn:microsoft.com/office/officeart/2005/8/layout/bProcess4"/>
+    <dgm:cxn modelId="{5D11504B-F891-4E16-81AF-19A4EDD5D894}" srcId="{69D9465D-5278-4893-90E4-FC4A404190FF}" destId="{AC0CA605-AB71-4DDA-8068-AE236D9C9B5B}" srcOrd="3" destOrd="0" parTransId="{8CC74D62-4916-498D-B541-D6C5D6CF2E1B}" sibTransId="{A9DEF564-FDF7-4F00-998C-0108AF2F964C}"/>
+    <dgm:cxn modelId="{A1F85789-4824-48E4-B23D-DB88A8247DF3}" type="presOf" srcId="{A015CC84-CBCB-49E3-9D9B-F66E30B67EB4}" destId="{B3F14615-A4E7-4DA6-B7C0-B9FBB08C1897}" srcOrd="0" destOrd="0" presId="urn:microsoft.com/office/officeart/2005/8/layout/bProcess4"/>
+    <dgm:cxn modelId="{D00831ED-127B-4987-AF88-67025158E8BF}" type="presOf" srcId="{C24C36EC-6312-42E6-85F3-613C20BC1376}" destId="{DB114CFE-3120-4EDC-8173-69948354E5C4}" srcOrd="0" destOrd="0" presId="urn:microsoft.com/office/officeart/2005/8/layout/bProcess4"/>
+    <dgm:cxn modelId="{29F4C0D2-AE92-4258-BBFD-9A40C4CCE94E}" type="presOf" srcId="{F7C8F245-4D7A-469E-B33C-5443AAA03436}" destId="{E8D604B9-E6B5-427C-8D2D-C70DBA515C38}" srcOrd="0" destOrd="0" presId="urn:microsoft.com/office/officeart/2005/8/layout/bProcess4"/>
+    <dgm:cxn modelId="{5D51E946-1572-4B32-A99B-B09C2D21BB4F}" srcId="{69D9465D-5278-4893-90E4-FC4A404190FF}" destId="{664F3033-06A2-4F92-8AED-49E5BB070394}" srcOrd="6" destOrd="0" parTransId="{67711992-C237-4337-995F-B75846ACA60F}" sibTransId="{24235BDA-3456-4472-A5F8-A95C033405D7}"/>
+    <dgm:cxn modelId="{B3B9CAB9-2667-4815-A245-E1FC2B28DE7D}" srcId="{69D9465D-5278-4893-90E4-FC4A404190FF}" destId="{F2809BA3-C65E-4889-8F5A-FF553707154C}" srcOrd="8" destOrd="0" parTransId="{FC354316-0A86-49FE-B980-2848910173B1}" sibTransId="{342EE362-FB63-4B4A-A4F8-F7864A82DA6F}"/>
+    <dgm:cxn modelId="{361F53CB-5A29-4DAB-A291-D994BF66FC9F}" type="presOf" srcId="{F2809BA3-C65E-4889-8F5A-FF553707154C}" destId="{186C2779-A3E3-43E9-AE0E-189DFF42734F}" srcOrd="0" destOrd="0" presId="urn:microsoft.com/office/officeart/2005/8/layout/bProcess4"/>
+    <dgm:cxn modelId="{E9634CB2-95B8-4A07-9924-3D7B5FC7A4F5}" type="presOf" srcId="{8E23BBB5-4FFD-4603-8A8B-57D6A8F546C7}" destId="{CF02E96F-6612-4447-A716-AF24BA2BAA38}" srcOrd="0" destOrd="0" presId="urn:microsoft.com/office/officeart/2005/8/layout/bProcess4"/>
+    <dgm:cxn modelId="{3B0582A2-3B3D-4DCD-93AC-A52D25E70D8E}" type="presOf" srcId="{7B5F1AB1-A56B-4592-899D-948C07E9FCE7}" destId="{4831F056-7731-46BB-8DF6-11307D2F1AEB}" srcOrd="0" destOrd="0" presId="urn:microsoft.com/office/officeart/2005/8/layout/bProcess4"/>
+    <dgm:cxn modelId="{BE8A410B-AB19-490E-B9A0-CFE7C4AE16AF}" type="presOf" srcId="{F6AB84D7-DC04-4772-BBB8-08839E3E3B0E}" destId="{5D23B8C8-D64B-484E-B55B-BD146A94EBE7}" srcOrd="0" destOrd="0" presId="urn:microsoft.com/office/officeart/2005/8/layout/bProcess4"/>
     <dgm:cxn modelId="{2534C515-9526-4995-A442-803954094489}" type="presOf" srcId="{CE70E7C1-00A1-4F5C-B7F2-4DEA0098B5CC}" destId="{6DEDC417-7D81-4270-BD28-D9247A7A935F}" srcOrd="0" destOrd="0" presId="urn:microsoft.com/office/officeart/2005/8/layout/bProcess4"/>
-    <dgm:cxn modelId="{29F4C0D2-AE92-4258-BBFD-9A40C4CCE94E}" type="presOf" srcId="{F7C8F245-4D7A-469E-B33C-5443AAA03436}" destId="{E8D604B9-E6B5-427C-8D2D-C70DBA515C38}" srcOrd="0" destOrd="0" presId="urn:microsoft.com/office/officeart/2005/8/layout/bProcess4"/>
-    <dgm:cxn modelId="{E9634CB2-95B8-4A07-9924-3D7B5FC7A4F5}" type="presOf" srcId="{8E23BBB5-4FFD-4603-8A8B-57D6A8F546C7}" destId="{CF02E96F-6612-4447-A716-AF24BA2BAA38}" srcOrd="0" destOrd="0" presId="urn:microsoft.com/office/officeart/2005/8/layout/bProcess4"/>
-    <dgm:cxn modelId="{FF8D777C-18B8-4623-AFA7-00093BE62503}" type="presOf" srcId="{D9BFE88D-86D5-4A4E-9864-049B66CE7B11}" destId="{0111BCDE-244E-4E0C-9F45-971A15B0F1AB}" srcOrd="0" destOrd="0" presId="urn:microsoft.com/office/officeart/2005/8/layout/bProcess4"/>
-    <dgm:cxn modelId="{FA601BAF-F0F4-41C1-9E74-90A3437D9622}" srcId="{69D9465D-5278-4893-90E4-FC4A404190FF}" destId="{F6AB84D7-DC04-4772-BBB8-08839E3E3B0E}" srcOrd="1" destOrd="0" parTransId="{F35EFF0E-EA0B-4C57-8CED-83FEB15CD0FD}" sibTransId="{730DAA83-5ECA-4C62-B660-9C169A24A198}"/>
-    <dgm:cxn modelId="{14055F04-8140-4BAE-862B-A1242381A950}" type="presOf" srcId="{A9DEF564-FDF7-4F00-998C-0108AF2F964C}" destId="{3C7DEFEB-D965-469F-891F-0F8B1239A0E7}" srcOrd="0" destOrd="0" presId="urn:microsoft.com/office/officeart/2005/8/layout/bProcess4"/>
+    <dgm:cxn modelId="{1841C2B5-F5D9-4C9D-BC8C-E01099CB1015}" type="presOf" srcId="{730DAA83-5ECA-4C62-B660-9C169A24A198}" destId="{6E02BA24-2FD9-4C78-8700-D63A6D75380B}" srcOrd="0" destOrd="0" presId="urn:microsoft.com/office/officeart/2005/8/layout/bProcess4"/>
+    <dgm:cxn modelId="{8E260BD3-C9D7-4508-A4AC-F2E5E19A10BF}" type="presOf" srcId="{AC0CA605-AB71-4DDA-8068-AE236D9C9B5B}" destId="{8B6115A6-6B88-4E8C-B7FC-E18F0AFA9CAB}" srcOrd="0" destOrd="0" presId="urn:microsoft.com/office/officeart/2005/8/layout/bProcess4"/>
+    <dgm:cxn modelId="{9F649EF0-789F-4CBD-9BDD-05CA7FD30C2F}" type="presOf" srcId="{31DAD7E9-CE7C-41E2-8D30-CCCC16BF810D}" destId="{04175430-BE2F-45E9-8822-6B0CF5FF9864}" srcOrd="0" destOrd="0" presId="urn:microsoft.com/office/officeart/2005/8/layout/bProcess4"/>
+    <dgm:cxn modelId="{35FFAEAE-DC16-4986-AE73-A931A7283792}" srcId="{69D9465D-5278-4893-90E4-FC4A404190FF}" destId="{D9BFE88D-86D5-4A4E-9864-049B66CE7B11}" srcOrd="0" destOrd="0" parTransId="{F9F09A06-4B6D-4FE7-83E2-F8A428C27656}" sibTransId="{8E23BBB5-4FFD-4603-8A8B-57D6A8F546C7}"/>
+    <dgm:cxn modelId="{1E40BCCB-1E76-43AB-8C55-8CF0256943F5}" type="presOf" srcId="{664F3033-06A2-4F92-8AED-49E5BB070394}" destId="{E2F09AE3-E19A-4DEE-8439-BD770D589E30}" srcOrd="0" destOrd="0" presId="urn:microsoft.com/office/officeart/2005/8/layout/bProcess4"/>
+    <dgm:cxn modelId="{8B540F0B-2250-4B5E-BCCE-C3D246BFA6AE}" srcId="{69D9465D-5278-4893-90E4-FC4A404190FF}" destId="{CE70E7C1-00A1-4F5C-B7F2-4DEA0098B5CC}" srcOrd="7" destOrd="0" parTransId="{F234F055-B622-4D52-AFCB-3BA3D3341CFD}" sibTransId="{31DAD7E9-CE7C-41E2-8D30-CCCC16BF810D}"/>
     <dgm:cxn modelId="{7264B672-CA05-4F31-89F1-FEAC6C34D9E4}" type="presOf" srcId="{69D9465D-5278-4893-90E4-FC4A404190FF}" destId="{F41203AE-3D27-4DFC-B08E-BF6461080D2A}" srcOrd="0" destOrd="0" presId="urn:microsoft.com/office/officeart/2005/8/layout/bProcess4"/>
-    <dgm:cxn modelId="{9F649EF0-789F-4CBD-9BDD-05CA7FD30C2F}" type="presOf" srcId="{31DAD7E9-CE7C-41E2-8D30-CCCC16BF810D}" destId="{04175430-BE2F-45E9-8822-6B0CF5FF9864}" srcOrd="0" destOrd="0" presId="urn:microsoft.com/office/officeart/2005/8/layout/bProcess4"/>
-    <dgm:cxn modelId="{5D11504B-F891-4E16-81AF-19A4EDD5D894}" srcId="{69D9465D-5278-4893-90E4-FC4A404190FF}" destId="{AC0CA605-AB71-4DDA-8068-AE236D9C9B5B}" srcOrd="3" destOrd="0" parTransId="{8CC74D62-4916-498D-B541-D6C5D6CF2E1B}" sibTransId="{A9DEF564-FDF7-4F00-998C-0108AF2F964C}"/>
-    <dgm:cxn modelId="{8E260BD3-C9D7-4508-A4AC-F2E5E19A10BF}" type="presOf" srcId="{AC0CA605-AB71-4DDA-8068-AE236D9C9B5B}" destId="{8B6115A6-6B88-4E8C-B7FC-E18F0AFA9CAB}" srcOrd="0" destOrd="0" presId="urn:microsoft.com/office/officeart/2005/8/layout/bProcess4"/>
-    <dgm:cxn modelId="{D00831ED-127B-4987-AF88-67025158E8BF}" type="presOf" srcId="{C24C36EC-6312-42E6-85F3-613C20BC1376}" destId="{DB114CFE-3120-4EDC-8173-69948354E5C4}" srcOrd="0" destOrd="0" presId="urn:microsoft.com/office/officeart/2005/8/layout/bProcess4"/>
-    <dgm:cxn modelId="{9D075F56-2E0B-4171-8175-C4780726D8AC}" type="presOf" srcId="{24235BDA-3456-4472-A5F8-A95C033405D7}" destId="{E6918614-9BE6-4F65-A414-6CA09685AE8E}" srcOrd="0" destOrd="0" presId="urn:microsoft.com/office/officeart/2005/8/layout/bProcess4"/>
-    <dgm:cxn modelId="{8B540F0B-2250-4B5E-BCCE-C3D246BFA6AE}" srcId="{69D9465D-5278-4893-90E4-FC4A404190FF}" destId="{CE70E7C1-00A1-4F5C-B7F2-4DEA0098B5CC}" srcOrd="7" destOrd="0" parTransId="{F234F055-B622-4D52-AFCB-3BA3D3341CFD}" sibTransId="{31DAD7E9-CE7C-41E2-8D30-CCCC16BF810D}"/>
-    <dgm:cxn modelId="{1841C2B5-F5D9-4C9D-BC8C-E01099CB1015}" type="presOf" srcId="{730DAA83-5ECA-4C62-B660-9C169A24A198}" destId="{6E02BA24-2FD9-4C78-8700-D63A6D75380B}" srcOrd="0" destOrd="0" presId="urn:microsoft.com/office/officeart/2005/8/layout/bProcess4"/>
-    <dgm:cxn modelId="{3B0582A2-3B3D-4DCD-93AC-A52D25E70D8E}" type="presOf" srcId="{7B5F1AB1-A56B-4592-899D-948C07E9FCE7}" destId="{4831F056-7731-46BB-8DF6-11307D2F1AEB}" srcOrd="0" destOrd="0" presId="urn:microsoft.com/office/officeart/2005/8/layout/bProcess4"/>
-    <dgm:cxn modelId="{1EA91787-343D-46F0-A1A6-0C2FA465220B}" srcId="{69D9465D-5278-4893-90E4-FC4A404190FF}" destId="{C24C36EC-6312-42E6-85F3-613C20BC1376}" srcOrd="2" destOrd="0" parTransId="{05B560A1-CF69-4666-8BB8-D628BE42664F}" sibTransId="{A015CC84-CBCB-49E3-9D9B-F66E30B67EB4}"/>
-    <dgm:cxn modelId="{5D51E946-1572-4B32-A99B-B09C2D21BB4F}" srcId="{69D9465D-5278-4893-90E4-FC4A404190FF}" destId="{664F3033-06A2-4F92-8AED-49E5BB070394}" srcOrd="6" destOrd="0" parTransId="{67711992-C237-4337-995F-B75846ACA60F}" sibTransId="{24235BDA-3456-4472-A5F8-A95C033405D7}"/>
-    <dgm:cxn modelId="{F8BF60C2-BE39-43A2-9A61-63EC368D0FEB}" type="presOf" srcId="{5925B536-8CDD-4273-9EA0-F3DFE28CFC0A}" destId="{F464CA6F-950B-46FF-9EA4-EAFF6B879406}" srcOrd="0" destOrd="0" presId="urn:microsoft.com/office/officeart/2005/8/layout/bProcess4"/>
-    <dgm:cxn modelId="{361F53CB-5A29-4DAB-A291-D994BF66FC9F}" type="presOf" srcId="{F2809BA3-C65E-4889-8F5A-FF553707154C}" destId="{186C2779-A3E3-43E9-AE0E-189DFF42734F}" srcOrd="0" destOrd="0" presId="urn:microsoft.com/office/officeart/2005/8/layout/bProcess4"/>
-    <dgm:cxn modelId="{BE8A410B-AB19-490E-B9A0-CFE7C4AE16AF}" type="presOf" srcId="{F6AB84D7-DC04-4772-BBB8-08839E3E3B0E}" destId="{5D23B8C8-D64B-484E-B55B-BD146A94EBE7}" srcOrd="0" destOrd="0" presId="urn:microsoft.com/office/officeart/2005/8/layout/bProcess4"/>
-    <dgm:cxn modelId="{A1F85789-4824-48E4-B23D-DB88A8247DF3}" type="presOf" srcId="{A015CC84-CBCB-49E3-9D9B-F66E30B67EB4}" destId="{B3F14615-A4E7-4DA6-B7C0-B9FBB08C1897}" srcOrd="0" destOrd="0" presId="urn:microsoft.com/office/officeart/2005/8/layout/bProcess4"/>
-    <dgm:cxn modelId="{134DE985-81C2-41BB-9A8C-B4B56F87F2E8}" srcId="{69D9465D-5278-4893-90E4-FC4A404190FF}" destId="{7B5F1AB1-A56B-4592-899D-948C07E9FCE7}" srcOrd="4" destOrd="0" parTransId="{32E3B1F7-D695-42F6-9E77-4159D9144FAF}" sibTransId="{F9AFC70D-98A9-44D5-AE29-4B77D890DCE5}"/>
-    <dgm:cxn modelId="{35FFAEAE-DC16-4986-AE73-A931A7283792}" srcId="{69D9465D-5278-4893-90E4-FC4A404190FF}" destId="{D9BFE88D-86D5-4A4E-9864-049B66CE7B11}" srcOrd="0" destOrd="0" parTransId="{F9F09A06-4B6D-4FE7-83E2-F8A428C27656}" sibTransId="{8E23BBB5-4FFD-4603-8A8B-57D6A8F546C7}"/>
-    <dgm:cxn modelId="{8995703E-16EE-4A81-9B75-E9CF54A0823C}" type="presOf" srcId="{F9AFC70D-98A9-44D5-AE29-4B77D890DCE5}" destId="{66DF8E1A-5511-4F36-8E47-F7C36D34BC9C}" srcOrd="0" destOrd="0" presId="urn:microsoft.com/office/officeart/2005/8/layout/bProcess4"/>
-    <dgm:cxn modelId="{1E40BCCB-1E76-43AB-8C55-8CF0256943F5}" type="presOf" srcId="{664F3033-06A2-4F92-8AED-49E5BB070394}" destId="{E2F09AE3-E19A-4DEE-8439-BD770D589E30}" srcOrd="0" destOrd="0" presId="urn:microsoft.com/office/officeart/2005/8/layout/bProcess4"/>
-    <dgm:cxn modelId="{2AA4AD88-DEE0-4498-BBBA-098B55978CFC}" srcId="{69D9465D-5278-4893-90E4-FC4A404190FF}" destId="{F7C8F245-4D7A-469E-B33C-5443AAA03436}" srcOrd="5" destOrd="0" parTransId="{7004115D-85D0-4855-8403-56165FBD8C5D}" sibTransId="{5925B536-8CDD-4273-9EA0-F3DFE28CFC0A}"/>
-    <dgm:cxn modelId="{B3B9CAB9-2667-4815-A245-E1FC2B28DE7D}" srcId="{69D9465D-5278-4893-90E4-FC4A404190FF}" destId="{F2809BA3-C65E-4889-8F5A-FF553707154C}" srcOrd="8" destOrd="0" parTransId="{FC354316-0A86-49FE-B980-2848910173B1}" sibTransId="{342EE362-FB63-4B4A-A4F8-F7864A82DA6F}"/>
     <dgm:cxn modelId="{CA5AFF5C-582E-4958-AD8B-4C61AA2F41AF}" type="presParOf" srcId="{F41203AE-3D27-4DFC-B08E-BF6461080D2A}" destId="{9B9AB0DF-1520-478A-9272-0D99B8FD5BC6}" srcOrd="0" destOrd="0" presId="urn:microsoft.com/office/officeart/2005/8/layout/bProcess4"/>
     <dgm:cxn modelId="{15240594-B4C4-415C-9491-A30D89E98AC6}" type="presParOf" srcId="{9B9AB0DF-1520-478A-9272-0D99B8FD5BC6}" destId="{DC903BB0-E430-4A21-B00B-32F4402C2D32}" srcOrd="0" destOrd="0" presId="urn:microsoft.com/office/officeart/2005/8/layout/bProcess4"/>
     <dgm:cxn modelId="{ED9933BF-C8EF-44BB-AE9A-1D88F0BDBBB7}" type="presParOf" srcId="{9B9AB0DF-1520-478A-9272-0D99B8FD5BC6}" destId="{0111BCDE-244E-4E0C-9F45-971A15B0F1AB}" srcOrd="1" destOrd="0" presId="urn:microsoft.com/office/officeart/2005/8/layout/bProcess4"/>
@@ -1680,8 +1680,8 @@
       </dsp:nvSpPr>
       <dsp:spPr>
         <a:xfrm rot="5400000">
-          <a:off x="-248440" y="968770"/>
-          <a:ext cx="1108808" cy="134236"/>
+          <a:off x="-334529" y="1290056"/>
+          <a:ext cx="1481686" cy="178981"/>
         </a:xfrm>
         <a:prstGeom prst="rect">
           <a:avLst/>
@@ -1721,8 +1721,8 @@
       </dsp:nvSpPr>
       <dsp:spPr>
         <a:xfrm>
-          <a:off x="2748" y="255389"/>
-          <a:ext cx="1491512" cy="894907"/>
+          <a:off x="3664" y="340519"/>
+          <a:ext cx="1988683" cy="1193209"/>
         </a:xfrm>
         <a:prstGeom prst="roundRect">
           <a:avLst>
@@ -1765,12 +1765,12 @@
         </a:fontRef>
       </dsp:style>
       <dsp:txBody>
-        <a:bodyPr spcFirstLastPara="0" vert="horz" wrap="square" lIns="30480" tIns="30480" rIns="30480" bIns="30480" numCol="1" spcCol="1270" anchor="ctr" anchorCtr="0">
+        <a:bodyPr spcFirstLastPara="0" vert="horz" wrap="square" lIns="38100" tIns="38100" rIns="38100" bIns="38100" numCol="1" spcCol="1270" anchor="ctr" anchorCtr="0">
           <a:noAutofit/>
         </a:bodyPr>
         <a:lstStyle/>
         <a:p>
-          <a:pPr lvl="0" algn="ctr" defTabSz="355600">
+          <a:pPr lvl="0" algn="ctr" defTabSz="444500">
             <a:lnSpc>
               <a:spcPct val="90000"/>
             </a:lnSpc>
@@ -1782,19 +1782,19 @@
             </a:spcAft>
           </a:pPr>
           <a:r>
-            <a:rPr lang="en-ZA" sz="800" kern="1200" dirty="0" smtClean="0">
+            <a:rPr lang="en-ZA" sz="1000" kern="1200" dirty="0" smtClean="0">
               <a:latin typeface="Corbel" panose="020B0503020204020204" pitchFamily="34" charset="0"/>
             </a:rPr>
             <a:t>Collect data from the Android’s sensors.</a:t>
           </a:r>
-          <a:endParaRPr lang="en-ZA" sz="800" kern="1200" dirty="0">
+          <a:endParaRPr lang="en-ZA" sz="1000" kern="1200" dirty="0">
             <a:latin typeface="Corbel" panose="020B0503020204020204" pitchFamily="34" charset="0"/>
           </a:endParaRPr>
         </a:p>
       </dsp:txBody>
       <dsp:txXfrm>
-        <a:off x="28959" y="281600"/>
-        <a:ext cx="1439090" cy="842485"/>
+        <a:off x="38612" y="375467"/>
+        <a:ext cx="1918787" cy="1123313"/>
       </dsp:txXfrm>
     </dsp:sp>
     <dsp:sp modelId="{6E02BA24-2FD9-4C78-8700-D63A6D75380B}">
@@ -1804,8 +1804,8 @@
       </dsp:nvSpPr>
       <dsp:spPr>
         <a:xfrm rot="5400000">
-          <a:off x="-248440" y="2087405"/>
-          <a:ext cx="1108808" cy="134236"/>
+          <a:off x="-334529" y="2781569"/>
+          <a:ext cx="1481686" cy="178981"/>
         </a:xfrm>
         <a:prstGeom prst="rect">
           <a:avLst/>
@@ -1845,8 +1845,8 @@
       </dsp:nvSpPr>
       <dsp:spPr>
         <a:xfrm>
-          <a:off x="2748" y="1374023"/>
-          <a:ext cx="1491512" cy="894907"/>
+          <a:off x="3664" y="1832031"/>
+          <a:ext cx="1988683" cy="1193209"/>
         </a:xfrm>
         <a:prstGeom prst="roundRect">
           <a:avLst>
@@ -1889,12 +1889,12 @@
         </a:fontRef>
       </dsp:style>
       <dsp:txBody>
-        <a:bodyPr spcFirstLastPara="0" vert="horz" wrap="square" lIns="30480" tIns="30480" rIns="30480" bIns="30480" numCol="1" spcCol="1270" anchor="ctr" anchorCtr="0">
+        <a:bodyPr spcFirstLastPara="0" vert="horz" wrap="square" lIns="38100" tIns="38100" rIns="38100" bIns="38100" numCol="1" spcCol="1270" anchor="ctr" anchorCtr="0">
           <a:noAutofit/>
         </a:bodyPr>
         <a:lstStyle/>
         <a:p>
-          <a:pPr lvl="0" algn="ctr" defTabSz="355600">
+          <a:pPr lvl="0" algn="ctr" defTabSz="444500">
             <a:lnSpc>
               <a:spcPct val="90000"/>
             </a:lnSpc>
@@ -1906,19 +1906,19 @@
             </a:spcAft>
           </a:pPr>
           <a:r>
-            <a:rPr lang="en-ZA" sz="800" kern="1200" dirty="0" smtClean="0">
+            <a:rPr lang="en-ZA" sz="1000" kern="1200" dirty="0" smtClean="0">
               <a:latin typeface="Corbel" panose="020B0503020204020204" pitchFamily="34" charset="0"/>
             </a:rPr>
             <a:t>We determine many bad things all previous users have averaged per second. And transform that data into a normal distribution.</a:t>
           </a:r>
-          <a:endParaRPr lang="en-ZA" sz="800" kern="1200" dirty="0">
+          <a:endParaRPr lang="en-ZA" sz="1000" kern="1200" dirty="0">
             <a:latin typeface="Corbel" panose="020B0503020204020204" pitchFamily="34" charset="0"/>
           </a:endParaRPr>
         </a:p>
       </dsp:txBody>
       <dsp:txXfrm>
-        <a:off x="28959" y="1400234"/>
-        <a:ext cx="1439090" cy="842485"/>
+        <a:off x="38612" y="1866979"/>
+        <a:ext cx="1918787" cy="1123313"/>
       </dsp:txXfrm>
     </dsp:sp>
     <dsp:sp modelId="{B3F14615-A4E7-4DA6-B7C0-B9FBB08C1897}">
@@ -1928,8 +1928,8 @@
       </dsp:nvSpPr>
       <dsp:spPr>
         <a:xfrm>
-          <a:off x="310876" y="2646722"/>
-          <a:ext cx="1973885" cy="134236"/>
+          <a:off x="411227" y="3527325"/>
+          <a:ext cx="2635122" cy="178981"/>
         </a:xfrm>
         <a:prstGeom prst="rect">
           <a:avLst/>
@@ -1969,8 +1969,8 @@
       </dsp:nvSpPr>
       <dsp:spPr>
         <a:xfrm>
-          <a:off x="2748" y="2492658"/>
-          <a:ext cx="1491512" cy="894907"/>
+          <a:off x="3664" y="3323543"/>
+          <a:ext cx="1988683" cy="1193209"/>
         </a:xfrm>
         <a:prstGeom prst="roundRect">
           <a:avLst>
@@ -2013,12 +2013,12 @@
         </a:fontRef>
       </dsp:style>
       <dsp:txBody>
-        <a:bodyPr spcFirstLastPara="0" vert="horz" wrap="square" lIns="30480" tIns="30480" rIns="30480" bIns="30480" numCol="1" spcCol="1270" anchor="ctr" anchorCtr="0">
+        <a:bodyPr spcFirstLastPara="0" vert="horz" wrap="square" lIns="38100" tIns="38100" rIns="38100" bIns="38100" numCol="1" spcCol="1270" anchor="ctr" anchorCtr="0">
           <a:noAutofit/>
         </a:bodyPr>
         <a:lstStyle/>
         <a:p>
-          <a:pPr lvl="0" algn="ctr" defTabSz="355600">
+          <a:pPr lvl="0" algn="ctr" defTabSz="444500">
             <a:lnSpc>
               <a:spcPct val="90000"/>
             </a:lnSpc>
@@ -2030,19 +2030,19 @@
             </a:spcAft>
           </a:pPr>
           <a:r>
-            <a:rPr lang="en-ZA" sz="800" kern="1200" dirty="0" smtClean="0">
+            <a:rPr lang="en-ZA" sz="1000" kern="1200" dirty="0" smtClean="0">
               <a:latin typeface="Corbel" panose="020B0503020204020204" pitchFamily="34" charset="0"/>
             </a:rPr>
             <a:t>Determine how many bad things the current user does per second.</a:t>
           </a:r>
-          <a:endParaRPr lang="en-ZA" sz="800" kern="1200" dirty="0">
+          <a:endParaRPr lang="en-ZA" sz="1000" kern="1200" dirty="0">
             <a:latin typeface="Corbel" panose="020B0503020204020204" pitchFamily="34" charset="0"/>
           </a:endParaRPr>
         </a:p>
       </dsp:txBody>
       <dsp:txXfrm>
-        <a:off x="28959" y="2518869"/>
-        <a:ext cx="1439090" cy="842485"/>
+        <a:off x="38612" y="3358491"/>
+        <a:ext cx="1918787" cy="1123313"/>
       </dsp:txXfrm>
     </dsp:sp>
     <dsp:sp modelId="{3C7DEFEB-D965-469F-891F-0F8B1239A0E7}">
@@ -2052,8 +2052,8 @@
       </dsp:nvSpPr>
       <dsp:spPr>
         <a:xfrm rot="16200000">
-          <a:off x="1735271" y="2087405"/>
-          <a:ext cx="1108808" cy="134236"/>
+          <a:off x="2310419" y="2781569"/>
+          <a:ext cx="1481686" cy="178981"/>
         </a:xfrm>
         <a:prstGeom prst="rect">
           <a:avLst/>
@@ -2093,8 +2093,8 @@
       </dsp:nvSpPr>
       <dsp:spPr>
         <a:xfrm>
-          <a:off x="1986459" y="2492658"/>
-          <a:ext cx="1491512" cy="894907"/>
+          <a:off x="2648612" y="3323543"/>
+          <a:ext cx="1988683" cy="1193209"/>
         </a:xfrm>
         <a:prstGeom prst="roundRect">
           <a:avLst>
@@ -2137,12 +2137,12 @@
         </a:fontRef>
       </dsp:style>
       <dsp:txBody>
-        <a:bodyPr spcFirstLastPara="0" vert="horz" wrap="square" lIns="30480" tIns="30480" rIns="30480" bIns="30480" numCol="1" spcCol="1270" anchor="ctr" anchorCtr="0">
+        <a:bodyPr spcFirstLastPara="0" vert="horz" wrap="square" lIns="38100" tIns="38100" rIns="38100" bIns="38100" numCol="1" spcCol="1270" anchor="ctr" anchorCtr="0">
           <a:noAutofit/>
         </a:bodyPr>
         <a:lstStyle/>
         <a:p>
-          <a:pPr lvl="0" algn="ctr" defTabSz="355600">
+          <a:pPr lvl="0" algn="ctr" defTabSz="444500">
             <a:lnSpc>
               <a:spcPct val="90000"/>
             </a:lnSpc>
@@ -2154,19 +2154,19 @@
             </a:spcAft>
           </a:pPr>
           <a:r>
-            <a:rPr lang="en-ZA" sz="800" kern="1200" dirty="0" smtClean="0">
+            <a:rPr lang="en-ZA" sz="1000" kern="1200" dirty="0" smtClean="0">
               <a:latin typeface="Corbel" panose="020B0503020204020204" pitchFamily="34" charset="0"/>
             </a:rPr>
             <a:t>One of the useful properties of the data we exploit, is that we are able to estimate a position on a normal distribution for the likelihood of the observed results in terms of the number of bad things per second.</a:t>
           </a:r>
-          <a:endParaRPr lang="en-ZA" sz="800" kern="1200" dirty="0">
+          <a:endParaRPr lang="en-ZA" sz="1000" kern="1200" dirty="0">
             <a:latin typeface="Corbel" panose="020B0503020204020204" pitchFamily="34" charset="0"/>
           </a:endParaRPr>
         </a:p>
       </dsp:txBody>
       <dsp:txXfrm>
-        <a:off x="2012670" y="2518869"/>
-        <a:ext cx="1439090" cy="842485"/>
+        <a:off x="2683560" y="3358491"/>
+        <a:ext cx="1918787" cy="1123313"/>
       </dsp:txXfrm>
     </dsp:sp>
     <dsp:sp modelId="{66DF8E1A-5511-4F36-8E47-F7C36D34BC9C}">
@@ -2176,8 +2176,8 @@
       </dsp:nvSpPr>
       <dsp:spPr>
         <a:xfrm rot="16200000">
-          <a:off x="1735271" y="968770"/>
-          <a:ext cx="1108808" cy="134236"/>
+          <a:off x="2310419" y="1290056"/>
+          <a:ext cx="1481686" cy="178981"/>
         </a:xfrm>
         <a:prstGeom prst="rect">
           <a:avLst/>
@@ -2217,8 +2217,8 @@
       </dsp:nvSpPr>
       <dsp:spPr>
         <a:xfrm>
-          <a:off x="1986459" y="1374023"/>
-          <a:ext cx="1491512" cy="894907"/>
+          <a:off x="2648612" y="1832031"/>
+          <a:ext cx="1988683" cy="1193209"/>
         </a:xfrm>
         <a:prstGeom prst="roundRect">
           <a:avLst>
@@ -2261,12 +2261,12 @@
         </a:fontRef>
       </dsp:style>
       <dsp:txBody>
-        <a:bodyPr spcFirstLastPara="0" vert="horz" wrap="square" lIns="30480" tIns="30480" rIns="30480" bIns="30480" numCol="1" spcCol="1270" anchor="ctr" anchorCtr="0">
+        <a:bodyPr spcFirstLastPara="0" vert="horz" wrap="square" lIns="38100" tIns="38100" rIns="38100" bIns="38100" numCol="1" spcCol="1270" anchor="ctr" anchorCtr="0">
           <a:noAutofit/>
         </a:bodyPr>
         <a:lstStyle/>
         <a:p>
-          <a:pPr lvl="0" algn="ctr" defTabSz="355600">
+          <a:pPr lvl="0" algn="ctr" defTabSz="444500">
             <a:lnSpc>
               <a:spcPct val="90000"/>
             </a:lnSpc>
@@ -2278,19 +2278,19 @@
             </a:spcAft>
           </a:pPr>
           <a:r>
-            <a:rPr lang="en-ZA" sz="800" kern="1200" smtClean="0">
+            <a:rPr lang="en-ZA" sz="1000" kern="1200" smtClean="0">
               <a:latin typeface="Corbel" panose="020B0503020204020204" pitchFamily="34" charset="0"/>
             </a:rPr>
             <a:t>Weightings are applied to the different readings from the sensors (because acceleration through a turn is worse than acceleration while moving forward, and acceleration upwards is even worse!)</a:t>
           </a:r>
-          <a:endParaRPr lang="en-ZA" sz="800" kern="1200" dirty="0">
+          <a:endParaRPr lang="en-ZA" sz="1000" kern="1200" dirty="0">
             <a:latin typeface="Corbel" panose="020B0503020204020204" pitchFamily="34" charset="0"/>
           </a:endParaRPr>
         </a:p>
       </dsp:txBody>
       <dsp:txXfrm>
-        <a:off x="2012670" y="1400234"/>
-        <a:ext cx="1439090" cy="842485"/>
+        <a:off x="2683560" y="1866979"/>
+        <a:ext cx="1918787" cy="1123313"/>
       </dsp:txXfrm>
     </dsp:sp>
     <dsp:sp modelId="{F464CA6F-950B-46FF-9EA4-EAFF6B879406}">
@@ -2300,8 +2300,8 @@
       </dsp:nvSpPr>
       <dsp:spPr>
         <a:xfrm>
-          <a:off x="2294588" y="409453"/>
-          <a:ext cx="1973885" cy="134236"/>
+          <a:off x="3056175" y="544300"/>
+          <a:ext cx="2635122" cy="178981"/>
         </a:xfrm>
         <a:prstGeom prst="rect">
           <a:avLst/>
@@ -2341,8 +2341,8 @@
       </dsp:nvSpPr>
       <dsp:spPr>
         <a:xfrm>
-          <a:off x="1986459" y="255389"/>
-          <a:ext cx="1491512" cy="894907"/>
+          <a:off x="2648612" y="340519"/>
+          <a:ext cx="1988683" cy="1193209"/>
         </a:xfrm>
         <a:prstGeom prst="roundRect">
           <a:avLst>
@@ -2385,12 +2385,12 @@
         </a:fontRef>
       </dsp:style>
       <dsp:txBody>
-        <a:bodyPr spcFirstLastPara="0" vert="horz" wrap="square" lIns="30480" tIns="30480" rIns="30480" bIns="30480" numCol="1" spcCol="1270" anchor="ctr" anchorCtr="0">
+        <a:bodyPr spcFirstLastPara="0" vert="horz" wrap="square" lIns="38100" tIns="38100" rIns="38100" bIns="38100" numCol="1" spcCol="1270" anchor="ctr" anchorCtr="0">
           <a:noAutofit/>
         </a:bodyPr>
         <a:lstStyle/>
         <a:p>
-          <a:pPr lvl="0" algn="ctr" defTabSz="355600">
+          <a:pPr lvl="0" algn="ctr" defTabSz="444500">
             <a:lnSpc>
               <a:spcPct val="90000"/>
             </a:lnSpc>
@@ -2402,19 +2402,19 @@
             </a:spcAft>
           </a:pPr>
           <a:r>
-            <a:rPr lang="en-ZA" sz="800" kern="1200" dirty="0" smtClean="0">
+            <a:rPr lang="en-ZA" sz="1000" kern="1200" dirty="0" smtClean="0">
               <a:latin typeface="Corbel" panose="020B0503020204020204" pitchFamily="34" charset="0"/>
             </a:rPr>
             <a:t>Using this information, we are able to estimate a probability that the score of the current trip was a result of random chance when compared to the normal distribution of all other drivers.</a:t>
           </a:r>
-          <a:endParaRPr lang="en-ZA" sz="800" kern="1200" dirty="0">
+          <a:endParaRPr lang="en-ZA" sz="1000" kern="1200" dirty="0">
             <a:latin typeface="Corbel" panose="020B0503020204020204" pitchFamily="34" charset="0"/>
           </a:endParaRPr>
         </a:p>
       </dsp:txBody>
       <dsp:txXfrm>
-        <a:off x="2012670" y="281600"/>
-        <a:ext cx="1439090" cy="842485"/>
+        <a:off x="2683560" y="375467"/>
+        <a:ext cx="1918787" cy="1123313"/>
       </dsp:txXfrm>
     </dsp:sp>
     <dsp:sp modelId="{E6918614-9BE6-4F65-A414-6CA09685AE8E}">
@@ -2424,8 +2424,8 @@
       </dsp:nvSpPr>
       <dsp:spPr>
         <a:xfrm rot="5400000">
-          <a:off x="3718982" y="968770"/>
-          <a:ext cx="1108808" cy="134236"/>
+          <a:off x="4955368" y="1290056"/>
+          <a:ext cx="1481686" cy="178981"/>
         </a:xfrm>
         <a:prstGeom prst="rect">
           <a:avLst/>
@@ -2465,8 +2465,8 @@
       </dsp:nvSpPr>
       <dsp:spPr>
         <a:xfrm>
-          <a:off x="3970171" y="255389"/>
-          <a:ext cx="1491512" cy="894907"/>
+          <a:off x="5293561" y="340519"/>
+          <a:ext cx="1988683" cy="1193209"/>
         </a:xfrm>
         <a:prstGeom prst="roundRect">
           <a:avLst>
@@ -2509,12 +2509,12 @@
         </a:fontRef>
       </dsp:style>
       <dsp:txBody>
-        <a:bodyPr spcFirstLastPara="0" vert="horz" wrap="square" lIns="30480" tIns="30480" rIns="30480" bIns="30480" numCol="1" spcCol="1270" anchor="ctr" anchorCtr="0">
+        <a:bodyPr spcFirstLastPara="0" vert="horz" wrap="square" lIns="38100" tIns="38100" rIns="38100" bIns="38100" numCol="1" spcCol="1270" anchor="ctr" anchorCtr="0">
           <a:noAutofit/>
         </a:bodyPr>
         <a:lstStyle/>
         <a:p>
-          <a:pPr lvl="0" algn="ctr" defTabSz="355600">
+          <a:pPr lvl="0" algn="ctr" defTabSz="444500">
             <a:lnSpc>
               <a:spcPct val="90000"/>
             </a:lnSpc>
@@ -2526,14 +2526,14 @@
             </a:spcAft>
           </a:pPr>
           <a:r>
-            <a:rPr lang="en-ZA" sz="800" kern="1200" dirty="0" smtClean="0">
+            <a:rPr lang="en-ZA" sz="1000" kern="1200" dirty="0" smtClean="0">
               <a:latin typeface="Corbel" panose="020B0503020204020204" pitchFamily="34" charset="0"/>
             </a:rPr>
             <a:t>From this data we calculate a Z-score for the distance of the person’s number of bad things from the normal distribution of the number of bad things.</a:t>
           </a:r>
         </a:p>
         <a:p>
-          <a:pPr lvl="0" algn="ctr" defTabSz="355600">
+          <a:pPr lvl="0" algn="ctr" defTabSz="444500">
             <a:lnSpc>
               <a:spcPct val="90000"/>
             </a:lnSpc>
@@ -2544,14 +2544,14 @@
               <a:spcPct val="35000"/>
             </a:spcAft>
           </a:pPr>
-          <a:endParaRPr lang="en-ZA" sz="800" kern="1200" dirty="0">
+          <a:endParaRPr lang="en-ZA" sz="1000" kern="1200" dirty="0">
             <a:latin typeface="Corbel" panose="020B0503020204020204" pitchFamily="34" charset="0"/>
           </a:endParaRPr>
         </a:p>
       </dsp:txBody>
       <dsp:txXfrm>
-        <a:off x="3996382" y="281600"/>
-        <a:ext cx="1439090" cy="842485"/>
+        <a:off x="5328509" y="375467"/>
+        <a:ext cx="1918787" cy="1123313"/>
       </dsp:txXfrm>
     </dsp:sp>
     <dsp:sp modelId="{04175430-BE2F-45E9-8822-6B0CF5FF9864}">
@@ -2561,8 +2561,8 @@
       </dsp:nvSpPr>
       <dsp:spPr>
         <a:xfrm rot="5400000">
-          <a:off x="3718982" y="2087405"/>
-          <a:ext cx="1108808" cy="134236"/>
+          <a:off x="4955368" y="2781569"/>
+          <a:ext cx="1481686" cy="178981"/>
         </a:xfrm>
         <a:prstGeom prst="rect">
           <a:avLst/>
@@ -2602,8 +2602,8 @@
       </dsp:nvSpPr>
       <dsp:spPr>
         <a:xfrm>
-          <a:off x="3970171" y="1374023"/>
-          <a:ext cx="1491512" cy="894907"/>
+          <a:off x="5293561" y="1832031"/>
+          <a:ext cx="1988683" cy="1193209"/>
         </a:xfrm>
         <a:prstGeom prst="roundRect">
           <a:avLst>
@@ -2646,12 +2646,12 @@
         </a:fontRef>
       </dsp:style>
       <dsp:txBody>
-        <a:bodyPr spcFirstLastPara="0" vert="horz" wrap="square" lIns="30480" tIns="30480" rIns="30480" bIns="30480" numCol="1" spcCol="1270" anchor="ctr" anchorCtr="0">
+        <a:bodyPr spcFirstLastPara="0" vert="horz" wrap="square" lIns="38100" tIns="38100" rIns="38100" bIns="38100" numCol="1" spcCol="1270" anchor="ctr" anchorCtr="0">
           <a:noAutofit/>
         </a:bodyPr>
         <a:lstStyle/>
         <a:p>
-          <a:pPr lvl="0" algn="ctr" defTabSz="355600">
+          <a:pPr lvl="0" algn="ctr" defTabSz="444500">
             <a:lnSpc>
               <a:spcPct val="90000"/>
             </a:lnSpc>
@@ -2663,19 +2663,19 @@
             </a:spcAft>
           </a:pPr>
           <a:r>
-            <a:rPr lang="en-ZA" sz="800" kern="1200" dirty="0" smtClean="0">
+            <a:rPr lang="en-ZA" sz="1000" kern="1200" dirty="0" smtClean="0">
               <a:latin typeface="Corbel" panose="020B0503020204020204" pitchFamily="34" charset="0"/>
             </a:rPr>
             <a:t>Using our z-score and by integrating the normal distribution function, we are able to estimate the area to the left of the normal distribution’s score.</a:t>
           </a:r>
-          <a:endParaRPr lang="en-ZA" sz="800" kern="1200" dirty="0">
+          <a:endParaRPr lang="en-ZA" sz="1000" kern="1200" dirty="0">
             <a:latin typeface="Corbel" panose="020B0503020204020204" pitchFamily="34" charset="0"/>
           </a:endParaRPr>
         </a:p>
       </dsp:txBody>
       <dsp:txXfrm>
-        <a:off x="3996382" y="1400234"/>
-        <a:ext cx="1439090" cy="842485"/>
+        <a:off x="5328509" y="1866979"/>
+        <a:ext cx="1918787" cy="1123313"/>
       </dsp:txXfrm>
     </dsp:sp>
     <dsp:sp modelId="{186C2779-A3E3-43E9-AE0E-189DFF42734F}">
@@ -2685,8 +2685,8 @@
       </dsp:nvSpPr>
       <dsp:spPr>
         <a:xfrm>
-          <a:off x="3970171" y="2492658"/>
-          <a:ext cx="1491512" cy="894907"/>
+          <a:off x="5293561" y="3323543"/>
+          <a:ext cx="1988683" cy="1193209"/>
         </a:xfrm>
         <a:prstGeom prst="roundRect">
           <a:avLst>
@@ -2729,12 +2729,12 @@
         </a:fontRef>
       </dsp:style>
       <dsp:txBody>
-        <a:bodyPr spcFirstLastPara="0" vert="horz" wrap="square" lIns="30480" tIns="30480" rIns="30480" bIns="30480" numCol="1" spcCol="1270" anchor="ctr" anchorCtr="0">
+        <a:bodyPr spcFirstLastPara="0" vert="horz" wrap="square" lIns="38100" tIns="38100" rIns="38100" bIns="38100" numCol="1" spcCol="1270" anchor="ctr" anchorCtr="0">
           <a:noAutofit/>
         </a:bodyPr>
         <a:lstStyle/>
         <a:p>
-          <a:pPr lvl="0" algn="ctr" defTabSz="355600">
+          <a:pPr lvl="0" algn="ctr" defTabSz="444500">
             <a:lnSpc>
               <a:spcPct val="90000"/>
             </a:lnSpc>
@@ -2746,19 +2746,19 @@
             </a:spcAft>
           </a:pPr>
           <a:r>
-            <a:rPr lang="en-ZA" sz="800" kern="1200" dirty="0" smtClean="0">
+            <a:rPr lang="en-ZA" sz="1000" kern="1200" dirty="0" smtClean="0">
               <a:latin typeface="Corbel" panose="020B0503020204020204" pitchFamily="34" charset="0"/>
             </a:rPr>
             <a:t>Because the area under a normal distribution always equals 1, we can simply multiply the area by 10 to achieve a score out of 10 for the quality of that person’s driving.</a:t>
           </a:r>
-          <a:endParaRPr lang="en-ZA" sz="800" kern="1200" dirty="0">
+          <a:endParaRPr lang="en-ZA" sz="1000" kern="1200" dirty="0">
             <a:latin typeface="Corbel" panose="020B0503020204020204" pitchFamily="34" charset="0"/>
           </a:endParaRPr>
         </a:p>
       </dsp:txBody>
       <dsp:txXfrm>
-        <a:off x="3996382" y="2518869"/>
-        <a:ext cx="1439090" cy="842485"/>
+        <a:off x="5328509" y="3358491"/>
+        <a:ext cx="1918787" cy="1123313"/>
       </dsp:txXfrm>
     </dsp:sp>
   </dsp:spTree>
@@ -4071,7 +4071,7 @@
         <p:spPr>
           <a:xfrm>
             <a:off x="0" y="0"/>
-            <a:ext cx="12801600" cy="9601200"/>
+            <a:ext cx="17068800" cy="9601200"/>
           </a:xfrm>
           <a:prstGeom prst="rect">
             <a:avLst/>
@@ -4086,8 +4086,8 @@
         </p:nvSpPr>
         <p:spPr>
           <a:xfrm>
-            <a:off x="-16669" y="2"/>
-            <a:ext cx="12268001" cy="9223375"/>
+            <a:off x="-22225" y="1"/>
+            <a:ext cx="16357334" cy="9223375"/>
           </a:xfrm>
           <a:custGeom>
             <a:avLst/>
@@ -4152,8 +4152,8 @@
         </p:nvSpPr>
         <p:spPr>
           <a:xfrm>
-            <a:off x="0" y="5995162"/>
-            <a:ext cx="11895720" cy="2840383"/>
+            <a:off x="1" y="5995161"/>
+            <a:ext cx="15860960" cy="2840383"/>
           </a:xfrm>
           <a:custGeom>
             <a:avLst/>
@@ -4225,8 +4225,8 @@
         </p:nvSpPr>
         <p:spPr>
           <a:xfrm>
-            <a:off x="2" y="2"/>
-            <a:ext cx="9155558" cy="639628"/>
+            <a:off x="1" y="1"/>
+            <a:ext cx="12207411" cy="639628"/>
           </a:xfrm>
           <a:custGeom>
             <a:avLst/>
@@ -4295,8 +4295,8 @@
         </p:nvSpPr>
         <p:spPr>
           <a:xfrm rot="21420000">
-            <a:off x="-169890" y="410644"/>
-            <a:ext cx="11935472" cy="8052526"/>
+            <a:off x="-226520" y="410644"/>
+            <a:ext cx="15913962" cy="8052526"/>
           </a:xfrm>
           <a:custGeom>
             <a:avLst/>
@@ -4357,8 +4357,8 @@
         </p:nvSpPr>
         <p:spPr>
           <a:xfrm rot="21420000">
-            <a:off x="935763" y="927720"/>
-            <a:ext cx="10242946" cy="3873139"/>
+            <a:off x="1247682" y="927719"/>
+            <a:ext cx="13657262" cy="3873139"/>
           </a:xfrm>
         </p:spPr>
         <p:txBody>
@@ -4367,7 +4367,7 @@
           </a:bodyPr>
           <a:lstStyle>
             <a:lvl1pPr algn="r">
-              <a:defRPr sz="8000"/>
+              <a:defRPr sz="11200"/>
             </a:lvl1pPr>
           </a:lstStyle>
           <a:p>
@@ -4391,8 +4391,8 @@
         </p:nvSpPr>
         <p:spPr>
           <a:xfrm rot="21420000">
-            <a:off x="1032217" y="4907293"/>
-            <a:ext cx="10242946" cy="770466"/>
+            <a:off x="1376287" y="4907293"/>
+            <a:ext cx="13657262" cy="770466"/>
           </a:xfrm>
         </p:spPr>
         <p:txBody>
@@ -4402,7 +4402,7 @@
           <a:lstStyle>
             <a:lvl1pPr marL="0" indent="0" algn="r">
               <a:buNone/>
-              <a:defRPr sz="2800">
+              <a:defRPr sz="3920">
                 <a:solidFill>
                   <a:schemeClr val="bg1">
                     <a:lumMod val="50000"/>
@@ -4410,37 +4410,37 @@
                 </a:solidFill>
               </a:defRPr>
             </a:lvl1pPr>
-            <a:lvl2pPr marL="457209" indent="0" algn="ctr">
-              <a:buNone/>
-              <a:defRPr sz="2000"/>
+            <a:lvl2pPr marL="640080" indent="0" algn="ctr">
+              <a:buNone/>
+              <a:defRPr sz="2800"/>
             </a:lvl2pPr>
-            <a:lvl3pPr marL="914418" indent="0" algn="ctr">
-              <a:buNone/>
-              <a:defRPr sz="1800"/>
+            <a:lvl3pPr marL="1280160" indent="0" algn="ctr">
+              <a:buNone/>
+              <a:defRPr sz="2520"/>
             </a:lvl3pPr>
-            <a:lvl4pPr marL="1371627" indent="0" algn="ctr">
-              <a:buNone/>
-              <a:defRPr sz="1600"/>
+            <a:lvl4pPr marL="1920240" indent="0" algn="ctr">
+              <a:buNone/>
+              <a:defRPr sz="2240"/>
             </a:lvl4pPr>
-            <a:lvl5pPr marL="1828837" indent="0" algn="ctr">
-              <a:buNone/>
-              <a:defRPr sz="1600"/>
+            <a:lvl5pPr marL="2560320" indent="0" algn="ctr">
+              <a:buNone/>
+              <a:defRPr sz="2240"/>
             </a:lvl5pPr>
-            <a:lvl6pPr marL="2286046" indent="0" algn="ctr">
-              <a:buNone/>
-              <a:defRPr sz="1600"/>
+            <a:lvl6pPr marL="3200400" indent="0" algn="ctr">
+              <a:buNone/>
+              <a:defRPr sz="2240"/>
             </a:lvl6pPr>
-            <a:lvl7pPr marL="2743255" indent="0" algn="ctr">
-              <a:buNone/>
-              <a:defRPr sz="1600"/>
+            <a:lvl7pPr marL="3840480" indent="0" algn="ctr">
+              <a:buNone/>
+              <a:defRPr sz="2240"/>
             </a:lvl7pPr>
-            <a:lvl8pPr marL="3200464" indent="0" algn="ctr">
-              <a:buNone/>
-              <a:defRPr sz="1600"/>
+            <a:lvl8pPr marL="4480560" indent="0" algn="ctr">
+              <a:buNone/>
+              <a:defRPr sz="2240"/>
             </a:lvl8pPr>
-            <a:lvl9pPr marL="3657673" indent="0" algn="ctr">
-              <a:buNone/>
-              <a:defRPr sz="1600"/>
+            <a:lvl9pPr marL="5120640" indent="0" algn="ctr">
+              <a:buNone/>
+              <a:defRPr sz="2240"/>
             </a:lvl9pPr>
           </a:lstStyle>
           <a:p>
@@ -4464,15 +4464,15 @@
         </p:nvSpPr>
         <p:spPr>
           <a:xfrm rot="21420000">
-            <a:off x="5195968" y="6409848"/>
-            <a:ext cx="6450836" cy="1628357"/>
+            <a:off x="6927958" y="6409848"/>
+            <a:ext cx="8601114" cy="1628357"/>
           </a:xfrm>
         </p:spPr>
         <p:txBody>
           <a:bodyPr/>
           <a:lstStyle>
             <a:lvl1pPr algn="ctr">
-              <a:defRPr sz="5400">
+              <a:defRPr sz="7560">
                 <a:solidFill>
                   <a:schemeClr val="accent1">
                     <a:lumMod val="50000"/>
@@ -4502,15 +4502,15 @@
         </p:nvSpPr>
         <p:spPr>
           <a:xfrm rot="21420000">
-            <a:off x="-5836" y="6836235"/>
-            <a:ext cx="4249601" cy="1673753"/>
+            <a:off x="-7784" y="6836234"/>
+            <a:ext cx="5666135" cy="1673753"/>
           </a:xfrm>
         </p:spPr>
         <p:txBody>
           <a:bodyPr vert="horz" lIns="91440" tIns="45720" rIns="91440" bIns="45720" rtlCol="0" anchor="ctr"/>
           <a:lstStyle>
             <a:lvl1pPr algn="r">
-              <a:defRPr lang="en-US" sz="5400" dirty="0"/>
+              <a:defRPr lang="en-US" sz="7560" dirty="0"/>
             </a:lvl1pPr>
           </a:lstStyle>
           <a:p>
@@ -4530,15 +4530,15 @@
         </p:nvSpPr>
         <p:spPr>
           <a:xfrm rot="21420000">
-            <a:off x="10344346" y="5365707"/>
-            <a:ext cx="952545" cy="697858"/>
+            <a:off x="13792461" y="5365707"/>
+            <a:ext cx="1270060" cy="697858"/>
           </a:xfrm>
         </p:spPr>
         <p:txBody>
           <a:bodyPr/>
           <a:lstStyle>
             <a:lvl1pPr>
-              <a:defRPr sz="2400">
+              <a:defRPr sz="3360">
                 <a:solidFill>
                   <a:schemeClr val="tx1">
                     <a:lumMod val="75000"/>
@@ -4565,8 +4565,8 @@
         </p:nvSpPr>
         <p:spPr>
           <a:xfrm rot="21420000">
-            <a:off x="4432454" y="7155899"/>
-            <a:ext cx="541155" cy="721540"/>
+            <a:off x="5909939" y="7155899"/>
+            <a:ext cx="721540" cy="721540"/>
           </a:xfrm>
           <a:prstGeom prst="star5">
             <a:avLst>
@@ -4602,7 +4602,7 @@
     </p:spTree>
     <p:extLst>
       <p:ext uri="{BB962C8B-B14F-4D97-AF65-F5344CB8AC3E}">
-        <p14:creationId xmlns:p14="http://schemas.microsoft.com/office/powerpoint/2010/main" val="1039348037"/>
+        <p14:creationId xmlns:p14="http://schemas.microsoft.com/office/powerpoint/2010/main" val="617889744"/>
       </p:ext>
     </p:extLst>
   </p:cSld>
@@ -4641,15 +4641,15 @@
         </p:nvSpPr>
         <p:spPr>
           <a:xfrm>
-            <a:off x="720090" y="5748866"/>
-            <a:ext cx="10914443" cy="824384"/>
+            <a:off x="960120" y="5748866"/>
+            <a:ext cx="14552591" cy="824384"/>
           </a:xfrm>
         </p:spPr>
         <p:txBody>
           <a:bodyPr anchor="b"/>
           <a:lstStyle>
             <a:lvl1pPr>
-              <a:defRPr sz="3200"/>
+              <a:defRPr sz="4480"/>
             </a:lvl1pPr>
           </a:lstStyle>
           <a:p>
@@ -4673,8 +4673,8 @@
         </p:nvSpPr>
         <p:spPr>
           <a:xfrm>
-            <a:off x="720092" y="960119"/>
-            <a:ext cx="10912139" cy="4472864"/>
+            <a:off x="960122" y="960119"/>
+            <a:ext cx="14549518" cy="4472864"/>
           </a:xfrm>
           <a:ln w="57150" cmpd="thinThick">
             <a:solidFill>
@@ -4690,39 +4690,39 @@
           <a:lstStyle>
             <a:lvl1pPr marL="0" indent="0" algn="ctr">
               <a:buNone/>
-              <a:defRPr sz="3200"/>
+              <a:defRPr sz="4480"/>
             </a:lvl1pPr>
-            <a:lvl2pPr marL="457209" indent="0">
+            <a:lvl2pPr marL="640080" indent="0">
+              <a:buNone/>
+              <a:defRPr sz="3920"/>
+            </a:lvl2pPr>
+            <a:lvl3pPr marL="1280160" indent="0">
+              <a:buNone/>
+              <a:defRPr sz="3360"/>
+            </a:lvl3pPr>
+            <a:lvl4pPr marL="1920240" indent="0">
               <a:buNone/>
               <a:defRPr sz="2800"/>
-            </a:lvl2pPr>
-            <a:lvl3pPr marL="914418" indent="0">
-              <a:buNone/>
-              <a:defRPr sz="2400"/>
-            </a:lvl3pPr>
-            <a:lvl4pPr marL="1371627" indent="0">
-              <a:buNone/>
-              <a:defRPr sz="2000"/>
             </a:lvl4pPr>
-            <a:lvl5pPr marL="1828837" indent="0">
-              <a:buNone/>
-              <a:defRPr sz="2000"/>
+            <a:lvl5pPr marL="2560320" indent="0">
+              <a:buNone/>
+              <a:defRPr sz="2800"/>
             </a:lvl5pPr>
-            <a:lvl6pPr marL="2286046" indent="0">
-              <a:buNone/>
-              <a:defRPr sz="2000"/>
+            <a:lvl6pPr marL="3200400" indent="0">
+              <a:buNone/>
+              <a:defRPr sz="2800"/>
             </a:lvl6pPr>
-            <a:lvl7pPr marL="2743255" indent="0">
-              <a:buNone/>
-              <a:defRPr sz="2000"/>
+            <a:lvl7pPr marL="3840480" indent="0">
+              <a:buNone/>
+              <a:defRPr sz="2800"/>
             </a:lvl7pPr>
-            <a:lvl8pPr marL="3200464" indent="0">
-              <a:buNone/>
-              <a:defRPr sz="2000"/>
+            <a:lvl8pPr marL="4480560" indent="0">
+              <a:buNone/>
+              <a:defRPr sz="2800"/>
             </a:lvl8pPr>
-            <a:lvl9pPr marL="3657673" indent="0">
-              <a:buNone/>
-              <a:defRPr sz="2000"/>
+            <a:lvl9pPr marL="5120640" indent="0">
+              <a:buNone/>
+              <a:defRPr sz="2800"/>
             </a:lvl9pPr>
           </a:lstStyle>
           <a:p>
@@ -4746,8 +4746,8 @@
         </p:nvSpPr>
         <p:spPr>
           <a:xfrm>
-            <a:off x="720069" y="6584092"/>
-            <a:ext cx="10914464" cy="955461"/>
+            <a:off x="960092" y="6584092"/>
+            <a:ext cx="14552619" cy="955461"/>
           </a:xfrm>
         </p:spPr>
         <p:txBody>
@@ -4755,39 +4755,39 @@
           <a:lstStyle>
             <a:lvl1pPr marL="0" indent="0" algn="l">
               <a:buNone/>
-              <a:defRPr sz="1600"/>
+              <a:defRPr sz="2240"/>
             </a:lvl1pPr>
-            <a:lvl2pPr marL="457209" indent="0">
+            <a:lvl2pPr marL="640080" indent="0">
+              <a:buNone/>
+              <a:defRPr sz="1960"/>
+            </a:lvl2pPr>
+            <a:lvl3pPr marL="1280160" indent="0">
+              <a:buNone/>
+              <a:defRPr sz="1680"/>
+            </a:lvl3pPr>
+            <a:lvl4pPr marL="1920240" indent="0">
               <a:buNone/>
               <a:defRPr sz="1400"/>
-            </a:lvl2pPr>
-            <a:lvl3pPr marL="914418" indent="0">
-              <a:buNone/>
-              <a:defRPr sz="1200"/>
-            </a:lvl3pPr>
-            <a:lvl4pPr marL="1371627" indent="0">
-              <a:buNone/>
-              <a:defRPr sz="1000"/>
             </a:lvl4pPr>
-            <a:lvl5pPr marL="1828837" indent="0">
-              <a:buNone/>
-              <a:defRPr sz="1000"/>
+            <a:lvl5pPr marL="2560320" indent="0">
+              <a:buNone/>
+              <a:defRPr sz="1400"/>
             </a:lvl5pPr>
-            <a:lvl6pPr marL="2286046" indent="0">
-              <a:buNone/>
-              <a:defRPr sz="1000"/>
+            <a:lvl6pPr marL="3200400" indent="0">
+              <a:buNone/>
+              <a:defRPr sz="1400"/>
             </a:lvl6pPr>
-            <a:lvl7pPr marL="2743255" indent="0">
-              <a:buNone/>
-              <a:defRPr sz="1000"/>
+            <a:lvl7pPr marL="3840480" indent="0">
+              <a:buNone/>
+              <a:defRPr sz="1400"/>
             </a:lvl7pPr>
-            <a:lvl8pPr marL="3200464" indent="0">
-              <a:buNone/>
-              <a:defRPr sz="1000"/>
+            <a:lvl8pPr marL="4480560" indent="0">
+              <a:buNone/>
+              <a:defRPr sz="1400"/>
             </a:lvl8pPr>
-            <a:lvl9pPr marL="3657673" indent="0">
-              <a:buNone/>
-              <a:defRPr sz="1000"/>
+            <a:lvl9pPr marL="5120640" indent="0">
+              <a:buNone/>
+              <a:defRPr sz="1400"/>
             </a:lvl9pPr>
           </a:lstStyle>
           <a:p>
@@ -4867,7 +4867,7 @@
     </p:spTree>
     <p:extLst>
       <p:ext uri="{BB962C8B-B14F-4D97-AF65-F5344CB8AC3E}">
-        <p14:creationId xmlns:p14="http://schemas.microsoft.com/office/powerpoint/2010/main" val="3566855963"/>
+        <p14:creationId xmlns:p14="http://schemas.microsoft.com/office/powerpoint/2010/main" val="2058264978"/>
       </p:ext>
     </p:extLst>
   </p:cSld>
@@ -4906,8 +4906,8 @@
         </p:nvSpPr>
         <p:spPr>
           <a:xfrm>
-            <a:off x="720091" y="960122"/>
-            <a:ext cx="10916747" cy="4472864"/>
+            <a:off x="960121" y="960121"/>
+            <a:ext cx="14555663" cy="4472864"/>
           </a:xfrm>
         </p:spPr>
         <p:txBody>
@@ -4916,7 +4916,7 @@
           </a:bodyPr>
           <a:lstStyle>
             <a:lvl1pPr algn="ctr">
-              <a:defRPr sz="4800"/>
+              <a:defRPr sz="6720"/>
             </a:lvl1pPr>
           </a:lstStyle>
           <a:p>
@@ -4940,8 +4940,8 @@
         </p:nvSpPr>
         <p:spPr>
           <a:xfrm>
-            <a:off x="720070" y="5748866"/>
-            <a:ext cx="10914465" cy="1783048"/>
+            <a:off x="960091" y="5748866"/>
+            <a:ext cx="14552621" cy="1783048"/>
           </a:xfrm>
         </p:spPr>
         <p:txBody>
@@ -4951,39 +4951,39 @@
           <a:lstStyle>
             <a:lvl1pPr marL="0" indent="0" algn="ctr">
               <a:buNone/>
-              <a:defRPr sz="1800"/>
+              <a:defRPr sz="2520"/>
             </a:lvl1pPr>
-            <a:lvl2pPr marL="457209" indent="0">
+            <a:lvl2pPr marL="640080" indent="0">
+              <a:buNone/>
+              <a:defRPr sz="1960"/>
+            </a:lvl2pPr>
+            <a:lvl3pPr marL="1280160" indent="0">
+              <a:buNone/>
+              <a:defRPr sz="1680"/>
+            </a:lvl3pPr>
+            <a:lvl4pPr marL="1920240" indent="0">
               <a:buNone/>
               <a:defRPr sz="1400"/>
-            </a:lvl2pPr>
-            <a:lvl3pPr marL="914418" indent="0">
-              <a:buNone/>
-              <a:defRPr sz="1200"/>
-            </a:lvl3pPr>
-            <a:lvl4pPr marL="1371627" indent="0">
-              <a:buNone/>
-              <a:defRPr sz="1000"/>
             </a:lvl4pPr>
-            <a:lvl5pPr marL="1828837" indent="0">
-              <a:buNone/>
-              <a:defRPr sz="1000"/>
+            <a:lvl5pPr marL="2560320" indent="0">
+              <a:buNone/>
+              <a:defRPr sz="1400"/>
             </a:lvl5pPr>
-            <a:lvl6pPr marL="2286046" indent="0">
-              <a:buNone/>
-              <a:defRPr sz="1000"/>
+            <a:lvl6pPr marL="3200400" indent="0">
+              <a:buNone/>
+              <a:defRPr sz="1400"/>
             </a:lvl6pPr>
-            <a:lvl7pPr marL="2743255" indent="0">
-              <a:buNone/>
-              <a:defRPr sz="1000"/>
+            <a:lvl7pPr marL="3840480" indent="0">
+              <a:buNone/>
+              <a:defRPr sz="1400"/>
             </a:lvl7pPr>
-            <a:lvl8pPr marL="3200464" indent="0">
-              <a:buNone/>
-              <a:defRPr sz="1000"/>
+            <a:lvl8pPr marL="4480560" indent="0">
+              <a:buNone/>
+              <a:defRPr sz="1400"/>
             </a:lvl8pPr>
-            <a:lvl9pPr marL="3657673" indent="0">
-              <a:buNone/>
-              <a:defRPr sz="1000"/>
+            <a:lvl9pPr marL="5120640" indent="0">
+              <a:buNone/>
+              <a:defRPr sz="1400"/>
             </a:lvl9pPr>
           </a:lstStyle>
           <a:p>
@@ -5063,7 +5063,7 @@
     </p:spTree>
     <p:extLst>
       <p:ext uri="{BB962C8B-B14F-4D97-AF65-F5344CB8AC3E}">
-        <p14:creationId xmlns:p14="http://schemas.microsoft.com/office/powerpoint/2010/main" val="2002628824"/>
+        <p14:creationId xmlns:p14="http://schemas.microsoft.com/office/powerpoint/2010/main" val="1322907293"/>
       </p:ext>
     </p:extLst>
   </p:cSld>
@@ -5102,8 +5102,8 @@
         </p:nvSpPr>
         <p:spPr>
           <a:xfrm>
-            <a:off x="1177820" y="960120"/>
-            <a:ext cx="10001271" cy="4083386"/>
+            <a:off x="1570425" y="960120"/>
+            <a:ext cx="13335028" cy="4083386"/>
           </a:xfrm>
         </p:spPr>
         <p:txBody>
@@ -5112,7 +5112,7 @@
           </a:bodyPr>
           <a:lstStyle>
             <a:lvl1pPr algn="ctr">
-              <a:defRPr sz="4800"/>
+              <a:defRPr sz="6720"/>
             </a:lvl1pPr>
           </a:lstStyle>
           <a:p>
@@ -5136,8 +5136,8 @@
         </p:nvSpPr>
         <p:spPr>
           <a:xfrm>
-            <a:off x="1627777" y="5054045"/>
-            <a:ext cx="9101354" cy="528875"/>
+            <a:off x="2170370" y="5054045"/>
+            <a:ext cx="12135138" cy="528875"/>
           </a:xfrm>
         </p:spPr>
         <p:txBody>
@@ -5147,7 +5147,7 @@
           <a:lstStyle>
             <a:lvl1pPr marL="0" indent="0" algn="r">
               <a:buNone/>
-              <a:defRPr sz="1400">
+              <a:defRPr sz="1960">
                 <a:solidFill>
                   <a:schemeClr val="tx1">
                     <a:lumMod val="50000"/>
@@ -5156,37 +5156,37 @@
                 </a:solidFill>
               </a:defRPr>
             </a:lvl1pPr>
-            <a:lvl2pPr marL="457209" indent="0">
+            <a:lvl2pPr marL="640080" indent="0">
+              <a:buNone/>
+              <a:defRPr sz="1960"/>
+            </a:lvl2pPr>
+            <a:lvl3pPr marL="1280160" indent="0">
+              <a:buNone/>
+              <a:defRPr sz="1680"/>
+            </a:lvl3pPr>
+            <a:lvl4pPr marL="1920240" indent="0">
               <a:buNone/>
               <a:defRPr sz="1400"/>
-            </a:lvl2pPr>
-            <a:lvl3pPr marL="914418" indent="0">
-              <a:buNone/>
-              <a:defRPr sz="1200"/>
-            </a:lvl3pPr>
-            <a:lvl4pPr marL="1371627" indent="0">
-              <a:buNone/>
-              <a:defRPr sz="1000"/>
             </a:lvl4pPr>
-            <a:lvl5pPr marL="1828837" indent="0">
-              <a:buNone/>
-              <a:defRPr sz="1000"/>
+            <a:lvl5pPr marL="2560320" indent="0">
+              <a:buNone/>
+              <a:defRPr sz="1400"/>
             </a:lvl5pPr>
-            <a:lvl6pPr marL="2286046" indent="0">
-              <a:buNone/>
-              <a:defRPr sz="1000"/>
+            <a:lvl6pPr marL="3200400" indent="0">
+              <a:buNone/>
+              <a:defRPr sz="1400"/>
             </a:lvl6pPr>
-            <a:lvl7pPr marL="2743255" indent="0">
-              <a:buNone/>
-              <a:defRPr sz="1000"/>
+            <a:lvl7pPr marL="3840480" indent="0">
+              <a:buNone/>
+              <a:defRPr sz="1400"/>
             </a:lvl7pPr>
-            <a:lvl8pPr marL="3200464" indent="0">
-              <a:buNone/>
-              <a:defRPr sz="1000"/>
+            <a:lvl8pPr marL="4480560" indent="0">
+              <a:buNone/>
+              <a:defRPr sz="1400"/>
             </a:lvl8pPr>
-            <a:lvl9pPr marL="3657673" indent="0">
-              <a:buNone/>
-              <a:defRPr sz="1000"/>
+            <a:lvl9pPr marL="5120640" indent="0">
+              <a:buNone/>
+              <a:defRPr sz="1400"/>
             </a:lvl9pPr>
           </a:lstStyle>
           <a:p>
@@ -5210,8 +5210,8 @@
         </p:nvSpPr>
         <p:spPr>
           <a:xfrm>
-            <a:off x="720091" y="5748869"/>
-            <a:ext cx="10916726" cy="1775553"/>
+            <a:off x="960121" y="5748868"/>
+            <a:ext cx="14555635" cy="1775553"/>
           </a:xfrm>
         </p:spPr>
         <p:txBody>
@@ -5221,39 +5221,39 @@
           <a:lstStyle>
             <a:lvl1pPr marL="0" indent="0" algn="ctr">
               <a:buNone/>
-              <a:defRPr sz="1800"/>
+              <a:defRPr sz="2520"/>
             </a:lvl1pPr>
-            <a:lvl2pPr marL="457209" indent="0">
+            <a:lvl2pPr marL="640080" indent="0">
+              <a:buNone/>
+              <a:defRPr sz="1960"/>
+            </a:lvl2pPr>
+            <a:lvl3pPr marL="1280160" indent="0">
+              <a:buNone/>
+              <a:defRPr sz="1680"/>
+            </a:lvl3pPr>
+            <a:lvl4pPr marL="1920240" indent="0">
               <a:buNone/>
               <a:defRPr sz="1400"/>
-            </a:lvl2pPr>
-            <a:lvl3pPr marL="914418" indent="0">
-              <a:buNone/>
-              <a:defRPr sz="1200"/>
-            </a:lvl3pPr>
-            <a:lvl4pPr marL="1371627" indent="0">
-              <a:buNone/>
-              <a:defRPr sz="1000"/>
             </a:lvl4pPr>
-            <a:lvl5pPr marL="1828837" indent="0">
-              <a:buNone/>
-              <a:defRPr sz="1000"/>
+            <a:lvl5pPr marL="2560320" indent="0">
+              <a:buNone/>
+              <a:defRPr sz="1400"/>
             </a:lvl5pPr>
-            <a:lvl6pPr marL="2286046" indent="0">
-              <a:buNone/>
-              <a:defRPr sz="1000"/>
+            <a:lvl6pPr marL="3200400" indent="0">
+              <a:buNone/>
+              <a:defRPr sz="1400"/>
             </a:lvl6pPr>
-            <a:lvl7pPr marL="2743255" indent="0">
-              <a:buNone/>
-              <a:defRPr sz="1000"/>
+            <a:lvl7pPr marL="3840480" indent="0">
+              <a:buNone/>
+              <a:defRPr sz="1400"/>
             </a:lvl7pPr>
-            <a:lvl8pPr marL="3200464" indent="0">
-              <a:buNone/>
-              <a:defRPr sz="1000"/>
+            <a:lvl8pPr marL="4480560" indent="0">
+              <a:buNone/>
+              <a:defRPr sz="1400"/>
             </a:lvl8pPr>
-            <a:lvl9pPr marL="3657673" indent="0">
-              <a:buNone/>
-              <a:defRPr sz="1000"/>
+            <a:lvl9pPr marL="5120640" indent="0">
+              <a:buNone/>
+              <a:defRPr sz="1400"/>
             </a:lvl9pPr>
           </a:lstStyle>
           <a:p>
@@ -5338,15 +5338,15 @@
         </p:nvSpPr>
         <p:spPr>
           <a:xfrm>
-            <a:off x="720091" y="1249679"/>
-            <a:ext cx="640080" cy="818686"/>
+            <a:off x="960121" y="1249679"/>
+            <a:ext cx="853440" cy="818686"/>
           </a:xfrm>
           <a:prstGeom prst="rect">
             <a:avLst/>
           </a:prstGeom>
         </p:spPr>
         <p:txBody>
-          <a:bodyPr vert="horz" lIns="91440" tIns="45720" rIns="91440" bIns="45720" rtlCol="0" anchor="ctr">
+          <a:bodyPr vert="horz" lIns="128016" tIns="64008" rIns="128016" bIns="64008" rtlCol="0" anchor="ctr">
             <a:noAutofit/>
           </a:bodyPr>
           <a:lstStyle>
@@ -5435,7 +5435,7 @@
           <a:p>
             <a:pPr lvl="0"/>
             <a:r>
-              <a:rPr lang="en-US" sz="8000" dirty="0">
+              <a:rPr lang="en-US" sz="11200" dirty="0">
                 <a:solidFill>
                   <a:schemeClr val="tx1"/>
                 </a:solidFill>
@@ -5454,15 +5454,15 @@
         </p:nvSpPr>
         <p:spPr>
           <a:xfrm>
-            <a:off x="10996737" y="4091958"/>
-            <a:ext cx="640080" cy="818686"/>
+            <a:off x="14662316" y="4091958"/>
+            <a:ext cx="853440" cy="818686"/>
           </a:xfrm>
           <a:prstGeom prst="rect">
             <a:avLst/>
           </a:prstGeom>
         </p:spPr>
         <p:txBody>
-          <a:bodyPr vert="horz" lIns="91440" tIns="45720" rIns="91440" bIns="45720" rtlCol="0" anchor="ctr">
+          <a:bodyPr vert="horz" lIns="128016" tIns="64008" rIns="128016" bIns="64008" rtlCol="0" anchor="ctr">
             <a:noAutofit/>
           </a:bodyPr>
           <a:lstStyle>
@@ -5551,7 +5551,7 @@
           <a:p>
             <a:pPr lvl="0" algn="r"/>
             <a:r>
-              <a:rPr lang="en-US" sz="8000" dirty="0">
+              <a:rPr lang="en-US" sz="11200" dirty="0">
                 <a:solidFill>
                   <a:schemeClr val="tx1"/>
                 </a:solidFill>
@@ -5565,7 +5565,7 @@
     </p:spTree>
     <p:extLst>
       <p:ext uri="{BB962C8B-B14F-4D97-AF65-F5344CB8AC3E}">
-        <p14:creationId xmlns:p14="http://schemas.microsoft.com/office/powerpoint/2010/main" val="1583149277"/>
+        <p14:creationId xmlns:p14="http://schemas.microsoft.com/office/powerpoint/2010/main" val="1778362129"/>
       </p:ext>
     </p:extLst>
   </p:cSld>
@@ -5604,8 +5604,8 @@
         </p:nvSpPr>
         <p:spPr>
           <a:xfrm>
-            <a:off x="720092" y="2413398"/>
-            <a:ext cx="10914442" cy="3516569"/>
+            <a:off x="960121" y="2413396"/>
+            <a:ext cx="14552590" cy="3516569"/>
           </a:xfrm>
         </p:spPr>
         <p:txBody>
@@ -5614,7 +5614,7 @@
           </a:bodyPr>
           <a:lstStyle>
             <a:lvl1pPr algn="l">
-              <a:defRPr sz="4800"/>
+              <a:defRPr sz="6720"/>
             </a:lvl1pPr>
           </a:lstStyle>
           <a:p>
@@ -5638,8 +5638,8 @@
         </p:nvSpPr>
         <p:spPr>
           <a:xfrm>
-            <a:off x="720092" y="5946455"/>
-            <a:ext cx="10914442" cy="1596902"/>
+            <a:off x="960121" y="5946455"/>
+            <a:ext cx="14552590" cy="1596902"/>
           </a:xfrm>
         </p:spPr>
         <p:txBody>
@@ -5649,39 +5649,39 @@
           <a:lstStyle>
             <a:lvl1pPr marL="0" indent="0" algn="l">
               <a:buNone/>
-              <a:defRPr sz="1800"/>
+              <a:defRPr sz="2520"/>
             </a:lvl1pPr>
-            <a:lvl2pPr marL="457209" indent="0">
+            <a:lvl2pPr marL="640080" indent="0">
+              <a:buNone/>
+              <a:defRPr sz="1960"/>
+            </a:lvl2pPr>
+            <a:lvl3pPr marL="1280160" indent="0">
+              <a:buNone/>
+              <a:defRPr sz="1680"/>
+            </a:lvl3pPr>
+            <a:lvl4pPr marL="1920240" indent="0">
               <a:buNone/>
               <a:defRPr sz="1400"/>
-            </a:lvl2pPr>
-            <a:lvl3pPr marL="914418" indent="0">
-              <a:buNone/>
-              <a:defRPr sz="1200"/>
-            </a:lvl3pPr>
-            <a:lvl4pPr marL="1371627" indent="0">
-              <a:buNone/>
-              <a:defRPr sz="1000"/>
             </a:lvl4pPr>
-            <a:lvl5pPr marL="1828837" indent="0">
-              <a:buNone/>
-              <a:defRPr sz="1000"/>
+            <a:lvl5pPr marL="2560320" indent="0">
+              <a:buNone/>
+              <a:defRPr sz="1400"/>
             </a:lvl5pPr>
-            <a:lvl6pPr marL="2286046" indent="0">
-              <a:buNone/>
-              <a:defRPr sz="1000"/>
+            <a:lvl6pPr marL="3200400" indent="0">
+              <a:buNone/>
+              <a:defRPr sz="1400"/>
             </a:lvl6pPr>
-            <a:lvl7pPr marL="2743255" indent="0">
-              <a:buNone/>
-              <a:defRPr sz="1000"/>
+            <a:lvl7pPr marL="3840480" indent="0">
+              <a:buNone/>
+              <a:defRPr sz="1400"/>
             </a:lvl7pPr>
-            <a:lvl8pPr marL="3200464" indent="0">
-              <a:buNone/>
-              <a:defRPr sz="1000"/>
+            <a:lvl8pPr marL="4480560" indent="0">
+              <a:buNone/>
+              <a:defRPr sz="1400"/>
             </a:lvl8pPr>
-            <a:lvl9pPr marL="3657673" indent="0">
-              <a:buNone/>
-              <a:defRPr sz="1000"/>
+            <a:lvl9pPr marL="5120640" indent="0">
+              <a:buNone/>
+              <a:defRPr sz="1400"/>
             </a:lvl9pPr>
           </a:lstStyle>
           <a:p>
@@ -5761,7 +5761,7 @@
     </p:spTree>
     <p:extLst>
       <p:ext uri="{BB962C8B-B14F-4D97-AF65-F5344CB8AC3E}">
-        <p14:creationId xmlns:p14="http://schemas.microsoft.com/office/powerpoint/2010/main" val="1726333492"/>
+        <p14:creationId xmlns:p14="http://schemas.microsoft.com/office/powerpoint/2010/main" val="984644337"/>
       </p:ext>
     </p:extLst>
   </p:cSld>
@@ -5800,8 +5800,8 @@
         </p:nvSpPr>
         <p:spPr>
           <a:xfrm>
-            <a:off x="720092" y="960122"/>
-            <a:ext cx="10914441" cy="1612751"/>
+            <a:off x="960123" y="960121"/>
+            <a:ext cx="14552588" cy="1612751"/>
           </a:xfrm>
         </p:spPr>
         <p:txBody>
@@ -5832,8 +5832,8 @@
         </p:nvSpPr>
         <p:spPr>
           <a:xfrm>
-            <a:off x="720092" y="2888753"/>
-            <a:ext cx="3475634" cy="806767"/>
+            <a:off x="960123" y="2888753"/>
+            <a:ext cx="4634179" cy="806767"/>
           </a:xfrm>
         </p:spPr>
         <p:txBody>
@@ -5846,43 +5846,43 @@
                 <a:spcPct val="90000"/>
               </a:lnSpc>
               <a:buNone/>
-              <a:defRPr sz="2400" b="0">
+              <a:defRPr sz="3360" b="0">
                 <a:solidFill>
                   <a:schemeClr val="accent1"/>
                 </a:solidFill>
               </a:defRPr>
             </a:lvl1pPr>
-            <a:lvl2pPr marL="457209" indent="0">
-              <a:buNone/>
-              <a:defRPr sz="2000" b="1"/>
+            <a:lvl2pPr marL="640080" indent="0">
+              <a:buNone/>
+              <a:defRPr sz="2800" b="1"/>
             </a:lvl2pPr>
-            <a:lvl3pPr marL="914418" indent="0">
-              <a:buNone/>
-              <a:defRPr sz="1800" b="1"/>
+            <a:lvl3pPr marL="1280160" indent="0">
+              <a:buNone/>
+              <a:defRPr sz="2520" b="1"/>
             </a:lvl3pPr>
-            <a:lvl4pPr marL="1371627" indent="0">
-              <a:buNone/>
-              <a:defRPr sz="1600" b="1"/>
+            <a:lvl4pPr marL="1920240" indent="0">
+              <a:buNone/>
+              <a:defRPr sz="2240" b="1"/>
             </a:lvl4pPr>
-            <a:lvl5pPr marL="1828837" indent="0">
-              <a:buNone/>
-              <a:defRPr sz="1600" b="1"/>
+            <a:lvl5pPr marL="2560320" indent="0">
+              <a:buNone/>
+              <a:defRPr sz="2240" b="1"/>
             </a:lvl5pPr>
-            <a:lvl6pPr marL="2286046" indent="0">
-              <a:buNone/>
-              <a:defRPr sz="1600" b="1"/>
+            <a:lvl6pPr marL="3200400" indent="0">
+              <a:buNone/>
+              <a:defRPr sz="2240" b="1"/>
             </a:lvl6pPr>
-            <a:lvl7pPr marL="2743255" indent="0">
-              <a:buNone/>
-              <a:defRPr sz="1600" b="1"/>
+            <a:lvl7pPr marL="3840480" indent="0">
+              <a:buNone/>
+              <a:defRPr sz="2240" b="1"/>
             </a:lvl7pPr>
-            <a:lvl8pPr marL="3200464" indent="0">
-              <a:buNone/>
-              <a:defRPr sz="1600" b="1"/>
+            <a:lvl8pPr marL="4480560" indent="0">
+              <a:buNone/>
+              <a:defRPr sz="2240" b="1"/>
             </a:lvl8pPr>
-            <a:lvl9pPr marL="3657673" indent="0">
-              <a:buNone/>
-              <a:defRPr sz="1600" b="1"/>
+            <a:lvl9pPr marL="5120640" indent="0">
+              <a:buNone/>
+              <a:defRPr sz="2240" b="1"/>
             </a:lvl9pPr>
           </a:lstStyle>
           <a:p>
@@ -5906,8 +5906,8 @@
         </p:nvSpPr>
         <p:spPr>
           <a:xfrm>
-            <a:off x="720092" y="3695521"/>
-            <a:ext cx="3475634" cy="3828899"/>
+            <a:off x="960123" y="3695521"/>
+            <a:ext cx="4634179" cy="3828899"/>
           </a:xfrm>
         </p:spPr>
         <p:txBody>
@@ -5917,39 +5917,39 @@
           <a:lstStyle>
             <a:lvl1pPr marL="0" indent="0" algn="ctr">
               <a:buNone/>
+              <a:defRPr sz="1960"/>
+            </a:lvl1pPr>
+            <a:lvl2pPr marL="640080" indent="0">
+              <a:buNone/>
+              <a:defRPr sz="1680"/>
+            </a:lvl2pPr>
+            <a:lvl3pPr marL="1280160" indent="0">
+              <a:buNone/>
               <a:defRPr sz="1400"/>
-            </a:lvl1pPr>
-            <a:lvl2pPr marL="457209" indent="0">
-              <a:buNone/>
-              <a:defRPr sz="1200"/>
-            </a:lvl2pPr>
-            <a:lvl3pPr marL="914418" indent="0">
-              <a:buNone/>
-              <a:defRPr sz="1000"/>
             </a:lvl3pPr>
-            <a:lvl4pPr marL="1371627" indent="0">
-              <a:buNone/>
-              <a:defRPr sz="900"/>
+            <a:lvl4pPr marL="1920240" indent="0">
+              <a:buNone/>
+              <a:defRPr sz="1260"/>
             </a:lvl4pPr>
-            <a:lvl5pPr marL="1828837" indent="0">
-              <a:buNone/>
-              <a:defRPr sz="900"/>
+            <a:lvl5pPr marL="2560320" indent="0">
+              <a:buNone/>
+              <a:defRPr sz="1260"/>
             </a:lvl5pPr>
-            <a:lvl6pPr marL="2286046" indent="0">
-              <a:buNone/>
-              <a:defRPr sz="900"/>
+            <a:lvl6pPr marL="3200400" indent="0">
+              <a:buNone/>
+              <a:defRPr sz="1260"/>
             </a:lvl6pPr>
-            <a:lvl7pPr marL="2743255" indent="0">
-              <a:buNone/>
-              <a:defRPr sz="900"/>
+            <a:lvl7pPr marL="3840480" indent="0">
+              <a:buNone/>
+              <a:defRPr sz="1260"/>
             </a:lvl7pPr>
-            <a:lvl8pPr marL="3200464" indent="0">
-              <a:buNone/>
-              <a:defRPr sz="900"/>
+            <a:lvl8pPr marL="4480560" indent="0">
+              <a:buNone/>
+              <a:defRPr sz="1260"/>
             </a:lvl8pPr>
-            <a:lvl9pPr marL="3657673" indent="0">
-              <a:buNone/>
-              <a:defRPr sz="900"/>
+            <a:lvl9pPr marL="5120640" indent="0">
+              <a:buNone/>
+              <a:defRPr sz="1260"/>
             </a:lvl9pPr>
           </a:lstStyle>
           <a:p>
@@ -5973,8 +5973,8 @@
         </p:nvSpPr>
         <p:spPr>
           <a:xfrm>
-            <a:off x="4446353" y="2888753"/>
-            <a:ext cx="3475634" cy="806767"/>
+            <a:off x="5928471" y="2888753"/>
+            <a:ext cx="4634179" cy="806767"/>
           </a:xfrm>
         </p:spPr>
         <p:txBody>
@@ -5987,43 +5987,43 @@
                 <a:spcPct val="90000"/>
               </a:lnSpc>
               <a:buNone/>
-              <a:defRPr sz="2400" b="0">
+              <a:defRPr sz="3360" b="0">
                 <a:solidFill>
                   <a:schemeClr val="accent1"/>
                 </a:solidFill>
               </a:defRPr>
             </a:lvl1pPr>
-            <a:lvl2pPr marL="457209" indent="0">
-              <a:buNone/>
-              <a:defRPr sz="2000" b="1"/>
+            <a:lvl2pPr marL="640080" indent="0">
+              <a:buNone/>
+              <a:defRPr sz="2800" b="1"/>
             </a:lvl2pPr>
-            <a:lvl3pPr marL="914418" indent="0">
-              <a:buNone/>
-              <a:defRPr sz="1800" b="1"/>
+            <a:lvl3pPr marL="1280160" indent="0">
+              <a:buNone/>
+              <a:defRPr sz="2520" b="1"/>
             </a:lvl3pPr>
-            <a:lvl4pPr marL="1371627" indent="0">
-              <a:buNone/>
-              <a:defRPr sz="1600" b="1"/>
+            <a:lvl4pPr marL="1920240" indent="0">
+              <a:buNone/>
+              <a:defRPr sz="2240" b="1"/>
             </a:lvl4pPr>
-            <a:lvl5pPr marL="1828837" indent="0">
-              <a:buNone/>
-              <a:defRPr sz="1600" b="1"/>
+            <a:lvl5pPr marL="2560320" indent="0">
+              <a:buNone/>
+              <a:defRPr sz="2240" b="1"/>
             </a:lvl5pPr>
-            <a:lvl6pPr marL="2286046" indent="0">
-              <a:buNone/>
-              <a:defRPr sz="1600" b="1"/>
+            <a:lvl6pPr marL="3200400" indent="0">
+              <a:buNone/>
+              <a:defRPr sz="2240" b="1"/>
             </a:lvl6pPr>
-            <a:lvl7pPr marL="2743255" indent="0">
-              <a:buNone/>
-              <a:defRPr sz="1600" b="1"/>
+            <a:lvl7pPr marL="3840480" indent="0">
+              <a:buNone/>
+              <a:defRPr sz="2240" b="1"/>
             </a:lvl7pPr>
-            <a:lvl8pPr marL="3200464" indent="0">
-              <a:buNone/>
-              <a:defRPr sz="1600" b="1"/>
+            <a:lvl8pPr marL="4480560" indent="0">
+              <a:buNone/>
+              <a:defRPr sz="2240" b="1"/>
             </a:lvl8pPr>
-            <a:lvl9pPr marL="3657673" indent="0">
-              <a:buNone/>
-              <a:defRPr sz="1600" b="1"/>
+            <a:lvl9pPr marL="5120640" indent="0">
+              <a:buNone/>
+              <a:defRPr sz="2240" b="1"/>
             </a:lvl9pPr>
           </a:lstStyle>
           <a:p>
@@ -6047,8 +6047,8 @@
         </p:nvSpPr>
         <p:spPr>
           <a:xfrm>
-            <a:off x="4446352" y="3695521"/>
-            <a:ext cx="3475634" cy="3828899"/>
+            <a:off x="5928470" y="3695521"/>
+            <a:ext cx="4634179" cy="3828899"/>
           </a:xfrm>
         </p:spPr>
         <p:txBody>
@@ -6058,39 +6058,39 @@
           <a:lstStyle>
             <a:lvl1pPr marL="0" indent="0" algn="ctr">
               <a:buNone/>
+              <a:defRPr sz="1960"/>
+            </a:lvl1pPr>
+            <a:lvl2pPr marL="640080" indent="0">
+              <a:buNone/>
+              <a:defRPr sz="1680"/>
+            </a:lvl2pPr>
+            <a:lvl3pPr marL="1280160" indent="0">
+              <a:buNone/>
               <a:defRPr sz="1400"/>
-            </a:lvl1pPr>
-            <a:lvl2pPr marL="457209" indent="0">
-              <a:buNone/>
-              <a:defRPr sz="1200"/>
-            </a:lvl2pPr>
-            <a:lvl3pPr marL="914418" indent="0">
-              <a:buNone/>
-              <a:defRPr sz="1000"/>
             </a:lvl3pPr>
-            <a:lvl4pPr marL="1371627" indent="0">
-              <a:buNone/>
-              <a:defRPr sz="900"/>
+            <a:lvl4pPr marL="1920240" indent="0">
+              <a:buNone/>
+              <a:defRPr sz="1260"/>
             </a:lvl4pPr>
-            <a:lvl5pPr marL="1828837" indent="0">
-              <a:buNone/>
-              <a:defRPr sz="900"/>
+            <a:lvl5pPr marL="2560320" indent="0">
+              <a:buNone/>
+              <a:defRPr sz="1260"/>
             </a:lvl5pPr>
-            <a:lvl6pPr marL="2286046" indent="0">
-              <a:buNone/>
-              <a:defRPr sz="900"/>
+            <a:lvl6pPr marL="3200400" indent="0">
+              <a:buNone/>
+              <a:defRPr sz="1260"/>
             </a:lvl6pPr>
-            <a:lvl7pPr marL="2743255" indent="0">
-              <a:buNone/>
-              <a:defRPr sz="900"/>
+            <a:lvl7pPr marL="3840480" indent="0">
+              <a:buNone/>
+              <a:defRPr sz="1260"/>
             </a:lvl7pPr>
-            <a:lvl8pPr marL="3200464" indent="0">
-              <a:buNone/>
-              <a:defRPr sz="900"/>
+            <a:lvl8pPr marL="4480560" indent="0">
+              <a:buNone/>
+              <a:defRPr sz="1260"/>
             </a:lvl8pPr>
-            <a:lvl9pPr marL="3657673" indent="0">
-              <a:buNone/>
-              <a:defRPr sz="900"/>
+            <a:lvl9pPr marL="5120640" indent="0">
+              <a:buNone/>
+              <a:defRPr sz="1260"/>
             </a:lvl9pPr>
           </a:lstStyle>
           <a:p>
@@ -6114,8 +6114,8 @@
         </p:nvSpPr>
         <p:spPr>
           <a:xfrm>
-            <a:off x="8158899" y="2888753"/>
-            <a:ext cx="3475634" cy="806767"/>
+            <a:off x="10878532" y="2888753"/>
+            <a:ext cx="4634179" cy="806767"/>
           </a:xfrm>
         </p:spPr>
         <p:txBody>
@@ -6128,43 +6128,43 @@
                 <a:spcPct val="90000"/>
               </a:lnSpc>
               <a:buNone/>
-              <a:defRPr sz="2400" b="0">
+              <a:defRPr sz="3360" b="0">
                 <a:solidFill>
                   <a:schemeClr val="accent1"/>
                 </a:solidFill>
               </a:defRPr>
             </a:lvl1pPr>
-            <a:lvl2pPr marL="457209" indent="0">
-              <a:buNone/>
-              <a:defRPr sz="2000" b="1"/>
+            <a:lvl2pPr marL="640080" indent="0">
+              <a:buNone/>
+              <a:defRPr sz="2800" b="1"/>
             </a:lvl2pPr>
-            <a:lvl3pPr marL="914418" indent="0">
-              <a:buNone/>
-              <a:defRPr sz="1800" b="1"/>
+            <a:lvl3pPr marL="1280160" indent="0">
+              <a:buNone/>
+              <a:defRPr sz="2520" b="1"/>
             </a:lvl3pPr>
-            <a:lvl4pPr marL="1371627" indent="0">
-              <a:buNone/>
-              <a:defRPr sz="1600" b="1"/>
+            <a:lvl4pPr marL="1920240" indent="0">
+              <a:buNone/>
+              <a:defRPr sz="2240" b="1"/>
             </a:lvl4pPr>
-            <a:lvl5pPr marL="1828837" indent="0">
-              <a:buNone/>
-              <a:defRPr sz="1600" b="1"/>
+            <a:lvl5pPr marL="2560320" indent="0">
+              <a:buNone/>
+              <a:defRPr sz="2240" b="1"/>
             </a:lvl5pPr>
-            <a:lvl6pPr marL="2286046" indent="0">
-              <a:buNone/>
-              <a:defRPr sz="1600" b="1"/>
+            <a:lvl6pPr marL="3200400" indent="0">
+              <a:buNone/>
+              <a:defRPr sz="2240" b="1"/>
             </a:lvl6pPr>
-            <a:lvl7pPr marL="2743255" indent="0">
-              <a:buNone/>
-              <a:defRPr sz="1600" b="1"/>
+            <a:lvl7pPr marL="3840480" indent="0">
+              <a:buNone/>
+              <a:defRPr sz="2240" b="1"/>
             </a:lvl7pPr>
-            <a:lvl8pPr marL="3200464" indent="0">
-              <a:buNone/>
-              <a:defRPr sz="1600" b="1"/>
+            <a:lvl8pPr marL="4480560" indent="0">
+              <a:buNone/>
+              <a:defRPr sz="2240" b="1"/>
             </a:lvl8pPr>
-            <a:lvl9pPr marL="3657673" indent="0">
-              <a:buNone/>
-              <a:defRPr sz="1600" b="1"/>
+            <a:lvl9pPr marL="5120640" indent="0">
+              <a:buNone/>
+              <a:defRPr sz="2240" b="1"/>
             </a:lvl9pPr>
           </a:lstStyle>
           <a:p>
@@ -6188,8 +6188,8 @@
         </p:nvSpPr>
         <p:spPr>
           <a:xfrm>
-            <a:off x="8158899" y="3695521"/>
-            <a:ext cx="3475634" cy="3828899"/>
+            <a:off x="10878532" y="3695521"/>
+            <a:ext cx="4634179" cy="3828899"/>
           </a:xfrm>
         </p:spPr>
         <p:txBody>
@@ -6199,39 +6199,39 @@
           <a:lstStyle>
             <a:lvl1pPr marL="0" indent="0" algn="ctr">
               <a:buNone/>
+              <a:defRPr sz="1960"/>
+            </a:lvl1pPr>
+            <a:lvl2pPr marL="640080" indent="0">
+              <a:buNone/>
+              <a:defRPr sz="1680"/>
+            </a:lvl2pPr>
+            <a:lvl3pPr marL="1280160" indent="0">
+              <a:buNone/>
               <a:defRPr sz="1400"/>
-            </a:lvl1pPr>
-            <a:lvl2pPr marL="457209" indent="0">
-              <a:buNone/>
-              <a:defRPr sz="1200"/>
-            </a:lvl2pPr>
-            <a:lvl3pPr marL="914418" indent="0">
-              <a:buNone/>
-              <a:defRPr sz="1000"/>
             </a:lvl3pPr>
-            <a:lvl4pPr marL="1371627" indent="0">
-              <a:buNone/>
-              <a:defRPr sz="900"/>
+            <a:lvl4pPr marL="1920240" indent="0">
+              <a:buNone/>
+              <a:defRPr sz="1260"/>
             </a:lvl4pPr>
-            <a:lvl5pPr marL="1828837" indent="0">
-              <a:buNone/>
-              <a:defRPr sz="900"/>
+            <a:lvl5pPr marL="2560320" indent="0">
+              <a:buNone/>
+              <a:defRPr sz="1260"/>
             </a:lvl5pPr>
-            <a:lvl6pPr marL="2286046" indent="0">
-              <a:buNone/>
-              <a:defRPr sz="900"/>
+            <a:lvl6pPr marL="3200400" indent="0">
+              <a:buNone/>
+              <a:defRPr sz="1260"/>
             </a:lvl6pPr>
-            <a:lvl7pPr marL="2743255" indent="0">
-              <a:buNone/>
-              <a:defRPr sz="900"/>
+            <a:lvl7pPr marL="3840480" indent="0">
+              <a:buNone/>
+              <a:defRPr sz="1260"/>
             </a:lvl7pPr>
-            <a:lvl8pPr marL="3200464" indent="0">
-              <a:buNone/>
-              <a:defRPr sz="900"/>
+            <a:lvl8pPr marL="4480560" indent="0">
+              <a:buNone/>
+              <a:defRPr sz="1260"/>
             </a:lvl8pPr>
-            <a:lvl9pPr marL="3657673" indent="0">
-              <a:buNone/>
-              <a:defRPr sz="900"/>
+            <a:lvl9pPr marL="5120640" indent="0">
+              <a:buNone/>
+              <a:defRPr sz="1260"/>
             </a:lvl9pPr>
           </a:lstStyle>
           <a:p>
@@ -6311,7 +6311,7 @@
     </p:spTree>
     <p:extLst>
       <p:ext uri="{BB962C8B-B14F-4D97-AF65-F5344CB8AC3E}">
-        <p14:creationId xmlns:p14="http://schemas.microsoft.com/office/powerpoint/2010/main" val="944122928"/>
+        <p14:creationId xmlns:p14="http://schemas.microsoft.com/office/powerpoint/2010/main" val="2489081633"/>
       </p:ext>
     </p:extLst>
   </p:cSld>
@@ -6350,8 +6350,8 @@
         </p:nvSpPr>
         <p:spPr>
           <a:xfrm>
-            <a:off x="720091" y="960122"/>
-            <a:ext cx="10916726" cy="1612751"/>
+            <a:off x="960121" y="960121"/>
+            <a:ext cx="14555635" cy="1612751"/>
           </a:xfrm>
         </p:spPr>
         <p:txBody>
@@ -6382,8 +6382,8 @@
         </p:nvSpPr>
         <p:spPr>
           <a:xfrm>
-            <a:off x="726432" y="5338235"/>
-            <a:ext cx="3475634" cy="806767"/>
+            <a:off x="968576" y="5338235"/>
+            <a:ext cx="4634179" cy="806767"/>
           </a:xfrm>
         </p:spPr>
         <p:txBody>
@@ -6396,43 +6396,43 @@
                 <a:spcPct val="90000"/>
               </a:lnSpc>
               <a:buNone/>
-              <a:defRPr sz="2200" b="0">
+              <a:defRPr sz="3080" b="0">
                 <a:solidFill>
                   <a:schemeClr val="accent1"/>
                 </a:solidFill>
               </a:defRPr>
             </a:lvl1pPr>
-            <a:lvl2pPr marL="457209" indent="0">
-              <a:buNone/>
-              <a:defRPr sz="2000" b="1"/>
+            <a:lvl2pPr marL="640080" indent="0">
+              <a:buNone/>
+              <a:defRPr sz="2800" b="1"/>
             </a:lvl2pPr>
-            <a:lvl3pPr marL="914418" indent="0">
-              <a:buNone/>
-              <a:defRPr sz="1800" b="1"/>
+            <a:lvl3pPr marL="1280160" indent="0">
+              <a:buNone/>
+              <a:defRPr sz="2520" b="1"/>
             </a:lvl3pPr>
-            <a:lvl4pPr marL="1371627" indent="0">
-              <a:buNone/>
-              <a:defRPr sz="1600" b="1"/>
+            <a:lvl4pPr marL="1920240" indent="0">
+              <a:buNone/>
+              <a:defRPr sz="2240" b="1"/>
             </a:lvl4pPr>
-            <a:lvl5pPr marL="1828837" indent="0">
-              <a:buNone/>
-              <a:defRPr sz="1600" b="1"/>
+            <a:lvl5pPr marL="2560320" indent="0">
+              <a:buNone/>
+              <a:defRPr sz="2240" b="1"/>
             </a:lvl5pPr>
-            <a:lvl6pPr marL="2286046" indent="0">
-              <a:buNone/>
-              <a:defRPr sz="1600" b="1"/>
+            <a:lvl6pPr marL="3200400" indent="0">
+              <a:buNone/>
+              <a:defRPr sz="2240" b="1"/>
             </a:lvl6pPr>
-            <a:lvl7pPr marL="2743255" indent="0">
-              <a:buNone/>
-              <a:defRPr sz="1600" b="1"/>
+            <a:lvl7pPr marL="3840480" indent="0">
+              <a:buNone/>
+              <a:defRPr sz="2240" b="1"/>
             </a:lvl7pPr>
-            <a:lvl8pPr marL="3200464" indent="0">
-              <a:buNone/>
-              <a:defRPr sz="1600" b="1"/>
+            <a:lvl8pPr marL="4480560" indent="0">
+              <a:buNone/>
+              <a:defRPr sz="2240" b="1"/>
             </a:lvl8pPr>
-            <a:lvl9pPr marL="3657673" indent="0">
-              <a:buNone/>
-              <a:defRPr sz="1600" b="1"/>
+            <a:lvl9pPr marL="5120640" indent="0">
+              <a:buNone/>
+              <a:defRPr sz="2240" b="1"/>
             </a:lvl9pPr>
           </a:lstStyle>
           <a:p>
@@ -6456,8 +6456,8 @@
         </p:nvSpPr>
         <p:spPr>
           <a:xfrm>
-            <a:off x="720069" y="2888755"/>
-            <a:ext cx="3475634" cy="2151415"/>
+            <a:off x="960092" y="2888754"/>
+            <a:ext cx="4634179" cy="2151415"/>
           </a:xfrm>
           <a:prstGeom prst="roundRect">
             <a:avLst>
@@ -6480,39 +6480,39 @@
           <a:lstStyle>
             <a:lvl1pPr marL="0" indent="0" algn="ctr">
               <a:buNone/>
-              <a:defRPr sz="1600"/>
+              <a:defRPr sz="2240"/>
             </a:lvl1pPr>
-            <a:lvl2pPr marL="457209" indent="0">
-              <a:buNone/>
-              <a:defRPr sz="1600"/>
+            <a:lvl2pPr marL="640080" indent="0">
+              <a:buNone/>
+              <a:defRPr sz="2240"/>
             </a:lvl2pPr>
-            <a:lvl3pPr marL="914418" indent="0">
-              <a:buNone/>
-              <a:defRPr sz="1600"/>
+            <a:lvl3pPr marL="1280160" indent="0">
+              <a:buNone/>
+              <a:defRPr sz="2240"/>
             </a:lvl3pPr>
-            <a:lvl4pPr marL="1371627" indent="0">
-              <a:buNone/>
-              <a:defRPr sz="1600"/>
+            <a:lvl4pPr marL="1920240" indent="0">
+              <a:buNone/>
+              <a:defRPr sz="2240"/>
             </a:lvl4pPr>
-            <a:lvl5pPr marL="1828837" indent="0">
-              <a:buNone/>
-              <a:defRPr sz="1600"/>
+            <a:lvl5pPr marL="2560320" indent="0">
+              <a:buNone/>
+              <a:defRPr sz="2240"/>
             </a:lvl5pPr>
-            <a:lvl6pPr marL="2286046" indent="0">
-              <a:buNone/>
-              <a:defRPr sz="1600"/>
+            <a:lvl6pPr marL="3200400" indent="0">
+              <a:buNone/>
+              <a:defRPr sz="2240"/>
             </a:lvl6pPr>
-            <a:lvl7pPr marL="2743255" indent="0">
-              <a:buNone/>
-              <a:defRPr sz="1600"/>
+            <a:lvl7pPr marL="3840480" indent="0">
+              <a:buNone/>
+              <a:defRPr sz="2240"/>
             </a:lvl7pPr>
-            <a:lvl8pPr marL="3200464" indent="0">
-              <a:buNone/>
-              <a:defRPr sz="1600"/>
+            <a:lvl8pPr marL="4480560" indent="0">
+              <a:buNone/>
+              <a:defRPr sz="2240"/>
             </a:lvl8pPr>
-            <a:lvl9pPr marL="3657673" indent="0">
-              <a:buNone/>
-              <a:defRPr sz="1600"/>
+            <a:lvl9pPr marL="5120640" indent="0">
+              <a:buNone/>
+              <a:defRPr sz="2240"/>
             </a:lvl9pPr>
           </a:lstStyle>
           <a:p>
@@ -6536,8 +6536,8 @@
         </p:nvSpPr>
         <p:spPr>
           <a:xfrm>
-            <a:off x="726432" y="6145004"/>
-            <a:ext cx="3475634" cy="1379419"/>
+            <a:off x="968576" y="6145002"/>
+            <a:ext cx="4634179" cy="1379419"/>
           </a:xfrm>
         </p:spPr>
         <p:txBody>
@@ -6547,39 +6547,39 @@
           <a:lstStyle>
             <a:lvl1pPr marL="0" indent="0" algn="ctr">
               <a:buNone/>
+              <a:defRPr sz="1960"/>
+            </a:lvl1pPr>
+            <a:lvl2pPr marL="640080" indent="0">
+              <a:buNone/>
+              <a:defRPr sz="1680"/>
+            </a:lvl2pPr>
+            <a:lvl3pPr marL="1280160" indent="0">
+              <a:buNone/>
               <a:defRPr sz="1400"/>
-            </a:lvl1pPr>
-            <a:lvl2pPr marL="457209" indent="0">
-              <a:buNone/>
-              <a:defRPr sz="1200"/>
-            </a:lvl2pPr>
-            <a:lvl3pPr marL="914418" indent="0">
-              <a:buNone/>
-              <a:defRPr sz="1000"/>
             </a:lvl3pPr>
-            <a:lvl4pPr marL="1371627" indent="0">
-              <a:buNone/>
-              <a:defRPr sz="900"/>
+            <a:lvl4pPr marL="1920240" indent="0">
+              <a:buNone/>
+              <a:defRPr sz="1260"/>
             </a:lvl4pPr>
-            <a:lvl5pPr marL="1828837" indent="0">
-              <a:buNone/>
-              <a:defRPr sz="900"/>
+            <a:lvl5pPr marL="2560320" indent="0">
+              <a:buNone/>
+              <a:defRPr sz="1260"/>
             </a:lvl5pPr>
-            <a:lvl6pPr marL="2286046" indent="0">
-              <a:buNone/>
-              <a:defRPr sz="900"/>
+            <a:lvl6pPr marL="3200400" indent="0">
+              <a:buNone/>
+              <a:defRPr sz="1260"/>
             </a:lvl6pPr>
-            <a:lvl7pPr marL="2743255" indent="0">
-              <a:buNone/>
-              <a:defRPr sz="900"/>
+            <a:lvl7pPr marL="3840480" indent="0">
+              <a:buNone/>
+              <a:defRPr sz="1260"/>
             </a:lvl7pPr>
-            <a:lvl8pPr marL="3200464" indent="0">
-              <a:buNone/>
-              <a:defRPr sz="900"/>
+            <a:lvl8pPr marL="4480560" indent="0">
+              <a:buNone/>
+              <a:defRPr sz="1260"/>
             </a:lvl8pPr>
-            <a:lvl9pPr marL="3657673" indent="0">
-              <a:buNone/>
-              <a:defRPr sz="900"/>
+            <a:lvl9pPr marL="5120640" indent="0">
+              <a:buNone/>
+              <a:defRPr sz="1260"/>
             </a:lvl9pPr>
           </a:lstStyle>
           <a:p>
@@ -6603,8 +6603,8 @@
         </p:nvSpPr>
         <p:spPr>
           <a:xfrm>
-            <a:off x="4449281" y="5338235"/>
-            <a:ext cx="3475634" cy="806767"/>
+            <a:off x="5932374" y="5338235"/>
+            <a:ext cx="4634179" cy="806767"/>
           </a:xfrm>
         </p:spPr>
         <p:txBody>
@@ -6617,43 +6617,43 @@
                 <a:spcPct val="90000"/>
               </a:lnSpc>
               <a:buNone/>
-              <a:defRPr sz="2200" b="0">
+              <a:defRPr sz="3080" b="0">
                 <a:solidFill>
                   <a:schemeClr val="accent1"/>
                 </a:solidFill>
               </a:defRPr>
             </a:lvl1pPr>
-            <a:lvl2pPr marL="457209" indent="0">
-              <a:buNone/>
-              <a:defRPr sz="2000" b="1"/>
+            <a:lvl2pPr marL="640080" indent="0">
+              <a:buNone/>
+              <a:defRPr sz="2800" b="1"/>
             </a:lvl2pPr>
-            <a:lvl3pPr marL="914418" indent="0">
-              <a:buNone/>
-              <a:defRPr sz="1800" b="1"/>
+            <a:lvl3pPr marL="1280160" indent="0">
+              <a:buNone/>
+              <a:defRPr sz="2520" b="1"/>
             </a:lvl3pPr>
-            <a:lvl4pPr marL="1371627" indent="0">
-              <a:buNone/>
-              <a:defRPr sz="1600" b="1"/>
+            <a:lvl4pPr marL="1920240" indent="0">
+              <a:buNone/>
+              <a:defRPr sz="2240" b="1"/>
             </a:lvl4pPr>
-            <a:lvl5pPr marL="1828837" indent="0">
-              <a:buNone/>
-              <a:defRPr sz="1600" b="1"/>
+            <a:lvl5pPr marL="2560320" indent="0">
+              <a:buNone/>
+              <a:defRPr sz="2240" b="1"/>
             </a:lvl5pPr>
-            <a:lvl6pPr marL="2286046" indent="0">
-              <a:buNone/>
-              <a:defRPr sz="1600" b="1"/>
+            <a:lvl6pPr marL="3200400" indent="0">
+              <a:buNone/>
+              <a:defRPr sz="2240" b="1"/>
             </a:lvl6pPr>
-            <a:lvl7pPr marL="2743255" indent="0">
-              <a:buNone/>
-              <a:defRPr sz="1600" b="1"/>
+            <a:lvl7pPr marL="3840480" indent="0">
+              <a:buNone/>
+              <a:defRPr sz="2240" b="1"/>
             </a:lvl7pPr>
-            <a:lvl8pPr marL="3200464" indent="0">
-              <a:buNone/>
-              <a:defRPr sz="1600" b="1"/>
+            <a:lvl8pPr marL="4480560" indent="0">
+              <a:buNone/>
+              <a:defRPr sz="2240" b="1"/>
             </a:lvl8pPr>
-            <a:lvl9pPr marL="3657673" indent="0">
-              <a:buNone/>
-              <a:defRPr sz="1600" b="1"/>
+            <a:lvl9pPr marL="5120640" indent="0">
+              <a:buNone/>
+              <a:defRPr sz="2240" b="1"/>
             </a:lvl9pPr>
           </a:lstStyle>
           <a:p>
@@ -6677,8 +6677,8 @@
         </p:nvSpPr>
         <p:spPr>
           <a:xfrm>
-            <a:off x="4447799" y="2888755"/>
-            <a:ext cx="3475634" cy="2149332"/>
+            <a:off x="5930399" y="2888754"/>
+            <a:ext cx="4634179" cy="2149332"/>
           </a:xfrm>
           <a:prstGeom prst="roundRect">
             <a:avLst>
@@ -6701,39 +6701,39 @@
           <a:lstStyle>
             <a:lvl1pPr marL="0" indent="0" algn="ctr">
               <a:buNone/>
-              <a:defRPr sz="1600"/>
+              <a:defRPr sz="2240"/>
             </a:lvl1pPr>
-            <a:lvl2pPr marL="457209" indent="0">
-              <a:buNone/>
-              <a:defRPr sz="1600"/>
+            <a:lvl2pPr marL="640080" indent="0">
+              <a:buNone/>
+              <a:defRPr sz="2240"/>
             </a:lvl2pPr>
-            <a:lvl3pPr marL="914418" indent="0">
-              <a:buNone/>
-              <a:defRPr sz="1600"/>
+            <a:lvl3pPr marL="1280160" indent="0">
+              <a:buNone/>
+              <a:defRPr sz="2240"/>
             </a:lvl3pPr>
-            <a:lvl4pPr marL="1371627" indent="0">
-              <a:buNone/>
-              <a:defRPr sz="1600"/>
+            <a:lvl4pPr marL="1920240" indent="0">
+              <a:buNone/>
+              <a:defRPr sz="2240"/>
             </a:lvl4pPr>
-            <a:lvl5pPr marL="1828837" indent="0">
-              <a:buNone/>
-              <a:defRPr sz="1600"/>
+            <a:lvl5pPr marL="2560320" indent="0">
+              <a:buNone/>
+              <a:defRPr sz="2240"/>
             </a:lvl5pPr>
-            <a:lvl6pPr marL="2286046" indent="0">
-              <a:buNone/>
-              <a:defRPr sz="1600"/>
+            <a:lvl6pPr marL="3200400" indent="0">
+              <a:buNone/>
+              <a:defRPr sz="2240"/>
             </a:lvl6pPr>
-            <a:lvl7pPr marL="2743255" indent="0">
-              <a:buNone/>
-              <a:defRPr sz="1600"/>
+            <a:lvl7pPr marL="3840480" indent="0">
+              <a:buNone/>
+              <a:defRPr sz="2240"/>
             </a:lvl7pPr>
-            <a:lvl8pPr marL="3200464" indent="0">
-              <a:buNone/>
-              <a:defRPr sz="1600"/>
+            <a:lvl8pPr marL="4480560" indent="0">
+              <a:buNone/>
+              <a:defRPr sz="2240"/>
             </a:lvl8pPr>
-            <a:lvl9pPr marL="3657673" indent="0">
-              <a:buNone/>
-              <a:defRPr sz="1600"/>
+            <a:lvl9pPr marL="5120640" indent="0">
+              <a:buNone/>
+              <a:defRPr sz="2240"/>
             </a:lvl9pPr>
           </a:lstStyle>
           <a:p>
@@ -6757,8 +6757,8 @@
         </p:nvSpPr>
         <p:spPr>
           <a:xfrm>
-            <a:off x="4447799" y="6145000"/>
-            <a:ext cx="3475634" cy="1379420"/>
+            <a:off x="5930399" y="6145000"/>
+            <a:ext cx="4634179" cy="1379420"/>
           </a:xfrm>
         </p:spPr>
         <p:txBody>
@@ -6768,39 +6768,39 @@
           <a:lstStyle>
             <a:lvl1pPr marL="0" indent="0" algn="ctr">
               <a:buNone/>
+              <a:defRPr sz="1960"/>
+            </a:lvl1pPr>
+            <a:lvl2pPr marL="640080" indent="0">
+              <a:buNone/>
+              <a:defRPr sz="1680"/>
+            </a:lvl2pPr>
+            <a:lvl3pPr marL="1280160" indent="0">
+              <a:buNone/>
               <a:defRPr sz="1400"/>
-            </a:lvl1pPr>
-            <a:lvl2pPr marL="457209" indent="0">
-              <a:buNone/>
-              <a:defRPr sz="1200"/>
-            </a:lvl2pPr>
-            <a:lvl3pPr marL="914418" indent="0">
-              <a:buNone/>
-              <a:defRPr sz="1000"/>
             </a:lvl3pPr>
-            <a:lvl4pPr marL="1371627" indent="0">
-              <a:buNone/>
-              <a:defRPr sz="900"/>
+            <a:lvl4pPr marL="1920240" indent="0">
+              <a:buNone/>
+              <a:defRPr sz="1260"/>
             </a:lvl4pPr>
-            <a:lvl5pPr marL="1828837" indent="0">
-              <a:buNone/>
-              <a:defRPr sz="900"/>
+            <a:lvl5pPr marL="2560320" indent="0">
+              <a:buNone/>
+              <a:defRPr sz="1260"/>
             </a:lvl5pPr>
-            <a:lvl6pPr marL="2286046" indent="0">
-              <a:buNone/>
-              <a:defRPr sz="900"/>
+            <a:lvl6pPr marL="3200400" indent="0">
+              <a:buNone/>
+              <a:defRPr sz="1260"/>
             </a:lvl6pPr>
-            <a:lvl7pPr marL="2743255" indent="0">
-              <a:buNone/>
-              <a:defRPr sz="900"/>
+            <a:lvl7pPr marL="3840480" indent="0">
+              <a:buNone/>
+              <a:defRPr sz="1260"/>
             </a:lvl7pPr>
-            <a:lvl8pPr marL="3200464" indent="0">
-              <a:buNone/>
-              <a:defRPr sz="900"/>
+            <a:lvl8pPr marL="4480560" indent="0">
+              <a:buNone/>
+              <a:defRPr sz="1260"/>
             </a:lvl8pPr>
-            <a:lvl9pPr marL="3657673" indent="0">
-              <a:buNone/>
-              <a:defRPr sz="900"/>
+            <a:lvl9pPr marL="5120640" indent="0">
+              <a:buNone/>
+              <a:defRPr sz="1260"/>
             </a:lvl9pPr>
           </a:lstStyle>
           <a:p>
@@ -6824,8 +6824,8 @@
         </p:nvSpPr>
         <p:spPr>
           <a:xfrm>
-            <a:off x="8157391" y="5338235"/>
-            <a:ext cx="3475634" cy="806767"/>
+            <a:off x="10876522" y="5338235"/>
+            <a:ext cx="4634179" cy="806767"/>
           </a:xfrm>
         </p:spPr>
         <p:txBody>
@@ -6838,43 +6838,43 @@
                 <a:spcPct val="90000"/>
               </a:lnSpc>
               <a:buNone/>
-              <a:defRPr sz="2200" b="0">
+              <a:defRPr sz="3080" b="0">
                 <a:solidFill>
                   <a:schemeClr val="accent1"/>
                 </a:solidFill>
               </a:defRPr>
             </a:lvl1pPr>
-            <a:lvl2pPr marL="457209" indent="0">
-              <a:buNone/>
-              <a:defRPr sz="2000" b="1"/>
+            <a:lvl2pPr marL="640080" indent="0">
+              <a:buNone/>
+              <a:defRPr sz="2800" b="1"/>
             </a:lvl2pPr>
-            <a:lvl3pPr marL="914418" indent="0">
-              <a:buNone/>
-              <a:defRPr sz="1800" b="1"/>
+            <a:lvl3pPr marL="1280160" indent="0">
+              <a:buNone/>
+              <a:defRPr sz="2520" b="1"/>
             </a:lvl3pPr>
-            <a:lvl4pPr marL="1371627" indent="0">
-              <a:buNone/>
-              <a:defRPr sz="1600" b="1"/>
+            <a:lvl4pPr marL="1920240" indent="0">
+              <a:buNone/>
+              <a:defRPr sz="2240" b="1"/>
             </a:lvl4pPr>
-            <a:lvl5pPr marL="1828837" indent="0">
-              <a:buNone/>
-              <a:defRPr sz="1600" b="1"/>
+            <a:lvl5pPr marL="2560320" indent="0">
+              <a:buNone/>
+              <a:defRPr sz="2240" b="1"/>
             </a:lvl5pPr>
-            <a:lvl6pPr marL="2286046" indent="0">
-              <a:buNone/>
-              <a:defRPr sz="1600" b="1"/>
+            <a:lvl6pPr marL="3200400" indent="0">
+              <a:buNone/>
+              <a:defRPr sz="2240" b="1"/>
             </a:lvl6pPr>
-            <a:lvl7pPr marL="2743255" indent="0">
-              <a:buNone/>
-              <a:defRPr sz="1600" b="1"/>
+            <a:lvl7pPr marL="3840480" indent="0">
+              <a:buNone/>
+              <a:defRPr sz="2240" b="1"/>
             </a:lvl7pPr>
-            <a:lvl8pPr marL="3200464" indent="0">
-              <a:buNone/>
-              <a:defRPr sz="1600" b="1"/>
+            <a:lvl8pPr marL="4480560" indent="0">
+              <a:buNone/>
+              <a:defRPr sz="2240" b="1"/>
             </a:lvl8pPr>
-            <a:lvl9pPr marL="3657673" indent="0">
-              <a:buNone/>
-              <a:defRPr sz="1600" b="1"/>
+            <a:lvl9pPr marL="5120640" indent="0">
+              <a:buNone/>
+              <a:defRPr sz="2240" b="1"/>
             </a:lvl9pPr>
           </a:lstStyle>
           <a:p>
@@ -6898,8 +6898,8 @@
         </p:nvSpPr>
         <p:spPr>
           <a:xfrm>
-            <a:off x="8157260" y="2888752"/>
-            <a:ext cx="3475634" cy="2152074"/>
+            <a:off x="10876347" y="2888752"/>
+            <a:ext cx="4634179" cy="2152074"/>
           </a:xfrm>
           <a:prstGeom prst="roundRect">
             <a:avLst>
@@ -6922,39 +6922,39 @@
           <a:lstStyle>
             <a:lvl1pPr marL="0" indent="0" algn="ctr">
               <a:buNone/>
-              <a:defRPr sz="1600"/>
+              <a:defRPr sz="2240"/>
             </a:lvl1pPr>
-            <a:lvl2pPr marL="457209" indent="0">
-              <a:buNone/>
-              <a:defRPr sz="1600"/>
+            <a:lvl2pPr marL="640080" indent="0">
+              <a:buNone/>
+              <a:defRPr sz="2240"/>
             </a:lvl2pPr>
-            <a:lvl3pPr marL="914418" indent="0">
-              <a:buNone/>
-              <a:defRPr sz="1600"/>
+            <a:lvl3pPr marL="1280160" indent="0">
+              <a:buNone/>
+              <a:defRPr sz="2240"/>
             </a:lvl3pPr>
-            <a:lvl4pPr marL="1371627" indent="0">
-              <a:buNone/>
-              <a:defRPr sz="1600"/>
+            <a:lvl4pPr marL="1920240" indent="0">
+              <a:buNone/>
+              <a:defRPr sz="2240"/>
             </a:lvl4pPr>
-            <a:lvl5pPr marL="1828837" indent="0">
-              <a:buNone/>
-              <a:defRPr sz="1600"/>
+            <a:lvl5pPr marL="2560320" indent="0">
+              <a:buNone/>
+              <a:defRPr sz="2240"/>
             </a:lvl5pPr>
-            <a:lvl6pPr marL="2286046" indent="0">
-              <a:buNone/>
-              <a:defRPr sz="1600"/>
+            <a:lvl6pPr marL="3200400" indent="0">
+              <a:buNone/>
+              <a:defRPr sz="2240"/>
             </a:lvl6pPr>
-            <a:lvl7pPr marL="2743255" indent="0">
-              <a:buNone/>
-              <a:defRPr sz="1600"/>
+            <a:lvl7pPr marL="3840480" indent="0">
+              <a:buNone/>
+              <a:defRPr sz="2240"/>
             </a:lvl7pPr>
-            <a:lvl8pPr marL="3200464" indent="0">
-              <a:buNone/>
-              <a:defRPr sz="1600"/>
+            <a:lvl8pPr marL="4480560" indent="0">
+              <a:buNone/>
+              <a:defRPr sz="2240"/>
             </a:lvl8pPr>
-            <a:lvl9pPr marL="3657673" indent="0">
-              <a:buNone/>
-              <a:defRPr sz="1600"/>
+            <a:lvl9pPr marL="5120640" indent="0">
+              <a:buNone/>
+              <a:defRPr sz="2240"/>
             </a:lvl9pPr>
           </a:lstStyle>
           <a:p>
@@ -6978,8 +6978,8 @@
         </p:nvSpPr>
         <p:spPr>
           <a:xfrm>
-            <a:off x="8157260" y="6144999"/>
-            <a:ext cx="3475634" cy="1379423"/>
+            <a:off x="10876347" y="6144998"/>
+            <a:ext cx="4634179" cy="1379423"/>
           </a:xfrm>
         </p:spPr>
         <p:txBody>
@@ -6989,39 +6989,39 @@
           <a:lstStyle>
             <a:lvl1pPr marL="0" indent="0" algn="ctr">
               <a:buNone/>
+              <a:defRPr sz="1960"/>
+            </a:lvl1pPr>
+            <a:lvl2pPr marL="640080" indent="0">
+              <a:buNone/>
+              <a:defRPr sz="1680"/>
+            </a:lvl2pPr>
+            <a:lvl3pPr marL="1280160" indent="0">
+              <a:buNone/>
               <a:defRPr sz="1400"/>
-            </a:lvl1pPr>
-            <a:lvl2pPr marL="457209" indent="0">
-              <a:buNone/>
-              <a:defRPr sz="1200"/>
-            </a:lvl2pPr>
-            <a:lvl3pPr marL="914418" indent="0">
-              <a:buNone/>
-              <a:defRPr sz="1000"/>
             </a:lvl3pPr>
-            <a:lvl4pPr marL="1371627" indent="0">
-              <a:buNone/>
-              <a:defRPr sz="900"/>
+            <a:lvl4pPr marL="1920240" indent="0">
+              <a:buNone/>
+              <a:defRPr sz="1260"/>
             </a:lvl4pPr>
-            <a:lvl5pPr marL="1828837" indent="0">
-              <a:buNone/>
-              <a:defRPr sz="900"/>
+            <a:lvl5pPr marL="2560320" indent="0">
+              <a:buNone/>
+              <a:defRPr sz="1260"/>
             </a:lvl5pPr>
-            <a:lvl6pPr marL="2286046" indent="0">
-              <a:buNone/>
-              <a:defRPr sz="900"/>
+            <a:lvl6pPr marL="3200400" indent="0">
+              <a:buNone/>
+              <a:defRPr sz="1260"/>
             </a:lvl6pPr>
-            <a:lvl7pPr marL="2743255" indent="0">
-              <a:buNone/>
-              <a:defRPr sz="900"/>
+            <a:lvl7pPr marL="3840480" indent="0">
+              <a:buNone/>
+              <a:defRPr sz="1260"/>
             </a:lvl7pPr>
-            <a:lvl8pPr marL="3200464" indent="0">
-              <a:buNone/>
-              <a:defRPr sz="900"/>
+            <a:lvl8pPr marL="4480560" indent="0">
+              <a:buNone/>
+              <a:defRPr sz="1260"/>
             </a:lvl8pPr>
-            <a:lvl9pPr marL="3657673" indent="0">
-              <a:buNone/>
-              <a:defRPr sz="900"/>
+            <a:lvl9pPr marL="5120640" indent="0">
+              <a:buNone/>
+              <a:defRPr sz="1260"/>
             </a:lvl9pPr>
           </a:lstStyle>
           <a:p>
@@ -7101,7 +7101,7 @@
     </p:spTree>
     <p:extLst>
       <p:ext uri="{BB962C8B-B14F-4D97-AF65-F5344CB8AC3E}">
-        <p14:creationId xmlns:p14="http://schemas.microsoft.com/office/powerpoint/2010/main" val="3760798653"/>
+        <p14:creationId xmlns:p14="http://schemas.microsoft.com/office/powerpoint/2010/main" val="404181507"/>
       </p:ext>
     </p:extLst>
   </p:cSld>
@@ -7167,8 +7167,8 @@
         </p:nvSpPr>
         <p:spPr>
           <a:xfrm>
-            <a:off x="720092" y="2888754"/>
-            <a:ext cx="10914442" cy="4635666"/>
+            <a:off x="960121" y="2888754"/>
+            <a:ext cx="14552590" cy="4635666"/>
           </a:xfrm>
         </p:spPr>
         <p:txBody>
@@ -7280,7 +7280,7 @@
     </p:spTree>
     <p:extLst>
       <p:ext uri="{BB962C8B-B14F-4D97-AF65-F5344CB8AC3E}">
-        <p14:creationId xmlns:p14="http://schemas.microsoft.com/office/powerpoint/2010/main" val="1599388041"/>
+        <p14:creationId xmlns:p14="http://schemas.microsoft.com/office/powerpoint/2010/main" val="3765670284"/>
       </p:ext>
     </p:extLst>
   </p:cSld>
@@ -7319,8 +7319,8 @@
         </p:nvSpPr>
         <p:spPr>
           <a:xfrm>
-            <a:off x="9256655" y="960122"/>
-            <a:ext cx="2377878" cy="6564299"/>
+            <a:off x="12342207" y="960121"/>
+            <a:ext cx="3170504" cy="6564299"/>
           </a:xfrm>
         </p:spPr>
         <p:txBody>
@@ -7351,8 +7351,8 @@
         </p:nvSpPr>
         <p:spPr>
           <a:xfrm>
-            <a:off x="720091" y="960122"/>
-            <a:ext cx="8299653" cy="6564299"/>
+            <a:off x="960121" y="960121"/>
+            <a:ext cx="11066203" cy="6564299"/>
           </a:xfrm>
         </p:spPr>
         <p:txBody>
@@ -7464,7 +7464,7 @@
     </p:spTree>
     <p:extLst>
       <p:ext uri="{BB962C8B-B14F-4D97-AF65-F5344CB8AC3E}">
-        <p14:creationId xmlns:p14="http://schemas.microsoft.com/office/powerpoint/2010/main" val="390461675"/>
+        <p14:creationId xmlns:p14="http://schemas.microsoft.com/office/powerpoint/2010/main" val="3241685000"/>
       </p:ext>
     </p:extLst>
   </p:cSld>
@@ -7526,8 +7526,8 @@
         </p:nvSpPr>
         <p:spPr>
           <a:xfrm>
-            <a:off x="720092" y="2888756"/>
-            <a:ext cx="10914442" cy="4635665"/>
+            <a:off x="960121" y="2888755"/>
+            <a:ext cx="14552590" cy="4635665"/>
           </a:xfrm>
         </p:spPr>
         <p:txBody>
@@ -7639,7 +7639,7 @@
     </p:spTree>
     <p:extLst>
       <p:ext uri="{BB962C8B-B14F-4D97-AF65-F5344CB8AC3E}">
-        <p14:creationId xmlns:p14="http://schemas.microsoft.com/office/powerpoint/2010/main" val="3605658183"/>
+        <p14:creationId xmlns:p14="http://schemas.microsoft.com/office/powerpoint/2010/main" val="3455510764"/>
       </p:ext>
     </p:extLst>
   </p:cSld>
@@ -7678,8 +7678,8 @@
         </p:nvSpPr>
         <p:spPr>
           <a:xfrm>
-            <a:off x="720093" y="960122"/>
-            <a:ext cx="10914442" cy="4470882"/>
+            <a:off x="960122" y="960121"/>
+            <a:ext cx="14552590" cy="4470882"/>
           </a:xfrm>
         </p:spPr>
         <p:txBody>
@@ -7688,7 +7688,7 @@
           </a:bodyPr>
           <a:lstStyle>
             <a:lvl1pPr algn="l">
-              <a:defRPr sz="5400"/>
+              <a:defRPr sz="7560"/>
             </a:lvl1pPr>
           </a:lstStyle>
           <a:p>
@@ -7712,8 +7712,8 @@
         </p:nvSpPr>
         <p:spPr>
           <a:xfrm>
-            <a:off x="720093" y="5239174"/>
-            <a:ext cx="10914442" cy="2295460"/>
+            <a:off x="960122" y="5239174"/>
+            <a:ext cx="14552590" cy="2295460"/>
           </a:xfrm>
         </p:spPr>
         <p:txBody>
@@ -7723,7 +7723,7 @@
           <a:lstStyle>
             <a:lvl1pPr marL="0" indent="0" algn="l">
               <a:buNone/>
-              <a:defRPr sz="2000">
+              <a:defRPr sz="2800">
                 <a:solidFill>
                   <a:schemeClr val="bg1">
                     <a:lumMod val="50000"/>
@@ -7731,9 +7731,9 @@
                 </a:solidFill>
               </a:defRPr>
             </a:lvl1pPr>
-            <a:lvl2pPr marL="457209" indent="0">
-              <a:buNone/>
-              <a:defRPr sz="2000">
+            <a:lvl2pPr marL="640080" indent="0">
+              <a:buNone/>
+              <a:defRPr sz="2800">
                 <a:solidFill>
                   <a:schemeClr val="tx1">
                     <a:tint val="75000"/>
@@ -7741,9 +7741,9 @@
                 </a:solidFill>
               </a:defRPr>
             </a:lvl2pPr>
-            <a:lvl3pPr marL="914418" indent="0">
-              <a:buNone/>
-              <a:defRPr sz="1800">
+            <a:lvl3pPr marL="1280160" indent="0">
+              <a:buNone/>
+              <a:defRPr sz="2520">
                 <a:solidFill>
                   <a:schemeClr val="tx1">
                     <a:tint val="75000"/>
@@ -7751,9 +7751,9 @@
                 </a:solidFill>
               </a:defRPr>
             </a:lvl3pPr>
-            <a:lvl4pPr marL="1371627" indent="0">
-              <a:buNone/>
-              <a:defRPr sz="1600">
+            <a:lvl4pPr marL="1920240" indent="0">
+              <a:buNone/>
+              <a:defRPr sz="2240">
                 <a:solidFill>
                   <a:schemeClr val="tx1">
                     <a:tint val="75000"/>
@@ -7761,9 +7761,9 @@
                 </a:solidFill>
               </a:defRPr>
             </a:lvl4pPr>
-            <a:lvl5pPr marL="1828837" indent="0">
-              <a:buNone/>
-              <a:defRPr sz="1600">
+            <a:lvl5pPr marL="2560320" indent="0">
+              <a:buNone/>
+              <a:defRPr sz="2240">
                 <a:solidFill>
                   <a:schemeClr val="tx1">
                     <a:tint val="75000"/>
@@ -7771,9 +7771,9 @@
                 </a:solidFill>
               </a:defRPr>
             </a:lvl5pPr>
-            <a:lvl6pPr marL="2286046" indent="0">
-              <a:buNone/>
-              <a:defRPr sz="1600">
+            <a:lvl6pPr marL="3200400" indent="0">
+              <a:buNone/>
+              <a:defRPr sz="2240">
                 <a:solidFill>
                   <a:schemeClr val="tx1">
                     <a:tint val="75000"/>
@@ -7781,9 +7781,9 @@
                 </a:solidFill>
               </a:defRPr>
             </a:lvl6pPr>
-            <a:lvl7pPr marL="2743255" indent="0">
-              <a:buNone/>
-              <a:defRPr sz="1600">
+            <a:lvl7pPr marL="3840480" indent="0">
+              <a:buNone/>
+              <a:defRPr sz="2240">
                 <a:solidFill>
                   <a:schemeClr val="tx1">
                     <a:tint val="75000"/>
@@ -7791,9 +7791,9 @@
                 </a:solidFill>
               </a:defRPr>
             </a:lvl7pPr>
-            <a:lvl8pPr marL="3200464" indent="0">
-              <a:buNone/>
-              <a:defRPr sz="1600">
+            <a:lvl8pPr marL="4480560" indent="0">
+              <a:buNone/>
+              <a:defRPr sz="2240">
                 <a:solidFill>
                   <a:schemeClr val="tx1">
                     <a:tint val="75000"/>
@@ -7801,9 +7801,9 @@
                 </a:solidFill>
               </a:defRPr>
             </a:lvl8pPr>
-            <a:lvl9pPr marL="3657673" indent="0">
-              <a:buNone/>
-              <a:defRPr sz="1600">
+            <a:lvl9pPr marL="5120640" indent="0">
+              <a:buNone/>
+              <a:defRPr sz="2240">
                 <a:solidFill>
                   <a:schemeClr val="tx1">
                     <a:tint val="75000"/>
@@ -7889,7 +7889,7 @@
     </p:spTree>
     <p:extLst>
       <p:ext uri="{BB962C8B-B14F-4D97-AF65-F5344CB8AC3E}">
-        <p14:creationId xmlns:p14="http://schemas.microsoft.com/office/powerpoint/2010/main" val="303841673"/>
+        <p14:creationId xmlns:p14="http://schemas.microsoft.com/office/powerpoint/2010/main" val="3812228748"/>
       </p:ext>
     </p:extLst>
   </p:cSld>
@@ -7928,8 +7928,8 @@
         </p:nvSpPr>
         <p:spPr>
           <a:xfrm>
-            <a:off x="720091" y="960120"/>
-            <a:ext cx="10916726" cy="1621396"/>
+            <a:off x="960121" y="960120"/>
+            <a:ext cx="14555635" cy="1621396"/>
           </a:xfrm>
         </p:spPr>
         <p:txBody>
@@ -7956,8 +7956,8 @@
         </p:nvSpPr>
         <p:spPr>
           <a:xfrm>
-            <a:off x="720090" y="2888756"/>
-            <a:ext cx="5343150" cy="4635665"/>
+            <a:off x="960120" y="2888755"/>
+            <a:ext cx="7124200" cy="4635665"/>
           </a:xfrm>
         </p:spPr>
         <p:txBody>
@@ -8013,8 +8013,8 @@
         </p:nvSpPr>
         <p:spPr>
           <a:xfrm>
-            <a:off x="6293671" y="2888756"/>
-            <a:ext cx="5340865" cy="4635665"/>
+            <a:off x="8391560" y="2888755"/>
+            <a:ext cx="7121153" cy="4635665"/>
           </a:xfrm>
         </p:spPr>
         <p:txBody>
@@ -8126,7 +8126,7 @@
     </p:spTree>
     <p:extLst>
       <p:ext uri="{BB962C8B-B14F-4D97-AF65-F5344CB8AC3E}">
-        <p14:creationId xmlns:p14="http://schemas.microsoft.com/office/powerpoint/2010/main" val="45219808"/>
+        <p14:creationId xmlns:p14="http://schemas.microsoft.com/office/powerpoint/2010/main" val="2599909350"/>
       </p:ext>
     </p:extLst>
   </p:cSld>
@@ -8165,8 +8165,8 @@
         </p:nvSpPr>
         <p:spPr>
           <a:xfrm>
-            <a:off x="720093" y="960120"/>
-            <a:ext cx="10914442" cy="1621396"/>
+            <a:off x="960122" y="960120"/>
+            <a:ext cx="14552590" cy="1621396"/>
           </a:xfrm>
         </p:spPr>
         <p:txBody>
@@ -8193,8 +8193,8 @@
         </p:nvSpPr>
         <p:spPr>
           <a:xfrm>
-            <a:off x="964274" y="2888754"/>
-            <a:ext cx="5098966" cy="951992"/>
+            <a:off x="1285699" y="2888754"/>
+            <a:ext cx="6798621" cy="951992"/>
           </a:xfrm>
         </p:spPr>
         <p:txBody>
@@ -8207,43 +8207,43 @@
                 <a:spcPct val="90000"/>
               </a:lnSpc>
               <a:buNone/>
-              <a:defRPr sz="2600" b="0">
+              <a:defRPr sz="3640" b="0">
                 <a:solidFill>
                   <a:schemeClr val="accent1"/>
                 </a:solidFill>
               </a:defRPr>
             </a:lvl1pPr>
-            <a:lvl2pPr marL="457209" indent="0">
-              <a:buNone/>
-              <a:defRPr sz="2000" b="1"/>
+            <a:lvl2pPr marL="640080" indent="0">
+              <a:buNone/>
+              <a:defRPr sz="2800" b="1"/>
             </a:lvl2pPr>
-            <a:lvl3pPr marL="914418" indent="0">
-              <a:buNone/>
-              <a:defRPr sz="1800" b="1"/>
+            <a:lvl3pPr marL="1280160" indent="0">
+              <a:buNone/>
+              <a:defRPr sz="2520" b="1"/>
             </a:lvl3pPr>
-            <a:lvl4pPr marL="1371627" indent="0">
-              <a:buNone/>
-              <a:defRPr sz="1600" b="1"/>
+            <a:lvl4pPr marL="1920240" indent="0">
+              <a:buNone/>
+              <a:defRPr sz="2240" b="1"/>
             </a:lvl4pPr>
-            <a:lvl5pPr marL="1828837" indent="0">
-              <a:buNone/>
-              <a:defRPr sz="1600" b="1"/>
+            <a:lvl5pPr marL="2560320" indent="0">
+              <a:buNone/>
+              <a:defRPr sz="2240" b="1"/>
             </a:lvl5pPr>
-            <a:lvl6pPr marL="2286046" indent="0">
-              <a:buNone/>
-              <a:defRPr sz="1600" b="1"/>
+            <a:lvl6pPr marL="3200400" indent="0">
+              <a:buNone/>
+              <a:defRPr sz="2240" b="1"/>
             </a:lvl6pPr>
-            <a:lvl7pPr marL="2743255" indent="0">
-              <a:buNone/>
-              <a:defRPr sz="1600" b="1"/>
+            <a:lvl7pPr marL="3840480" indent="0">
+              <a:buNone/>
+              <a:defRPr sz="2240" b="1"/>
             </a:lvl7pPr>
-            <a:lvl8pPr marL="3200464" indent="0">
-              <a:buNone/>
-              <a:defRPr sz="1600" b="1"/>
+            <a:lvl8pPr marL="4480560" indent="0">
+              <a:buNone/>
+              <a:defRPr sz="2240" b="1"/>
             </a:lvl8pPr>
-            <a:lvl9pPr marL="3657673" indent="0">
-              <a:buNone/>
-              <a:defRPr sz="1600" b="1"/>
+            <a:lvl9pPr marL="5120640" indent="0">
+              <a:buNone/>
+              <a:defRPr sz="2240" b="1"/>
             </a:lvl9pPr>
           </a:lstStyle>
           <a:p>
@@ -8267,8 +8267,8 @@
         </p:nvSpPr>
         <p:spPr>
           <a:xfrm>
-            <a:off x="720092" y="4006426"/>
-            <a:ext cx="5343148" cy="3517993"/>
+            <a:off x="960123" y="4006426"/>
+            <a:ext cx="7124197" cy="3517993"/>
           </a:xfrm>
         </p:spPr>
         <p:txBody>
@@ -8324,8 +8324,8 @@
         </p:nvSpPr>
         <p:spPr>
           <a:xfrm>
-            <a:off x="6529102" y="2888754"/>
-            <a:ext cx="5107716" cy="951992"/>
+            <a:off x="8705468" y="2888754"/>
+            <a:ext cx="6810287" cy="951992"/>
           </a:xfrm>
         </p:spPr>
         <p:txBody>
@@ -8338,43 +8338,43 @@
                 <a:spcPct val="90000"/>
               </a:lnSpc>
               <a:buNone/>
-              <a:defRPr sz="2600" b="0">
+              <a:defRPr sz="3640" b="0">
                 <a:solidFill>
                   <a:schemeClr val="accent1"/>
                 </a:solidFill>
               </a:defRPr>
             </a:lvl1pPr>
-            <a:lvl2pPr marL="457209" indent="0">
-              <a:buNone/>
-              <a:defRPr sz="2000" b="1"/>
+            <a:lvl2pPr marL="640080" indent="0">
+              <a:buNone/>
+              <a:defRPr sz="2800" b="1"/>
             </a:lvl2pPr>
-            <a:lvl3pPr marL="914418" indent="0">
-              <a:buNone/>
-              <a:defRPr sz="1800" b="1"/>
+            <a:lvl3pPr marL="1280160" indent="0">
+              <a:buNone/>
+              <a:defRPr sz="2520" b="1"/>
             </a:lvl3pPr>
-            <a:lvl4pPr marL="1371627" indent="0">
-              <a:buNone/>
-              <a:defRPr sz="1600" b="1"/>
+            <a:lvl4pPr marL="1920240" indent="0">
+              <a:buNone/>
+              <a:defRPr sz="2240" b="1"/>
             </a:lvl4pPr>
-            <a:lvl5pPr marL="1828837" indent="0">
-              <a:buNone/>
-              <a:defRPr sz="1600" b="1"/>
+            <a:lvl5pPr marL="2560320" indent="0">
+              <a:buNone/>
+              <a:defRPr sz="2240" b="1"/>
             </a:lvl5pPr>
-            <a:lvl6pPr marL="2286046" indent="0">
-              <a:buNone/>
-              <a:defRPr sz="1600" b="1"/>
+            <a:lvl6pPr marL="3200400" indent="0">
+              <a:buNone/>
+              <a:defRPr sz="2240" b="1"/>
             </a:lvl6pPr>
-            <a:lvl7pPr marL="2743255" indent="0">
-              <a:buNone/>
-              <a:defRPr sz="1600" b="1"/>
+            <a:lvl7pPr marL="3840480" indent="0">
+              <a:buNone/>
+              <a:defRPr sz="2240" b="1"/>
             </a:lvl7pPr>
-            <a:lvl8pPr marL="3200464" indent="0">
-              <a:buNone/>
-              <a:defRPr sz="1600" b="1"/>
+            <a:lvl8pPr marL="4480560" indent="0">
+              <a:buNone/>
+              <a:defRPr sz="2240" b="1"/>
             </a:lvl8pPr>
-            <a:lvl9pPr marL="3657673" indent="0">
-              <a:buNone/>
-              <a:defRPr sz="1600" b="1"/>
+            <a:lvl9pPr marL="5120640" indent="0">
+              <a:buNone/>
+              <a:defRPr sz="2240" b="1"/>
             </a:lvl9pPr>
           </a:lstStyle>
           <a:p>
@@ -8398,8 +8398,8 @@
         </p:nvSpPr>
         <p:spPr>
           <a:xfrm>
-            <a:off x="6293669" y="4006426"/>
-            <a:ext cx="5343149" cy="3517993"/>
+            <a:off x="8391557" y="4006426"/>
+            <a:ext cx="7124198" cy="3517993"/>
           </a:xfrm>
         </p:spPr>
         <p:txBody>
@@ -8511,7 +8511,7 @@
     </p:spTree>
     <p:extLst>
       <p:ext uri="{BB962C8B-B14F-4D97-AF65-F5344CB8AC3E}">
-        <p14:creationId xmlns:p14="http://schemas.microsoft.com/office/powerpoint/2010/main" val="3669283389"/>
+        <p14:creationId xmlns:p14="http://schemas.microsoft.com/office/powerpoint/2010/main" val="3756726598"/>
       </p:ext>
     </p:extLst>
   </p:cSld>
@@ -8629,7 +8629,7 @@
     </p:spTree>
     <p:extLst>
       <p:ext uri="{BB962C8B-B14F-4D97-AF65-F5344CB8AC3E}">
-        <p14:creationId xmlns:p14="http://schemas.microsoft.com/office/powerpoint/2010/main" val="3902746108"/>
+        <p14:creationId xmlns:p14="http://schemas.microsoft.com/office/powerpoint/2010/main" val="3647715168"/>
       </p:ext>
     </p:extLst>
   </p:cSld>
@@ -8724,7 +8724,7 @@
     </p:spTree>
     <p:extLst>
       <p:ext uri="{BB962C8B-B14F-4D97-AF65-F5344CB8AC3E}">
-        <p14:creationId xmlns:p14="http://schemas.microsoft.com/office/powerpoint/2010/main" val="538975160"/>
+        <p14:creationId xmlns:p14="http://schemas.microsoft.com/office/powerpoint/2010/main" val="1146082001"/>
       </p:ext>
     </p:extLst>
   </p:cSld>
@@ -8763,8 +8763,8 @@
         </p:nvSpPr>
         <p:spPr>
           <a:xfrm>
-            <a:off x="728325" y="960120"/>
-            <a:ext cx="4333203" cy="2832553"/>
+            <a:off x="971100" y="960120"/>
+            <a:ext cx="5777604" cy="2832553"/>
           </a:xfrm>
         </p:spPr>
         <p:txBody>
@@ -8773,7 +8773,7 @@
           </a:bodyPr>
           <a:lstStyle>
             <a:lvl1pPr algn="ctr">
-              <a:defRPr sz="3600"/>
+              <a:defRPr sz="5040"/>
             </a:lvl1pPr>
           </a:lstStyle>
           <a:p>
@@ -8797,8 +8797,8 @@
         </p:nvSpPr>
         <p:spPr>
           <a:xfrm>
-            <a:off x="5298440" y="960122"/>
-            <a:ext cx="6336094" cy="6564299"/>
+            <a:off x="7064586" y="960121"/>
+            <a:ext cx="8448125" cy="6564299"/>
           </a:xfrm>
         </p:spPr>
         <p:txBody>
@@ -8854,8 +8854,8 @@
         </p:nvSpPr>
         <p:spPr>
           <a:xfrm>
-            <a:off x="728326" y="3792675"/>
-            <a:ext cx="4333204" cy="3731746"/>
+            <a:off x="971100" y="3792674"/>
+            <a:ext cx="5777605" cy="3731746"/>
           </a:xfrm>
         </p:spPr>
         <p:txBody>
@@ -8865,39 +8865,39 @@
           <a:lstStyle>
             <a:lvl1pPr marL="0" indent="0" algn="ctr">
               <a:buNone/>
-              <a:defRPr sz="1800"/>
+              <a:defRPr sz="2520"/>
             </a:lvl1pPr>
-            <a:lvl2pPr marL="457209" indent="0">
+            <a:lvl2pPr marL="640080" indent="0">
+              <a:buNone/>
+              <a:defRPr sz="1960"/>
+            </a:lvl2pPr>
+            <a:lvl3pPr marL="1280160" indent="0">
+              <a:buNone/>
+              <a:defRPr sz="1680"/>
+            </a:lvl3pPr>
+            <a:lvl4pPr marL="1920240" indent="0">
               <a:buNone/>
               <a:defRPr sz="1400"/>
-            </a:lvl2pPr>
-            <a:lvl3pPr marL="914418" indent="0">
-              <a:buNone/>
-              <a:defRPr sz="1200"/>
-            </a:lvl3pPr>
-            <a:lvl4pPr marL="1371627" indent="0">
-              <a:buNone/>
-              <a:defRPr sz="1000"/>
             </a:lvl4pPr>
-            <a:lvl5pPr marL="1828837" indent="0">
-              <a:buNone/>
-              <a:defRPr sz="1000"/>
+            <a:lvl5pPr marL="2560320" indent="0">
+              <a:buNone/>
+              <a:defRPr sz="1400"/>
             </a:lvl5pPr>
-            <a:lvl6pPr marL="2286046" indent="0">
-              <a:buNone/>
-              <a:defRPr sz="1000"/>
+            <a:lvl6pPr marL="3200400" indent="0">
+              <a:buNone/>
+              <a:defRPr sz="1400"/>
             </a:lvl6pPr>
-            <a:lvl7pPr marL="2743255" indent="0">
-              <a:buNone/>
-              <a:defRPr sz="1000"/>
+            <a:lvl7pPr marL="3840480" indent="0">
+              <a:buNone/>
+              <a:defRPr sz="1400"/>
             </a:lvl7pPr>
-            <a:lvl8pPr marL="3200464" indent="0">
-              <a:buNone/>
-              <a:defRPr sz="1000"/>
+            <a:lvl8pPr marL="4480560" indent="0">
+              <a:buNone/>
+              <a:defRPr sz="1400"/>
             </a:lvl8pPr>
-            <a:lvl9pPr marL="3657673" indent="0">
-              <a:buNone/>
-              <a:defRPr sz="1000"/>
+            <a:lvl9pPr marL="5120640" indent="0">
+              <a:buNone/>
+              <a:defRPr sz="1400"/>
             </a:lvl9pPr>
           </a:lstStyle>
           <a:p>
@@ -8977,7 +8977,7 @@
     </p:spTree>
     <p:extLst>
       <p:ext uri="{BB962C8B-B14F-4D97-AF65-F5344CB8AC3E}">
-        <p14:creationId xmlns:p14="http://schemas.microsoft.com/office/powerpoint/2010/main" val="354789026"/>
+        <p14:creationId xmlns:p14="http://schemas.microsoft.com/office/powerpoint/2010/main" val="3917864242"/>
       </p:ext>
     </p:extLst>
   </p:cSld>
@@ -9016,8 +9016,8 @@
         </p:nvSpPr>
         <p:spPr>
           <a:xfrm>
-            <a:off x="720090" y="960120"/>
-            <a:ext cx="6662567" cy="2832553"/>
+            <a:off x="960120" y="960120"/>
+            <a:ext cx="8883423" cy="2832553"/>
           </a:xfrm>
         </p:spPr>
         <p:txBody>
@@ -9026,7 +9026,7 @@
           </a:bodyPr>
           <a:lstStyle>
             <a:lvl1pPr algn="ctr">
-              <a:defRPr sz="3600"/>
+              <a:defRPr sz="5040"/>
             </a:lvl1pPr>
           </a:lstStyle>
           <a:p>
@@ -9050,8 +9050,8 @@
         </p:nvSpPr>
         <p:spPr>
           <a:xfrm>
-            <a:off x="7856480" y="2"/>
-            <a:ext cx="3778053" cy="7100146"/>
+            <a:off x="10475307" y="1"/>
+            <a:ext cx="5037404" cy="7100146"/>
           </a:xfrm>
           <a:ln w="57150" cmpd="thinThick">
             <a:solidFill>
@@ -9067,39 +9067,39 @@
           <a:lstStyle>
             <a:lvl1pPr marL="0" indent="0" algn="ctr">
               <a:buNone/>
-              <a:defRPr sz="3200"/>
+              <a:defRPr sz="4480"/>
             </a:lvl1pPr>
-            <a:lvl2pPr marL="457209" indent="0">
+            <a:lvl2pPr marL="640080" indent="0">
+              <a:buNone/>
+              <a:defRPr sz="3920"/>
+            </a:lvl2pPr>
+            <a:lvl3pPr marL="1280160" indent="0">
+              <a:buNone/>
+              <a:defRPr sz="3360"/>
+            </a:lvl3pPr>
+            <a:lvl4pPr marL="1920240" indent="0">
               <a:buNone/>
               <a:defRPr sz="2800"/>
-            </a:lvl2pPr>
-            <a:lvl3pPr marL="914418" indent="0">
-              <a:buNone/>
-              <a:defRPr sz="2400"/>
-            </a:lvl3pPr>
-            <a:lvl4pPr marL="1371627" indent="0">
-              <a:buNone/>
-              <a:defRPr sz="2000"/>
             </a:lvl4pPr>
-            <a:lvl5pPr marL="1828837" indent="0">
-              <a:buNone/>
-              <a:defRPr sz="2000"/>
+            <a:lvl5pPr marL="2560320" indent="0">
+              <a:buNone/>
+              <a:defRPr sz="2800"/>
             </a:lvl5pPr>
-            <a:lvl6pPr marL="2286046" indent="0">
-              <a:buNone/>
-              <a:defRPr sz="2000"/>
+            <a:lvl6pPr marL="3200400" indent="0">
+              <a:buNone/>
+              <a:defRPr sz="2800"/>
             </a:lvl6pPr>
-            <a:lvl7pPr marL="2743255" indent="0">
-              <a:buNone/>
-              <a:defRPr sz="2000"/>
+            <a:lvl7pPr marL="3840480" indent="0">
+              <a:buNone/>
+              <a:defRPr sz="2800"/>
             </a:lvl7pPr>
-            <a:lvl8pPr marL="3200464" indent="0">
-              <a:buNone/>
-              <a:defRPr sz="2000"/>
+            <a:lvl8pPr marL="4480560" indent="0">
+              <a:buNone/>
+              <a:defRPr sz="2800"/>
             </a:lvl8pPr>
-            <a:lvl9pPr marL="3657673" indent="0">
-              <a:buNone/>
-              <a:defRPr sz="2000"/>
+            <a:lvl9pPr marL="5120640" indent="0">
+              <a:buNone/>
+              <a:defRPr sz="2800"/>
             </a:lvl9pPr>
           </a:lstStyle>
           <a:p>
@@ -9123,8 +9123,8 @@
         </p:nvSpPr>
         <p:spPr>
           <a:xfrm>
-            <a:off x="720093" y="3792675"/>
-            <a:ext cx="6662566" cy="3307473"/>
+            <a:off x="960122" y="3792674"/>
+            <a:ext cx="8883421" cy="3307473"/>
           </a:xfrm>
         </p:spPr>
         <p:txBody>
@@ -9134,39 +9134,39 @@
           <a:lstStyle>
             <a:lvl1pPr marL="0" indent="0" algn="ctr">
               <a:buNone/>
-              <a:defRPr sz="1800"/>
+              <a:defRPr sz="2520"/>
             </a:lvl1pPr>
-            <a:lvl2pPr marL="457209" indent="0">
+            <a:lvl2pPr marL="640080" indent="0">
+              <a:buNone/>
+              <a:defRPr sz="1960"/>
+            </a:lvl2pPr>
+            <a:lvl3pPr marL="1280160" indent="0">
+              <a:buNone/>
+              <a:defRPr sz="1680"/>
+            </a:lvl3pPr>
+            <a:lvl4pPr marL="1920240" indent="0">
               <a:buNone/>
               <a:defRPr sz="1400"/>
-            </a:lvl2pPr>
-            <a:lvl3pPr marL="914418" indent="0">
-              <a:buNone/>
-              <a:defRPr sz="1200"/>
-            </a:lvl3pPr>
-            <a:lvl4pPr marL="1371627" indent="0">
-              <a:buNone/>
-              <a:defRPr sz="1000"/>
             </a:lvl4pPr>
-            <a:lvl5pPr marL="1828837" indent="0">
-              <a:buNone/>
-              <a:defRPr sz="1000"/>
+            <a:lvl5pPr marL="2560320" indent="0">
+              <a:buNone/>
+              <a:defRPr sz="1400"/>
             </a:lvl5pPr>
-            <a:lvl6pPr marL="2286046" indent="0">
-              <a:buNone/>
-              <a:defRPr sz="1000"/>
+            <a:lvl6pPr marL="3200400" indent="0">
+              <a:buNone/>
+              <a:defRPr sz="1400"/>
             </a:lvl6pPr>
-            <a:lvl7pPr marL="2743255" indent="0">
-              <a:buNone/>
-              <a:defRPr sz="1000"/>
+            <a:lvl7pPr marL="3840480" indent="0">
+              <a:buNone/>
+              <a:defRPr sz="1400"/>
             </a:lvl7pPr>
-            <a:lvl8pPr marL="3200464" indent="0">
-              <a:buNone/>
-              <a:defRPr sz="1000"/>
+            <a:lvl8pPr marL="4480560" indent="0">
+              <a:buNone/>
+              <a:defRPr sz="1400"/>
             </a:lvl8pPr>
-            <a:lvl9pPr marL="3657673" indent="0">
-              <a:buNone/>
-              <a:defRPr sz="1000"/>
+            <a:lvl9pPr marL="5120640" indent="0">
+              <a:buNone/>
+              <a:defRPr sz="1400"/>
             </a:lvl9pPr>
           </a:lstStyle>
           <a:p>
@@ -9246,7 +9246,7 @@
     </p:spTree>
     <p:extLst>
       <p:ext uri="{BB962C8B-B14F-4D97-AF65-F5344CB8AC3E}">
-        <p14:creationId xmlns:p14="http://schemas.microsoft.com/office/powerpoint/2010/main" val="842163736"/>
+        <p14:creationId xmlns:p14="http://schemas.microsoft.com/office/powerpoint/2010/main" val="2166431201"/>
       </p:ext>
     </p:extLst>
   </p:cSld>
@@ -9301,7 +9301,7 @@
         <p:spPr>
           <a:xfrm>
             <a:off x="0" y="0"/>
-            <a:ext cx="12801600" cy="9601200"/>
+            <a:ext cx="17068800" cy="9601200"/>
           </a:xfrm>
           <a:prstGeom prst="rect">
             <a:avLst/>
@@ -9316,8 +9316,8 @@
         </p:nvGrpSpPr>
         <p:grpSpPr>
           <a:xfrm>
-            <a:off x="-26667" y="2"/>
-            <a:ext cx="12605618" cy="9301713"/>
+            <a:off x="-35556" y="1"/>
+            <a:ext cx="16807490" cy="9301713"/>
             <a:chOff x="-25397" y="0"/>
             <a:chExt cx="12005350" cy="6644081"/>
           </a:xfrm>
@@ -9480,8 +9480,8 @@
         </p:nvSpPr>
         <p:spPr>
           <a:xfrm>
-            <a:off x="720091" y="960122"/>
-            <a:ext cx="10916726" cy="1612751"/>
+            <a:off x="960121" y="960121"/>
+            <a:ext cx="14555635" cy="1612751"/>
           </a:xfrm>
           <a:prstGeom prst="rect">
             <a:avLst/>
@@ -9513,8 +9513,8 @@
         </p:nvSpPr>
         <p:spPr>
           <a:xfrm>
-            <a:off x="720092" y="2888756"/>
-            <a:ext cx="10916727" cy="4635665"/>
+            <a:off x="960121" y="2888755"/>
+            <a:ext cx="14555636" cy="4635665"/>
           </a:xfrm>
           <a:prstGeom prst="rect">
             <a:avLst/>
@@ -9575,8 +9575,8 @@
         </p:nvSpPr>
         <p:spPr>
           <a:xfrm>
-            <a:off x="7662987" y="8060268"/>
-            <a:ext cx="3973830" cy="697858"/>
+            <a:off x="10217316" y="8060268"/>
+            <a:ext cx="5298440" cy="697858"/>
           </a:xfrm>
           <a:prstGeom prst="rect">
             <a:avLst/>
@@ -9586,7 +9586,7 @@
           <a:bodyPr vert="horz" lIns="91440" tIns="45720" rIns="91440" bIns="45720" rtlCol="0" anchor="ctr"/>
           <a:lstStyle>
             <a:lvl1pPr algn="r">
-              <a:defRPr sz="3200" cap="all" baseline="0">
+              <a:defRPr sz="4480" cap="all" baseline="0">
                 <a:solidFill>
                   <a:schemeClr val="accent1">
                     <a:lumMod val="50000"/>
@@ -9616,8 +9616,8 @@
         </p:nvSpPr>
         <p:spPr>
           <a:xfrm>
-            <a:off x="720093" y="8060268"/>
-            <a:ext cx="5774705" cy="697858"/>
+            <a:off x="960122" y="8060268"/>
+            <a:ext cx="7699607" cy="697858"/>
           </a:xfrm>
           <a:prstGeom prst="rect">
             <a:avLst/>
@@ -9627,7 +9627,7 @@
           <a:bodyPr vert="horz" lIns="91440" tIns="45720" rIns="91440" bIns="45720" rtlCol="0" anchor="ctr"/>
           <a:lstStyle>
             <a:lvl1pPr algn="l">
-              <a:defRPr sz="3200" cap="all" baseline="0">
+              <a:defRPr sz="4480" cap="all" baseline="0">
                 <a:solidFill>
                   <a:schemeClr val="accent1">
                     <a:lumMod val="50000"/>
@@ -9653,8 +9653,8 @@
         </p:nvSpPr>
         <p:spPr>
           <a:xfrm>
-            <a:off x="6601477" y="8060268"/>
-            <a:ext cx="952545" cy="697858"/>
+            <a:off x="8801970" y="8060268"/>
+            <a:ext cx="1270060" cy="697858"/>
           </a:xfrm>
           <a:prstGeom prst="rect">
             <a:avLst/>
@@ -9664,7 +9664,7 @@
           <a:bodyPr vert="horz" lIns="91440" tIns="45720" rIns="91440" bIns="45720" rtlCol="0" anchor="ctr"/>
           <a:lstStyle>
             <a:lvl1pPr algn="ctr">
-              <a:defRPr sz="3200" cap="all" baseline="0">
+              <a:defRPr sz="4480" cap="all" baseline="0">
                 <a:solidFill>
                   <a:schemeClr val="accent1">
                     <a:lumMod val="50000"/>
@@ -9685,33 +9685,33 @@
     </p:spTree>
     <p:extLst>
       <p:ext uri="{BB962C8B-B14F-4D97-AF65-F5344CB8AC3E}">
-        <p14:creationId xmlns:p14="http://schemas.microsoft.com/office/powerpoint/2010/main" val="4155559860"/>
+        <p14:creationId xmlns:p14="http://schemas.microsoft.com/office/powerpoint/2010/main" val="2464117616"/>
       </p:ext>
     </p:extLst>
   </p:cSld>
   <p:clrMap bg1="lt1" tx1="dk1" bg2="lt2" tx2="dk2" accent1="accent1" accent2="accent2" accent3="accent3" accent4="accent4" accent5="accent5" accent6="accent6" hlink="hlink" folHlink="folHlink"/>
   <p:sldLayoutIdLst>
-    <p:sldLayoutId id="2147483661" r:id="rId1"/>
-    <p:sldLayoutId id="2147483662" r:id="rId2"/>
-    <p:sldLayoutId id="2147483663" r:id="rId3"/>
-    <p:sldLayoutId id="2147483664" r:id="rId4"/>
-    <p:sldLayoutId id="2147483665" r:id="rId5"/>
-    <p:sldLayoutId id="2147483666" r:id="rId6"/>
-    <p:sldLayoutId id="2147483667" r:id="rId7"/>
-    <p:sldLayoutId id="2147483668" r:id="rId8"/>
-    <p:sldLayoutId id="2147483669" r:id="rId9"/>
-    <p:sldLayoutId id="2147483670" r:id="rId10"/>
-    <p:sldLayoutId id="2147483671" r:id="rId11"/>
-    <p:sldLayoutId id="2147483672" r:id="rId12"/>
-    <p:sldLayoutId id="2147483673" r:id="rId13"/>
-    <p:sldLayoutId id="2147483674" r:id="rId14"/>
-    <p:sldLayoutId id="2147483675" r:id="rId15"/>
-    <p:sldLayoutId id="2147483676" r:id="rId16"/>
-    <p:sldLayoutId id="2147483677" r:id="rId17"/>
+    <p:sldLayoutId id="2147483679" r:id="rId1"/>
+    <p:sldLayoutId id="2147483680" r:id="rId2"/>
+    <p:sldLayoutId id="2147483681" r:id="rId3"/>
+    <p:sldLayoutId id="2147483682" r:id="rId4"/>
+    <p:sldLayoutId id="2147483683" r:id="rId5"/>
+    <p:sldLayoutId id="2147483684" r:id="rId6"/>
+    <p:sldLayoutId id="2147483685" r:id="rId7"/>
+    <p:sldLayoutId id="2147483686" r:id="rId8"/>
+    <p:sldLayoutId id="2147483687" r:id="rId9"/>
+    <p:sldLayoutId id="2147483688" r:id="rId10"/>
+    <p:sldLayoutId id="2147483689" r:id="rId11"/>
+    <p:sldLayoutId id="2147483690" r:id="rId12"/>
+    <p:sldLayoutId id="2147483691" r:id="rId13"/>
+    <p:sldLayoutId id="2147483692" r:id="rId14"/>
+    <p:sldLayoutId id="2147483693" r:id="rId15"/>
+    <p:sldLayoutId id="2147483694" r:id="rId16"/>
+    <p:sldLayoutId id="2147483695" r:id="rId17"/>
   </p:sldLayoutIdLst>
   <p:txStyles>
     <p:titleStyle>
-      <a:lvl1pPr algn="l" defTabSz="914418" rtl="0" eaLnBrk="1" latinLnBrk="0" hangingPunct="1">
+      <a:lvl1pPr algn="l" defTabSz="1280160" rtl="0" eaLnBrk="1" latinLnBrk="0" hangingPunct="1">
         <a:lnSpc>
           <a:spcPct val="90000"/>
         </a:lnSpc>
@@ -9719,7 +9719,7 @@
           <a:spcPct val="0"/>
         </a:spcBef>
         <a:buNone/>
-        <a:defRPr sz="5400" kern="1200" cap="all" baseline="0">
+        <a:defRPr sz="7560" kern="1200" cap="all" baseline="0">
           <a:solidFill>
             <a:schemeClr val="accent1"/>
           </a:solidFill>
@@ -9731,12 +9731,12 @@
       </a:lvl1pPr>
     </p:titleStyle>
     <p:bodyStyle>
-      <a:lvl1pPr marL="228605" indent="-228605" algn="l" defTabSz="914418" rtl="0" eaLnBrk="1" latinLnBrk="0" hangingPunct="1">
+      <a:lvl1pPr marL="320040" indent="-320040" algn="l" defTabSz="1280160" rtl="0" eaLnBrk="1" latinLnBrk="0" hangingPunct="1">
         <a:lnSpc>
           <a:spcPct val="120000"/>
         </a:lnSpc>
         <a:spcBef>
-          <a:spcPts val="1000"/>
+          <a:spcPts val="1400"/>
         </a:spcBef>
         <a:buClr>
           <a:schemeClr val="accent1"/>
@@ -9744,7 +9744,7 @@
         <a:buSzPct val="160000"/>
         <a:buFont typeface="Arial" panose="020B0604020202020204" pitchFamily="34" charset="0"/>
         <a:buChar char="•"/>
-        <a:defRPr sz="2000" kern="1200" cap="all" baseline="0">
+        <a:defRPr sz="2800" kern="1200" cap="all" baseline="0">
           <a:solidFill>
             <a:schemeClr val="tx1"/>
           </a:solidFill>
@@ -9754,12 +9754,12 @@
           <a:cs typeface="+mn-cs"/>
         </a:defRPr>
       </a:lvl1pPr>
-      <a:lvl2pPr marL="685814" indent="-228605" algn="l" defTabSz="914418" rtl="0" eaLnBrk="1" latinLnBrk="0" hangingPunct="1">
+      <a:lvl2pPr marL="960120" indent="-320040" algn="l" defTabSz="1280160" rtl="0" eaLnBrk="1" latinLnBrk="0" hangingPunct="1">
         <a:lnSpc>
           <a:spcPct val="120000"/>
         </a:lnSpc>
         <a:spcBef>
-          <a:spcPts val="500"/>
+          <a:spcPts val="700"/>
         </a:spcBef>
         <a:buClr>
           <a:schemeClr val="accent1"/>
@@ -9767,7 +9767,7 @@
         <a:buSzPct val="160000"/>
         <a:buFont typeface="Arial" panose="020B0604020202020204" pitchFamily="34" charset="0"/>
         <a:buChar char="•"/>
-        <a:defRPr sz="1800" kern="1200" cap="all" baseline="0">
+        <a:defRPr sz="2520" kern="1200" cap="all" baseline="0">
           <a:solidFill>
             <a:schemeClr val="tx1"/>
           </a:solidFill>
@@ -9777,12 +9777,12 @@
           <a:cs typeface="+mn-cs"/>
         </a:defRPr>
       </a:lvl2pPr>
-      <a:lvl3pPr marL="1143023" indent="-228605" algn="l" defTabSz="914418" rtl="0" eaLnBrk="1" latinLnBrk="0" hangingPunct="1">
+      <a:lvl3pPr marL="1600200" indent="-320040" algn="l" defTabSz="1280160" rtl="0" eaLnBrk="1" latinLnBrk="0" hangingPunct="1">
         <a:lnSpc>
           <a:spcPct val="120000"/>
         </a:lnSpc>
         <a:spcBef>
-          <a:spcPts val="500"/>
+          <a:spcPts val="700"/>
         </a:spcBef>
         <a:buClr>
           <a:schemeClr val="accent1"/>
@@ -9790,7 +9790,7 @@
         <a:buSzPct val="160000"/>
         <a:buFont typeface="Arial" panose="020B0604020202020204" pitchFamily="34" charset="0"/>
         <a:buChar char="•"/>
-        <a:defRPr sz="1600" kern="1200" cap="all" baseline="0">
+        <a:defRPr sz="2240" kern="1200" cap="all" baseline="0">
           <a:solidFill>
             <a:schemeClr val="tx1"/>
           </a:solidFill>
@@ -9800,12 +9800,12 @@
           <a:cs typeface="+mn-cs"/>
         </a:defRPr>
       </a:lvl3pPr>
-      <a:lvl4pPr marL="1600232" indent="-228605" algn="l" defTabSz="914418" rtl="0" eaLnBrk="1" latinLnBrk="0" hangingPunct="1">
+      <a:lvl4pPr marL="2240280" indent="-320040" algn="l" defTabSz="1280160" rtl="0" eaLnBrk="1" latinLnBrk="0" hangingPunct="1">
         <a:lnSpc>
           <a:spcPct val="120000"/>
         </a:lnSpc>
         <a:spcBef>
-          <a:spcPts val="500"/>
+          <a:spcPts val="700"/>
         </a:spcBef>
         <a:buClr>
           <a:schemeClr val="accent1"/>
@@ -9813,7 +9813,7 @@
         <a:buSzPct val="160000"/>
         <a:buFont typeface="Arial" panose="020B0604020202020204" pitchFamily="34" charset="0"/>
         <a:buChar char="•"/>
-        <a:defRPr sz="1400" kern="1200" cap="all" baseline="0">
+        <a:defRPr sz="1960" kern="1200" cap="all" baseline="0">
           <a:solidFill>
             <a:schemeClr val="tx1"/>
           </a:solidFill>
@@ -9823,12 +9823,12 @@
           <a:cs typeface="+mn-cs"/>
         </a:defRPr>
       </a:lvl4pPr>
-      <a:lvl5pPr marL="2057441" indent="-228605" algn="l" defTabSz="914418" rtl="0" eaLnBrk="1" latinLnBrk="0" hangingPunct="1">
+      <a:lvl5pPr marL="2880360" indent="-320040" algn="l" defTabSz="1280160" rtl="0" eaLnBrk="1" latinLnBrk="0" hangingPunct="1">
         <a:lnSpc>
           <a:spcPct val="120000"/>
         </a:lnSpc>
         <a:spcBef>
-          <a:spcPts val="500"/>
+          <a:spcPts val="700"/>
         </a:spcBef>
         <a:buClr>
           <a:schemeClr val="accent1"/>
@@ -9836,7 +9836,7 @@
         <a:buSzPct val="160000"/>
         <a:buFont typeface="Arial" panose="020B0604020202020204" pitchFamily="34" charset="0"/>
         <a:buChar char="•"/>
-        <a:defRPr sz="1400" kern="1200" cap="all" baseline="0">
+        <a:defRPr sz="1960" kern="1200" cap="all" baseline="0">
           <a:solidFill>
             <a:schemeClr val="tx1"/>
           </a:solidFill>
@@ -9846,12 +9846,12 @@
           <a:cs typeface="+mn-cs"/>
         </a:defRPr>
       </a:lvl5pPr>
-      <a:lvl6pPr marL="2514650" indent="-228605" algn="l" defTabSz="914418" rtl="0" eaLnBrk="1" latinLnBrk="0" hangingPunct="1">
+      <a:lvl6pPr marL="3520440" indent="-320040" algn="l" defTabSz="1280160" rtl="0" eaLnBrk="1" latinLnBrk="0" hangingPunct="1">
         <a:lnSpc>
           <a:spcPct val="120000"/>
         </a:lnSpc>
         <a:spcBef>
-          <a:spcPts val="500"/>
+          <a:spcPts val="700"/>
         </a:spcBef>
         <a:buClr>
           <a:schemeClr val="accent1"/>
@@ -9859,7 +9859,7 @@
         <a:buSzPct val="160000"/>
         <a:buFont typeface="Arial" panose="020B0604020202020204" pitchFamily="34" charset="0"/>
         <a:buChar char="•"/>
-        <a:defRPr sz="1400" kern="1200" cap="all" baseline="0">
+        <a:defRPr sz="1960" kern="1200" cap="all" baseline="0">
           <a:solidFill>
             <a:schemeClr val="tx1"/>
           </a:solidFill>
@@ -9869,12 +9869,12 @@
           <a:cs typeface="+mn-cs"/>
         </a:defRPr>
       </a:lvl6pPr>
-      <a:lvl7pPr marL="2971859" indent="-228605" algn="l" defTabSz="914418" rtl="0" eaLnBrk="1" latinLnBrk="0" hangingPunct="1">
+      <a:lvl7pPr marL="4160520" indent="-320040" algn="l" defTabSz="1280160" rtl="0" eaLnBrk="1" latinLnBrk="0" hangingPunct="1">
         <a:lnSpc>
           <a:spcPct val="120000"/>
         </a:lnSpc>
         <a:spcBef>
-          <a:spcPts val="500"/>
+          <a:spcPts val="700"/>
         </a:spcBef>
         <a:buClr>
           <a:schemeClr val="accent1"/>
@@ -9882,7 +9882,7 @@
         <a:buSzPct val="160000"/>
         <a:buFont typeface="Arial" panose="020B0604020202020204" pitchFamily="34" charset="0"/>
         <a:buChar char="•"/>
-        <a:defRPr sz="1400" kern="1200" cap="all" baseline="0">
+        <a:defRPr sz="1960" kern="1200" cap="all" baseline="0">
           <a:solidFill>
             <a:schemeClr val="tx1"/>
           </a:solidFill>
@@ -9892,12 +9892,12 @@
           <a:cs typeface="+mn-cs"/>
         </a:defRPr>
       </a:lvl7pPr>
-      <a:lvl8pPr marL="3429069" indent="-228605" algn="l" defTabSz="914418" rtl="0" eaLnBrk="1" latinLnBrk="0" hangingPunct="1">
+      <a:lvl8pPr marL="4800600" indent="-320040" algn="l" defTabSz="1280160" rtl="0" eaLnBrk="1" latinLnBrk="0" hangingPunct="1">
         <a:lnSpc>
           <a:spcPct val="120000"/>
         </a:lnSpc>
         <a:spcBef>
-          <a:spcPts val="500"/>
+          <a:spcPts val="700"/>
         </a:spcBef>
         <a:buClr>
           <a:schemeClr val="accent1"/>
@@ -9905,7 +9905,7 @@
         <a:buSzPct val="160000"/>
         <a:buFont typeface="Arial" panose="020B0604020202020204" pitchFamily="34" charset="0"/>
         <a:buChar char="•"/>
-        <a:defRPr sz="1400" kern="1200" cap="all" baseline="0">
+        <a:defRPr sz="1960" kern="1200" cap="all" baseline="0">
           <a:solidFill>
             <a:schemeClr val="tx1"/>
           </a:solidFill>
@@ -9915,12 +9915,12 @@
           <a:cs typeface="+mn-cs"/>
         </a:defRPr>
       </a:lvl8pPr>
-      <a:lvl9pPr marL="3886278" indent="-228605" algn="l" defTabSz="914418" rtl="0" eaLnBrk="1" latinLnBrk="0" hangingPunct="1">
+      <a:lvl9pPr marL="5440680" indent="-320040" algn="l" defTabSz="1280160" rtl="0" eaLnBrk="1" latinLnBrk="0" hangingPunct="1">
         <a:lnSpc>
           <a:spcPct val="120000"/>
         </a:lnSpc>
         <a:spcBef>
-          <a:spcPts val="500"/>
+          <a:spcPts val="700"/>
         </a:spcBef>
         <a:buClr>
           <a:schemeClr val="accent1"/>
@@ -9928,7 +9928,7 @@
         <a:buSzPct val="160000"/>
         <a:buFont typeface="Arial" panose="020B0604020202020204" pitchFamily="34" charset="0"/>
         <a:buChar char="•"/>
-        <a:defRPr sz="1400" kern="1200" cap="all" baseline="0">
+        <a:defRPr sz="1960" kern="1200" cap="all" baseline="0">
           <a:solidFill>
             <a:schemeClr val="tx1"/>
           </a:solidFill>
@@ -9943,8 +9943,8 @@
       <a:defPPr>
         <a:defRPr lang="en-US"/>
       </a:defPPr>
-      <a:lvl1pPr marL="0" algn="l" defTabSz="914418" rtl="0" eaLnBrk="1" latinLnBrk="0" hangingPunct="1">
-        <a:defRPr sz="1800" kern="1200">
+      <a:lvl1pPr marL="0" algn="l" defTabSz="1280160" rtl="0" eaLnBrk="1" latinLnBrk="0" hangingPunct="1">
+        <a:defRPr sz="2520" kern="1200">
           <a:solidFill>
             <a:schemeClr val="tx1"/>
           </a:solidFill>
@@ -9953,8 +9953,8 @@
           <a:cs typeface="+mn-cs"/>
         </a:defRPr>
       </a:lvl1pPr>
-      <a:lvl2pPr marL="457209" algn="l" defTabSz="914418" rtl="0" eaLnBrk="1" latinLnBrk="0" hangingPunct="1">
-        <a:defRPr sz="1800" kern="1200">
+      <a:lvl2pPr marL="640080" algn="l" defTabSz="1280160" rtl="0" eaLnBrk="1" latinLnBrk="0" hangingPunct="1">
+        <a:defRPr sz="2520" kern="1200">
           <a:solidFill>
             <a:schemeClr val="tx1"/>
           </a:solidFill>
@@ -9963,8 +9963,8 @@
           <a:cs typeface="+mn-cs"/>
         </a:defRPr>
       </a:lvl2pPr>
-      <a:lvl3pPr marL="914418" algn="l" defTabSz="914418" rtl="0" eaLnBrk="1" latinLnBrk="0" hangingPunct="1">
-        <a:defRPr sz="1800" kern="1200">
+      <a:lvl3pPr marL="1280160" algn="l" defTabSz="1280160" rtl="0" eaLnBrk="1" latinLnBrk="0" hangingPunct="1">
+        <a:defRPr sz="2520" kern="1200">
           <a:solidFill>
             <a:schemeClr val="tx1"/>
           </a:solidFill>
@@ -9973,8 +9973,8 @@
           <a:cs typeface="+mn-cs"/>
         </a:defRPr>
       </a:lvl3pPr>
-      <a:lvl4pPr marL="1371627" algn="l" defTabSz="914418" rtl="0" eaLnBrk="1" latinLnBrk="0" hangingPunct="1">
-        <a:defRPr sz="1800" kern="1200">
+      <a:lvl4pPr marL="1920240" algn="l" defTabSz="1280160" rtl="0" eaLnBrk="1" latinLnBrk="0" hangingPunct="1">
+        <a:defRPr sz="2520" kern="1200">
           <a:solidFill>
             <a:schemeClr val="tx1"/>
           </a:solidFill>
@@ -9983,8 +9983,8 @@
           <a:cs typeface="+mn-cs"/>
         </a:defRPr>
       </a:lvl4pPr>
-      <a:lvl5pPr marL="1828837" algn="l" defTabSz="914418" rtl="0" eaLnBrk="1" latinLnBrk="0" hangingPunct="1">
-        <a:defRPr sz="1800" kern="1200">
+      <a:lvl5pPr marL="2560320" algn="l" defTabSz="1280160" rtl="0" eaLnBrk="1" latinLnBrk="0" hangingPunct="1">
+        <a:defRPr sz="2520" kern="1200">
           <a:solidFill>
             <a:schemeClr val="tx1"/>
           </a:solidFill>
@@ -9993,8 +9993,8 @@
           <a:cs typeface="+mn-cs"/>
         </a:defRPr>
       </a:lvl5pPr>
-      <a:lvl6pPr marL="2286046" algn="l" defTabSz="914418" rtl="0" eaLnBrk="1" latinLnBrk="0" hangingPunct="1">
-        <a:defRPr sz="1800" kern="1200">
+      <a:lvl6pPr marL="3200400" algn="l" defTabSz="1280160" rtl="0" eaLnBrk="1" latinLnBrk="0" hangingPunct="1">
+        <a:defRPr sz="2520" kern="1200">
           <a:solidFill>
             <a:schemeClr val="tx1"/>
           </a:solidFill>
@@ -10003,8 +10003,8 @@
           <a:cs typeface="+mn-cs"/>
         </a:defRPr>
       </a:lvl6pPr>
-      <a:lvl7pPr marL="2743255" algn="l" defTabSz="914418" rtl="0" eaLnBrk="1" latinLnBrk="0" hangingPunct="1">
-        <a:defRPr sz="1800" kern="1200">
+      <a:lvl7pPr marL="3840480" algn="l" defTabSz="1280160" rtl="0" eaLnBrk="1" latinLnBrk="0" hangingPunct="1">
+        <a:defRPr sz="2520" kern="1200">
           <a:solidFill>
             <a:schemeClr val="tx1"/>
           </a:solidFill>
@@ -10013,8 +10013,8 @@
           <a:cs typeface="+mn-cs"/>
         </a:defRPr>
       </a:lvl7pPr>
-      <a:lvl8pPr marL="3200464" algn="l" defTabSz="914418" rtl="0" eaLnBrk="1" latinLnBrk="0" hangingPunct="1">
-        <a:defRPr sz="1800" kern="1200">
+      <a:lvl8pPr marL="4480560" algn="l" defTabSz="1280160" rtl="0" eaLnBrk="1" latinLnBrk="0" hangingPunct="1">
+        <a:defRPr sz="2520" kern="1200">
           <a:solidFill>
             <a:schemeClr val="tx1"/>
           </a:solidFill>
@@ -10023,8 +10023,8 @@
           <a:cs typeface="+mn-cs"/>
         </a:defRPr>
       </a:lvl8pPr>
-      <a:lvl9pPr marL="3657673" algn="l" defTabSz="914418" rtl="0" eaLnBrk="1" latinLnBrk="0" hangingPunct="1">
-        <a:defRPr sz="1800" kern="1200">
+      <a:lvl9pPr marL="5120640" algn="l" defTabSz="1280160" rtl="0" eaLnBrk="1" latinLnBrk="0" hangingPunct="1">
+        <a:defRPr sz="2520" kern="1200">
           <a:solidFill>
             <a:schemeClr val="tx1"/>
           </a:solidFill>
@@ -10076,8 +10076,8 @@
         </p:blipFill>
         <p:spPr bwMode="auto">
           <a:xfrm>
-            <a:off x="10010116" y="189512"/>
-            <a:ext cx="1502092" cy="670504"/>
+            <a:off x="13346822" y="-1347517"/>
+            <a:ext cx="2002789" cy="894005"/>
           </a:xfrm>
           <a:prstGeom prst="rect">
             <a:avLst/>
@@ -10106,8 +10106,8 @@
         </p:blipFill>
         <p:spPr bwMode="auto">
           <a:xfrm>
-            <a:off x="7919951" y="356724"/>
-            <a:ext cx="2027924" cy="435532"/>
+            <a:off x="10559935" y="-1124568"/>
+            <a:ext cx="2703899" cy="580709"/>
           </a:xfrm>
           <a:prstGeom prst="rect">
             <a:avLst/>
@@ -10123,8 +10123,8 @@
         </p:nvSpPr>
         <p:spPr>
           <a:xfrm>
-            <a:off x="1148548" y="143941"/>
-            <a:ext cx="6519734" cy="830997"/>
+            <a:off x="1531398" y="-1408279"/>
+            <a:ext cx="8635697" cy="1077218"/>
           </a:xfrm>
           <a:prstGeom prst="rect">
             <a:avLst/>
@@ -10138,13 +10138,13 @@
           <a:lstStyle/>
           <a:p>
             <a:r>
-              <a:rPr lang="en-ZA" sz="4000" b="1" dirty="0">
+              <a:rPr lang="en-ZA" sz="5333" b="1" dirty="0">
                 <a:latin typeface="Berlin Sans FB Demi" panose="020E0802020502020306" pitchFamily="34" charset="0"/>
               </a:rPr>
               <a:t>DVT </a:t>
             </a:r>
             <a:r>
-              <a:rPr lang="en-ZA" sz="4800" b="1" dirty="0">
+              <a:rPr lang="en-ZA" sz="6400" b="1" dirty="0">
                 <a:solidFill>
                   <a:schemeClr val="accent4">
                     <a:lumMod val="50000"/>
@@ -10155,14 +10155,11 @@
               <a:t>DriveStats</a:t>
             </a:r>
             <a:r>
-              <a:rPr lang="en-ZA" sz="4000" b="1" dirty="0">
+              <a:rPr lang="en-ZA" sz="5333" b="1" dirty="0">
                 <a:latin typeface="Berlin Sans FB Demi" panose="020E0802020502020306" pitchFamily="34" charset="0"/>
               </a:rPr>
               <a:t> Algorithm</a:t>
             </a:r>
-            <a:endParaRPr lang="en-ZA" sz="4000" b="1" dirty="0">
-              <a:latin typeface="Berlin Sans FB Demi" panose="020E0802020502020306" pitchFamily="34" charset="0"/>
-            </a:endParaRPr>
           </a:p>
         </p:txBody>
       </p:sp>
@@ -10174,8 +10171,8 @@
         </p:nvSpPr>
         <p:spPr>
           <a:xfrm>
-            <a:off x="70421" y="1508834"/>
-            <a:ext cx="3492841" cy="1433383"/>
+            <a:off x="93896" y="411580"/>
+            <a:ext cx="4657121" cy="1911177"/>
           </a:xfrm>
           <a:prstGeom prst="roundRect">
             <a:avLst/>
@@ -10203,7 +10200,7 @@
           <a:p>
             <a:pPr algn="ctr"/>
             <a:r>
-              <a:rPr lang="en-ZA" dirty="0">
+              <a:rPr lang="en-ZA" sz="2823" dirty="0">
                 <a:latin typeface="Berlin Sans FB Demi" panose="020E0802020502020306" pitchFamily="34" charset="0"/>
               </a:rPr>
               <a:t>What is an algorithm?</a:t>
@@ -10212,7 +10209,7 @@
           <a:p>
             <a:pPr algn="just"/>
             <a:r>
-              <a:rPr lang="en-ZA" sz="1200" dirty="0">
+              <a:rPr lang="en-ZA" sz="1600" dirty="0">
                 <a:solidFill>
                   <a:srgbClr val="002060"/>
                 </a:solidFill>
@@ -10220,12 +10217,6 @@
               </a:rPr>
               <a:t>Algorithm is a process and set of rules to be followed in calculations or other problem-solving operations, especially by a computer.</a:t>
             </a:r>
-            <a:endParaRPr lang="en-ZA" sz="1200" dirty="0">
-              <a:solidFill>
-                <a:srgbClr val="002060"/>
-              </a:solidFill>
-              <a:latin typeface="Berlin Sans FB Demi" panose="020E0802020502020306" pitchFamily="34" charset="0"/>
-            </a:endParaRPr>
           </a:p>
         </p:txBody>
       </p:sp>
@@ -10237,8 +10228,8 @@
         </p:nvSpPr>
         <p:spPr>
           <a:xfrm>
-            <a:off x="4106757" y="1508834"/>
-            <a:ext cx="3492841" cy="1433383"/>
+            <a:off x="5475677" y="411580"/>
+            <a:ext cx="4657121" cy="1911177"/>
           </a:xfrm>
           <a:prstGeom prst="roundRect">
             <a:avLst/>
@@ -10266,7 +10257,7 @@
           <a:p>
             <a:pPr algn="ctr"/>
             <a:r>
-              <a:rPr lang="en-ZA" dirty="0">
+              <a:rPr lang="en-ZA" sz="2823" dirty="0">
                 <a:latin typeface="Berlin Sans FB Demi" panose="020E0802020502020306" pitchFamily="34" charset="0"/>
               </a:rPr>
               <a:t>What does the DVT DriveStats algorithm do?</a:t>
@@ -10275,7 +10266,7 @@
           <a:p>
             <a:pPr algn="just"/>
             <a:r>
-              <a:rPr lang="en-ZA" sz="1200" dirty="0">
+              <a:rPr lang="en-ZA" sz="1600" dirty="0">
                 <a:solidFill>
                   <a:schemeClr val="accent2">
                     <a:lumMod val="50000"/>
@@ -10285,14 +10276,6 @@
               </a:rPr>
               <a:t>Our algorithm makes use of a few very interesting properties of common statistics to give a driver a score for the quality of the their driving out of 10.</a:t>
             </a:r>
-            <a:endParaRPr lang="en-ZA" sz="1200" dirty="0">
-              <a:solidFill>
-                <a:schemeClr val="accent2">
-                  <a:lumMod val="50000"/>
-                </a:schemeClr>
-              </a:solidFill>
-              <a:latin typeface="Berlin Sans FB Demi" panose="020E0802020502020306" pitchFamily="34" charset="0"/>
-            </a:endParaRPr>
           </a:p>
         </p:txBody>
       </p:sp>
@@ -10304,8 +10287,8 @@
         </p:nvSpPr>
         <p:spPr>
           <a:xfrm>
-            <a:off x="3579560" y="2035477"/>
-            <a:ext cx="610304" cy="305952"/>
+            <a:off x="4772747" y="1113769"/>
+            <a:ext cx="813739" cy="407936"/>
           </a:xfrm>
           <a:prstGeom prst="rightArrow">
             <a:avLst/>
@@ -10332,7 +10315,7 @@
           <a:lstStyle/>
           <a:p>
             <a:pPr algn="ctr"/>
-            <a:endParaRPr lang="en-ZA">
+            <a:endParaRPr lang="en-ZA" sz="2823">
               <a:latin typeface="Berlin Sans FB Demi" panose="020E0802020502020306" pitchFamily="34" charset="0"/>
             </a:endParaRPr>
           </a:p>
@@ -10346,8 +10329,8 @@
         </p:nvSpPr>
         <p:spPr>
           <a:xfrm>
-            <a:off x="8143094" y="1436832"/>
-            <a:ext cx="3492841" cy="1600963"/>
+            <a:off x="10857460" y="315577"/>
+            <a:ext cx="4657121" cy="2134617"/>
           </a:xfrm>
           <a:prstGeom prst="roundRect">
             <a:avLst/>
@@ -10375,7 +10358,7 @@
           <a:p>
             <a:pPr algn="ctr"/>
             <a:r>
-              <a:rPr lang="en-ZA" dirty="0">
+              <a:rPr lang="en-ZA" sz="2823" dirty="0">
                 <a:latin typeface="Berlin Sans FB Demi" panose="020E0802020502020306" pitchFamily="34" charset="0"/>
               </a:rPr>
               <a:t>How does it work?</a:t>
@@ -10384,7 +10367,7 @@
           <a:p>
             <a:pPr algn="just"/>
             <a:r>
-              <a:rPr lang="en-ZA" sz="1050" dirty="0">
+              <a:rPr lang="en-ZA" sz="1400" dirty="0">
                 <a:solidFill>
                   <a:schemeClr val="accent2">
                     <a:lumMod val="75000"/>
@@ -10394,7 +10377,7 @@
               </a:rPr>
               <a:t>Using the data gathered from sensors built into all modern android devices we are able to determine a person’s acceleration in the x, y, and z axes, as well as many other important facts. By taking samples from these sensors at regular intervals (currently we have found that 1/3 of a second works well), we are able to estimate the manner in which an individual has been driving.</a:t>
             </a:r>
-            <a:endParaRPr lang="en-ZA" sz="1200" dirty="0">
+            <a:endParaRPr lang="en-ZA" sz="1600" dirty="0">
               <a:solidFill>
                 <a:schemeClr val="accent2">
                   <a:lumMod val="75000"/>
@@ -10413,8 +10396,8 @@
         </p:nvSpPr>
         <p:spPr>
           <a:xfrm>
-            <a:off x="7599597" y="2072547"/>
-            <a:ext cx="610304" cy="305952"/>
+            <a:off x="10132796" y="1163196"/>
+            <a:ext cx="813739" cy="407936"/>
           </a:xfrm>
           <a:prstGeom prst="rightArrow">
             <a:avLst/>
@@ -10441,14 +10424,14 @@
           <a:lstStyle/>
           <a:p>
             <a:pPr algn="ctr"/>
-            <a:endParaRPr lang="en-ZA">
+            <a:endParaRPr lang="en-ZA" sz="2823">
               <a:latin typeface="Berlin Sans FB Demi" panose="020E0802020502020306" pitchFamily="34" charset="0"/>
             </a:endParaRPr>
           </a:p>
         </p:txBody>
       </p:sp>
-      <mc:AlternateContent xmlns:mc="http://schemas.openxmlformats.org/markup-compatibility/2006">
-        <mc:Choice xmlns:a14="http://schemas.microsoft.com/office/drawing/2010/main" Requires="a14">
+      <mc:AlternateContent xmlns:mc="http://schemas.openxmlformats.org/markup-compatibility/2006" xmlns:a14="http://schemas.microsoft.com/office/drawing/2010/main">
+        <mc:Choice Requires="a14">
           <p:sp>
             <p:nvSpPr>
               <p:cNvPr id="14" name="Rounded Rectangle 13"/>
@@ -10457,8 +10440,8 @@
             </p:nvSpPr>
             <p:spPr>
               <a:xfrm>
-                <a:off x="70421" y="3037795"/>
-                <a:ext cx="3492841" cy="4658405"/>
+                <a:off x="93896" y="2450194"/>
+                <a:ext cx="4657121" cy="6211207"/>
               </a:xfrm>
               <a:prstGeom prst="roundRect">
                 <a:avLst/>
@@ -10483,19 +10466,19 @@
               <a:lstStyle/>
               <a:p>
                 <a:pPr algn="ctr"/>
-                <a:endParaRPr lang="en-ZA" sz="1600" dirty="0">
+                <a:endParaRPr lang="en-ZA" sz="2133" dirty="0">
                   <a:latin typeface="Berlin Sans FB Demi" panose="020E0802020502020306" pitchFamily="34" charset="0"/>
                 </a:endParaRPr>
               </a:p>
               <a:p>
                 <a:pPr algn="ctr"/>
                 <a:r>
-                  <a:rPr lang="en-ZA" sz="1600" dirty="0">
+                  <a:rPr lang="en-ZA" sz="2133" dirty="0">
                     <a:latin typeface="Berlin Sans FB Demi" panose="020E0802020502020306" pitchFamily="34" charset="0"/>
                   </a:rPr>
                   <a:t>What problems did we overcome?</a:t>
                 </a:r>
-                <a:endParaRPr lang="en-ZA" sz="800" b="1" dirty="0">
+                <a:endParaRPr lang="en-ZA" sz="1067" b="1" dirty="0">
                   <a:solidFill>
                     <a:schemeClr val="accent2">
                       <a:lumMod val="50000"/>
@@ -10507,7 +10490,7 @@
               <a:p>
                 <a:pPr algn="just"/>
                 <a:r>
-                  <a:rPr lang="en-ZA" sz="800" b="1" dirty="0">
+                  <a:rPr lang="en-ZA" sz="1067" b="1" dirty="0">
                     <a:solidFill>
                       <a:schemeClr val="accent2">
                         <a:lumMod val="50000"/>
@@ -10521,7 +10504,7 @@
               <a:p>
                 <a:pPr algn="just"/>
                 <a:r>
-                  <a:rPr lang="en-ZA" sz="800" dirty="0">
+                  <a:rPr lang="en-ZA" sz="1067" dirty="0">
                     <a:solidFill>
                       <a:schemeClr val="accent2">
                         <a:lumMod val="50000"/>
@@ -10529,24 +10512,13 @@
                     </a:solidFill>
                     <a:latin typeface="Berlin Sans FB Demi" panose="020E0802020502020306" pitchFamily="34" charset="0"/>
                   </a:rPr>
-                  <a:t>1</a:t>
-                </a:r>
-                <a:r>
-                  <a:rPr lang="en-ZA" sz="800" dirty="0">
-                    <a:solidFill>
-                      <a:schemeClr val="accent2">
-                        <a:lumMod val="50000"/>
-                      </a:schemeClr>
-                    </a:solidFill>
-                    <a:latin typeface="Berlin Sans FB Demi" panose="020E0802020502020306" pitchFamily="34" charset="0"/>
-                  </a:rPr>
-                  <a:t>) What data should we gather?</a:t>
+                  <a:t>1) What data should we gather?</a:t>
                 </a:r>
               </a:p>
               <a:p>
                 <a:pPr algn="just"/>
                 <a:r>
-                  <a:rPr lang="en-ZA" sz="800" dirty="0">
+                  <a:rPr lang="en-ZA" sz="1067" dirty="0">
                     <a:solidFill>
                       <a:schemeClr val="accent2">
                         <a:lumMod val="75000"/>
@@ -10560,7 +10532,7 @@
               <a:p>
                 <a:pPr algn="just"/>
                 <a:r>
-                  <a:rPr lang="en-ZA" sz="800" dirty="0">
+                  <a:rPr lang="en-ZA" sz="1067" dirty="0">
                     <a:solidFill>
                       <a:schemeClr val="accent1">
                         <a:lumMod val="50000"/>
@@ -10574,7 +10546,7 @@
               <a:p>
                 <a:pPr algn="just"/>
                 <a:r>
-                  <a:rPr lang="en-ZA" sz="800" dirty="0">
+                  <a:rPr lang="en-ZA" sz="1067" dirty="0">
                     <a:solidFill>
                       <a:schemeClr val="accent1">
                         <a:lumMod val="60000"/>
@@ -10589,7 +10561,7 @@
               <a:p>
                 <a:pPr algn="just"/>
                 <a:r>
-                  <a:rPr lang="en-ZA" sz="800" b="1" dirty="0">
+                  <a:rPr lang="en-ZA" sz="1067" b="1" dirty="0">
                     <a:solidFill>
                       <a:schemeClr val="accent1">
                         <a:lumMod val="60000"/>
@@ -10601,7 +10573,7 @@
                   <a:t>Forward Acceleration</a:t>
                 </a:r>
                 <a:r>
-                  <a:rPr lang="en-ZA" sz="800" dirty="0">
+                  <a:rPr lang="en-ZA" sz="1067" dirty="0">
                     <a:solidFill>
                       <a:schemeClr val="accent1">
                         <a:lumMod val="60000"/>
@@ -10615,7 +10587,7 @@
                 <a14:m>
                   <m:oMath xmlns:m="http://schemas.openxmlformats.org/officeDocument/2006/math">
                     <m:r>
-                      <a:rPr lang="en-ZA" sz="800" i="1" dirty="0">
+                      <a:rPr lang="en-ZA" sz="1067" i="1" dirty="0">
                         <a:solidFill>
                           <a:schemeClr val="accent1">
                             <a:lumMod val="60000"/>
@@ -10627,7 +10599,7 @@
                       <m:t>4.2</m:t>
                     </m:r>
                     <m:r>
-                      <a:rPr lang="en-ZA" sz="800" i="1">
+                      <a:rPr lang="en-ZA" sz="1067" i="1">
                         <a:solidFill>
                           <a:schemeClr val="accent1">
                             <a:lumMod val="60000"/>
@@ -10641,7 +10613,7 @@
                     <m:sSup>
                       <m:sSupPr>
                         <m:ctrlPr>
-                          <a:rPr lang="en-ZA" sz="800" i="1">
+                          <a:rPr lang="en-ZA" sz="1067" i="1">
                             <a:solidFill>
                               <a:schemeClr val="accent1">
                                 <a:lumMod val="60000"/>
@@ -10654,7 +10626,7 @@
                       </m:sSupPr>
                       <m:e>
                         <m:r>
-                          <a:rPr lang="en-ZA" sz="800" i="1">
+                          <a:rPr lang="en-ZA" sz="1067" i="1">
                             <a:solidFill>
                               <a:schemeClr val="accent1">
                                 <a:lumMod val="60000"/>
@@ -10668,7 +10640,7 @@
                       </m:e>
                       <m:sup>
                         <m:r>
-                          <a:rPr lang="en-ZA" sz="800" i="1">
+                          <a:rPr lang="en-ZA" sz="1067" i="1">
                             <a:solidFill>
                               <a:schemeClr val="accent1">
                                 <a:lumMod val="60000"/>
@@ -10683,7 +10655,7 @@
                     </m:sSup>
                   </m:oMath>
                 </a14:m>
-                <a:endParaRPr lang="en-ZA" sz="800" dirty="0">
+                <a:endParaRPr lang="en-ZA" sz="1067" dirty="0">
                   <a:solidFill>
                     <a:schemeClr val="accent1">
                       <a:lumMod val="60000"/>
@@ -10696,7 +10668,7 @@
               <a:p>
                 <a:pPr algn="just"/>
                 <a:r>
-                  <a:rPr lang="en-ZA" sz="800" dirty="0">
+                  <a:rPr lang="en-ZA" sz="1067" dirty="0">
                     <a:solidFill>
                       <a:schemeClr val="accent1">
                         <a:lumMod val="60000"/>
@@ -10710,7 +10682,7 @@
                 <a14:m>
                   <m:oMath xmlns:m="http://schemas.openxmlformats.org/officeDocument/2006/math">
                     <m:r>
-                      <a:rPr lang="en-ZA" sz="800" i="1">
+                      <a:rPr lang="en-ZA" sz="1067" i="1">
                         <a:solidFill>
                           <a:schemeClr val="accent1">
                             <a:lumMod val="60000"/>
@@ -10722,7 +10694,7 @@
                       <m:t>3</m:t>
                     </m:r>
                     <m:r>
-                      <a:rPr lang="en-ZA" sz="800" i="1">
+                      <a:rPr lang="en-ZA" sz="1067" i="1">
                         <a:solidFill>
                           <a:schemeClr val="accent1">
                             <a:lumMod val="60000"/>
@@ -10736,7 +10708,7 @@
                     <m:sSup>
                       <m:sSupPr>
                         <m:ctrlPr>
-                          <a:rPr lang="en-ZA" sz="800" i="1">
+                          <a:rPr lang="en-ZA" sz="1067" i="1">
                             <a:solidFill>
                               <a:schemeClr val="accent1">
                                 <a:lumMod val="60000"/>
@@ -10749,7 +10721,7 @@
                       </m:sSupPr>
                       <m:e>
                         <m:r>
-                          <a:rPr lang="en-ZA" sz="800" i="1">
+                          <a:rPr lang="en-ZA" sz="1067" i="1">
                             <a:solidFill>
                               <a:schemeClr val="accent1">
                                 <a:lumMod val="60000"/>
@@ -10763,7 +10735,7 @@
                       </m:e>
                       <m:sup>
                         <m:r>
-                          <a:rPr lang="en-ZA" sz="800" i="1">
+                          <a:rPr lang="en-ZA" sz="1067" i="1">
                             <a:solidFill>
                               <a:schemeClr val="accent1">
                                 <a:lumMod val="60000"/>
@@ -10778,7 +10750,7 @@
                     </m:sSup>
                   </m:oMath>
                 </a14:m>
-                <a:endParaRPr lang="en-ZA" sz="800" dirty="0">
+                <a:endParaRPr lang="en-ZA" sz="1067" dirty="0">
                   <a:solidFill>
                     <a:schemeClr val="accent1">
                       <a:lumMod val="60000"/>
@@ -10791,7 +10763,7 @@
               <a:p>
                 <a:pPr algn="just"/>
                 <a:r>
-                  <a:rPr lang="en-ZA" sz="800" b="1" dirty="0">
+                  <a:rPr lang="en-ZA" sz="1067" b="1" dirty="0">
                     <a:solidFill>
                       <a:schemeClr val="accent1">
                         <a:lumMod val="60000"/>
@@ -10803,7 +10775,7 @@
                   <a:t>Vertical Acceleration</a:t>
                 </a:r>
                 <a:r>
-                  <a:rPr lang="en-ZA" sz="800" dirty="0">
+                  <a:rPr lang="en-ZA" sz="1067" dirty="0">
                     <a:solidFill>
                       <a:schemeClr val="accent1">
                         <a:lumMod val="60000"/>
@@ -10817,7 +10789,7 @@
                 <a14:m>
                   <m:oMath xmlns:m="http://schemas.openxmlformats.org/officeDocument/2006/math">
                     <m:r>
-                      <a:rPr lang="en-ZA" sz="800" i="1" dirty="0">
+                      <a:rPr lang="en-ZA" sz="1067" i="1" dirty="0">
                         <a:solidFill>
                           <a:schemeClr val="accent1">
                             <a:lumMod val="60000"/>
@@ -10829,7 +10801,7 @@
                       <m:t>2</m:t>
                     </m:r>
                     <m:r>
-                      <a:rPr lang="en-ZA" sz="800" i="1">
+                      <a:rPr lang="en-ZA" sz="1067" i="1">
                         <a:solidFill>
                           <a:schemeClr val="accent1">
                             <a:lumMod val="60000"/>
@@ -10843,7 +10815,7 @@
                     <m:sSup>
                       <m:sSupPr>
                         <m:ctrlPr>
-                          <a:rPr lang="en-ZA" sz="800" i="1">
+                          <a:rPr lang="en-ZA" sz="1067" i="1">
                             <a:solidFill>
                               <a:schemeClr val="accent1">
                                 <a:lumMod val="60000"/>
@@ -10856,7 +10828,7 @@
                       </m:sSupPr>
                       <m:e>
                         <m:r>
-                          <a:rPr lang="en-ZA" sz="800" i="1">
+                          <a:rPr lang="en-ZA" sz="1067" i="1">
                             <a:solidFill>
                               <a:schemeClr val="accent1">
                                 <a:lumMod val="60000"/>
@@ -10870,7 +10842,7 @@
                       </m:e>
                       <m:sup>
                         <m:r>
-                          <a:rPr lang="en-ZA" sz="800" i="1">
+                          <a:rPr lang="en-ZA" sz="1067" i="1">
                             <a:solidFill>
                               <a:schemeClr val="accent1">
                                 <a:lumMod val="60000"/>
@@ -10885,7 +10857,7 @@
                     </m:sSup>
                   </m:oMath>
                 </a14:m>
-                <a:endParaRPr lang="en-ZA" sz="800" dirty="0">
+                <a:endParaRPr lang="en-ZA" sz="1067" dirty="0">
                   <a:solidFill>
                     <a:schemeClr val="tx1">
                       <a:lumMod val="95000"/>
@@ -10898,7 +10870,7 @@
               <a:p>
                 <a:pPr algn="just"/>
                 <a:r>
-                  <a:rPr lang="en-ZA" sz="800" dirty="0">
+                  <a:rPr lang="en-ZA" sz="1067" dirty="0">
                     <a:solidFill>
                       <a:schemeClr val="tx1">
                         <a:lumMod val="95000"/>
@@ -10913,7 +10885,7 @@
               <a:p>
                 <a:pPr algn="just"/>
                 <a:r>
-                  <a:rPr lang="en-ZA" sz="800" dirty="0">
+                  <a:rPr lang="en-ZA" sz="1067" dirty="0">
                     <a:solidFill>
                       <a:schemeClr val="bg1">
                         <a:lumMod val="50000"/>
@@ -10927,7 +10899,7 @@
               <a:p>
                 <a:pPr algn="just"/>
                 <a:r>
-                  <a:rPr lang="en-ZA" sz="800" dirty="0">
+                  <a:rPr lang="en-ZA" sz="1067" dirty="0">
                     <a:solidFill>
                       <a:schemeClr val="accent6">
                         <a:lumMod val="50000"/>
@@ -10941,7 +10913,7 @@
               <a:p>
                 <a:pPr algn="just"/>
                 <a:r>
-                  <a:rPr lang="en-ZA" sz="800" dirty="0">
+                  <a:rPr lang="en-ZA" sz="1067" dirty="0">
                     <a:solidFill>
                       <a:schemeClr val="accent6">
                         <a:lumMod val="60000"/>
@@ -10950,45 +10922,12 @@
                     </a:solidFill>
                     <a:latin typeface="Berlin Sans FB Demi" panose="020E0802020502020306" pitchFamily="34" charset="0"/>
                   </a:rPr>
-                  <a:t>Fortunately, follows </a:t>
+                  <a:t>Fortunately, follows a layout called a Poisson distribution; because it expresses the probability of a given number of events occurring in a fixed interval of time and/or space if these events occur with a known average rate. Because of several properties of our data we observe out data closely approximating a normal distribution.</a:t>
                 </a:r>
-                <a:r>
-                  <a:rPr lang="en-ZA" sz="800" dirty="0">
-                    <a:solidFill>
-                      <a:schemeClr val="accent6">
-                        <a:lumMod val="60000"/>
-                        <a:lumOff val="40000"/>
-                      </a:schemeClr>
-                    </a:solidFill>
-                    <a:latin typeface="Berlin Sans FB Demi" panose="020E0802020502020306" pitchFamily="34" charset="0"/>
-                  </a:rPr>
-                  <a:t>a layout called a Poisson distribution; because it expresses the probability of a given number of events occurring in a fixed interval of time and/or space if these events occur with a known average </a:t>
-                </a:r>
-                <a:r>
-                  <a:rPr lang="en-ZA" sz="800" dirty="0">
-                    <a:solidFill>
-                      <a:schemeClr val="accent6">
-                        <a:lumMod val="60000"/>
-                        <a:lumOff val="40000"/>
-                      </a:schemeClr>
-                    </a:solidFill>
-                    <a:latin typeface="Berlin Sans FB Demi" panose="020E0802020502020306" pitchFamily="34" charset="0"/>
-                  </a:rPr>
-                  <a:t>rate. Because of several properties of our data we observe out data closely approximating a normal distribution.</a:t>
-                </a:r>
-                <a:endParaRPr lang="en-ZA" sz="800" dirty="0">
-                  <a:solidFill>
-                    <a:schemeClr val="accent6">
-                      <a:lumMod val="60000"/>
-                      <a:lumOff val="40000"/>
-                    </a:schemeClr>
-                  </a:solidFill>
-                  <a:latin typeface="Berlin Sans FB Demi" panose="020E0802020502020306" pitchFamily="34" charset="0"/>
-                </a:endParaRPr>
               </a:p>
               <a:p>
                 <a:pPr algn="just"/>
-                <a:endParaRPr lang="en-ZA" sz="1200" dirty="0">
+                <a:endParaRPr lang="en-ZA" sz="1600" dirty="0">
                   <a:solidFill>
                     <a:schemeClr val="accent1">
                       <a:lumMod val="60000"/>
@@ -11000,7 +10939,7 @@
               </a:p>
               <a:p>
                 <a:pPr algn="just"/>
-                <a:endParaRPr lang="en-ZA" sz="1200" dirty="0">
+                <a:endParaRPr lang="en-ZA" sz="1600" dirty="0">
                   <a:solidFill>
                     <a:schemeClr val="accent2">
                       <a:lumMod val="50000"/>
@@ -11011,7 +10950,7 @@
               </a:p>
               <a:p>
                 <a:pPr algn="just"/>
-                <a:endParaRPr lang="en-ZA" sz="1200" dirty="0">
+                <a:endParaRPr lang="en-ZA" sz="1600" dirty="0">
                   <a:solidFill>
                     <a:schemeClr val="accent2">
                       <a:lumMod val="50000"/>
@@ -11021,10 +10960,10 @@
                 </a:endParaRPr>
               </a:p>
               <a:p>
-                <a:pPr marL="228605" indent="-228605" algn="just">
+                <a:pPr marL="304799" indent="-304799" algn="just">
                   <a:buAutoNum type="arabicParenR"/>
                 </a:pPr>
-                <a:endParaRPr lang="en-ZA" sz="1200" dirty="0">
+                <a:endParaRPr lang="en-ZA" sz="1600" dirty="0">
                   <a:solidFill>
                     <a:schemeClr val="accent2">
                       <a:lumMod val="50000"/>
@@ -11034,10 +10973,10 @@
                 </a:endParaRPr>
               </a:p>
               <a:p>
-                <a:pPr marL="228605" indent="-228605" algn="just">
+                <a:pPr marL="304799" indent="-304799" algn="just">
                   <a:buAutoNum type="arabicParenR"/>
                 </a:pPr>
-                <a:endParaRPr lang="en-ZA" sz="1200" dirty="0">
+                <a:endParaRPr lang="en-ZA" sz="1600" dirty="0">
                   <a:solidFill>
                     <a:schemeClr val="accent2">
                       <a:lumMod val="50000"/>
@@ -11049,7 +10988,7 @@
             </p:txBody>
           </p:sp>
         </mc:Choice>
-        <mc:Fallback>
+        <mc:Fallback xmlns="">
           <p:sp>
             <p:nvSpPr>
               <p:cNvPr id="14" name="Rounded Rectangle 13"/>
@@ -11109,8 +11048,8 @@
         </p:blipFill>
         <p:spPr bwMode="auto">
           <a:xfrm>
-            <a:off x="658415" y="6898933"/>
-            <a:ext cx="2309590" cy="513242"/>
+            <a:off x="877887" y="7598377"/>
+            <a:ext cx="3079453" cy="684323"/>
           </a:xfrm>
           <a:prstGeom prst="rect">
             <a:avLst/>
@@ -11140,8 +11079,8 @@
           </p:nvPr>
         </p:nvGraphicFramePr>
         <p:xfrm>
-          <a:off x="4545684" y="3505930"/>
-          <a:ext cx="5464432" cy="3642955"/>
+          <a:off x="6060912" y="3074374"/>
+          <a:ext cx="7285909" cy="4857273"/>
         </p:xfrm>
         <a:graphic>
           <a:graphicData uri="http://schemas.openxmlformats.org/drawingml/2006/diagram">
@@ -11172,8 +11111,8 @@
         </p:blipFill>
         <p:spPr bwMode="auto">
           <a:xfrm rot="1512699">
-            <a:off x="10474366" y="5147374"/>
-            <a:ext cx="1023394" cy="596259"/>
+            <a:off x="13965822" y="5262966"/>
+            <a:ext cx="1364525" cy="795012"/>
           </a:xfrm>
           <a:prstGeom prst="rect">
             <a:avLst/>
@@ -11220,8 +11159,8 @@
         </p:blipFill>
         <p:spPr bwMode="auto">
           <a:xfrm rot="20053135">
-            <a:off x="10445327" y="3465826"/>
-            <a:ext cx="895350" cy="596900"/>
+            <a:off x="13927103" y="3020901"/>
+            <a:ext cx="1193800" cy="795867"/>
           </a:xfrm>
           <a:prstGeom prst="rect">
             <a:avLst/>
@@ -11253,8 +11192,8 @@
         </p:nvSpPr>
         <p:spPr>
           <a:xfrm rot="9850399">
-            <a:off x="9992781" y="4103007"/>
-            <a:ext cx="453035" cy="64161"/>
+            <a:off x="13323709" y="3870477"/>
+            <a:ext cx="604047" cy="85548"/>
           </a:xfrm>
           <a:prstGeom prst="rightArrow">
             <a:avLst/>
@@ -11279,7 +11218,7 @@
           <a:lstStyle/>
           <a:p>
             <a:pPr algn="ctr"/>
-            <a:endParaRPr lang="en-ZA">
+            <a:endParaRPr lang="en-ZA" sz="2823">
               <a:latin typeface="Berlin Sans FB Demi" panose="020E0802020502020306" pitchFamily="34" charset="0"/>
             </a:endParaRPr>
           </a:p>
@@ -11293,8 +11232,8 @@
         </p:nvSpPr>
         <p:spPr>
           <a:xfrm rot="12134015">
-            <a:off x="10007220" y="5171760"/>
-            <a:ext cx="399939" cy="63266"/>
+            <a:off x="13342961" y="5295480"/>
+            <a:ext cx="533252" cy="84355"/>
           </a:xfrm>
           <a:prstGeom prst="rightArrow">
             <a:avLst/>
@@ -11319,7 +11258,7 @@
           <a:lstStyle/>
           <a:p>
             <a:pPr algn="ctr"/>
-            <a:endParaRPr lang="en-ZA">
+            <a:endParaRPr lang="en-ZA" sz="2823">
               <a:latin typeface="Berlin Sans FB Demi" panose="020E0802020502020306" pitchFamily="34" charset="0"/>
             </a:endParaRPr>
           </a:p>
@@ -11348,8 +11287,8 @@
         </p:blipFill>
         <p:spPr bwMode="auto">
           <a:xfrm rot="20218361">
-            <a:off x="7145848" y="6957618"/>
-            <a:ext cx="1217425" cy="382532"/>
+            <a:off x="9527798" y="7676624"/>
+            <a:ext cx="1623233" cy="510043"/>
           </a:xfrm>
           <a:prstGeom prst="rect">
             <a:avLst/>
@@ -11381,8 +11320,8 @@
         </p:nvSpPr>
         <p:spPr>
           <a:xfrm rot="14055460" flipV="1">
-            <a:off x="7238652" y="6969907"/>
-            <a:ext cx="335816" cy="45719"/>
+            <a:off x="9651536" y="7693010"/>
+            <a:ext cx="447755" cy="60959"/>
           </a:xfrm>
           <a:prstGeom prst="rightArrow">
             <a:avLst/>
@@ -11407,7 +11346,7 @@
           <a:lstStyle/>
           <a:p>
             <a:pPr algn="ctr"/>
-            <a:endParaRPr lang="en-ZA">
+            <a:endParaRPr lang="en-ZA" sz="2823">
               <a:latin typeface="Berlin Sans FB Demi" panose="020E0802020502020306" pitchFamily="34" charset="0"/>
             </a:endParaRPr>
           </a:p>
@@ -11421,8 +11360,8 @@
         </p:nvSpPr>
         <p:spPr>
           <a:xfrm>
-            <a:off x="11226800" y="9096375"/>
-            <a:ext cx="1574800" cy="504825"/>
+            <a:off x="14892469" y="8870750"/>
+            <a:ext cx="2099733" cy="673100"/>
           </a:xfrm>
           <a:prstGeom prst="round2DiagRect">
             <a:avLst/>
@@ -11449,7 +11388,7 @@
           <a:p>
             <a:pPr algn="just"/>
             <a:r>
-              <a:rPr lang="en-ZA" sz="500" dirty="0">
+              <a:rPr lang="en-ZA" sz="667" dirty="0">
                 <a:solidFill>
                   <a:schemeClr val="bg1"/>
                 </a:solidFill>
@@ -11460,12 +11399,12 @@
             </a:r>
           </a:p>
           <a:p>
-            <a:pPr marL="171454" indent="-171454" algn="just">
+            <a:pPr marL="228600" indent="-228600" algn="just">
               <a:buFont typeface="Arial" panose="020B0604020202020204" pitchFamily="34" charset="0"/>
               <a:buChar char="•"/>
             </a:pPr>
             <a:r>
-              <a:rPr lang="en-ZA" sz="500" dirty="0" err="1">
+              <a:rPr lang="en-ZA" sz="667" dirty="0" err="1">
                 <a:solidFill>
                   <a:schemeClr val="bg1"/>
                 </a:solidFill>
@@ -11475,7 +11414,7 @@
               <a:t>Prenil</a:t>
             </a:r>
             <a:r>
-              <a:rPr lang="en-ZA" sz="500" dirty="0">
+              <a:rPr lang="en-ZA" sz="667" dirty="0">
                 <a:solidFill>
                   <a:schemeClr val="bg1"/>
                 </a:solidFill>
@@ -11485,7 +11424,7 @@
               <a:t> </a:t>
             </a:r>
             <a:r>
-              <a:rPr lang="en-ZA" sz="500" dirty="0" err="1">
+              <a:rPr lang="en-ZA" sz="667" dirty="0" err="1">
                 <a:solidFill>
                   <a:schemeClr val="bg1"/>
                 </a:solidFill>
@@ -11494,7 +11433,7 @@
               </a:rPr>
               <a:t>Sewmohan</a:t>
             </a:r>
-            <a:endParaRPr lang="en-ZA" sz="500" dirty="0">
+            <a:endParaRPr lang="en-ZA" sz="667" dirty="0">
               <a:solidFill>
                 <a:schemeClr val="bg1"/>
               </a:solidFill>
@@ -11503,12 +11442,12 @@
             </a:endParaRPr>
           </a:p>
           <a:p>
-            <a:pPr marL="171454" indent="-171454" algn="just">
+            <a:pPr marL="228600" indent="-228600" algn="just">
               <a:buFont typeface="Arial" panose="020B0604020202020204" pitchFamily="34" charset="0"/>
               <a:buChar char="•"/>
             </a:pPr>
             <a:r>
-              <a:rPr lang="en-ZA" sz="500" dirty="0" err="1">
+              <a:rPr lang="en-ZA" sz="667" dirty="0" err="1">
                 <a:solidFill>
                   <a:schemeClr val="bg1"/>
                 </a:solidFill>
@@ -11518,7 +11457,7 @@
               <a:t>Jolandi</a:t>
             </a:r>
             <a:r>
-              <a:rPr lang="en-ZA" sz="500" dirty="0">
+              <a:rPr lang="en-ZA" sz="667" dirty="0">
                 <a:solidFill>
                   <a:schemeClr val="bg1"/>
                 </a:solidFill>
@@ -11528,7 +11467,7 @@
               <a:t> </a:t>
             </a:r>
             <a:r>
-              <a:rPr lang="en-ZA" sz="500" dirty="0" err="1">
+              <a:rPr lang="en-ZA" sz="667" dirty="0" err="1">
                 <a:solidFill>
                   <a:schemeClr val="bg1"/>
                 </a:solidFill>
@@ -11537,7 +11476,7 @@
               </a:rPr>
               <a:t>Swanepoel</a:t>
             </a:r>
-            <a:endParaRPr lang="en-ZA" sz="500" dirty="0">
+            <a:endParaRPr lang="en-ZA" sz="667" dirty="0">
               <a:solidFill>
                 <a:schemeClr val="bg1"/>
               </a:solidFill>
@@ -11570,8 +11509,8 @@
         </p:blipFill>
         <p:spPr bwMode="auto">
           <a:xfrm>
-            <a:off x="11956752" y="47198"/>
-            <a:ext cx="800398" cy="800398"/>
+            <a:off x="15942336" y="-1537269"/>
+            <a:ext cx="1067197" cy="1067197"/>
           </a:xfrm>
           <a:prstGeom prst="rect">
             <a:avLst/>

</xml_diff>